<commit_message>
Added organization, admin slides
</commit_message>
<xml_diff>
--- a/LeveragingSlackForStudentCollaboration.pptx
+++ b/LeveragingSlackForStudentCollaboration.pptx
@@ -5,7 +5,7 @@
     <p:sldMasterId id="2147483660" r:id="rId1"/>
   </p:sldMasterIdLst>
   <p:notesMasterIdLst>
-    <p:notesMasterId r:id="rId10"/>
+    <p:notesMasterId r:id="rId15"/>
   </p:notesMasterIdLst>
   <p:sldIdLst>
     <p:sldId id="309" r:id="rId2"/>
@@ -15,7 +15,12 @@
     <p:sldId id="1375" r:id="rId6"/>
     <p:sldId id="1376" r:id="rId7"/>
     <p:sldId id="1377" r:id="rId8"/>
-    <p:sldId id="1372" r:id="rId9"/>
+    <p:sldId id="1378" r:id="rId9"/>
+    <p:sldId id="1379" r:id="rId10"/>
+    <p:sldId id="1380" r:id="rId11"/>
+    <p:sldId id="1381" r:id="rId12"/>
+    <p:sldId id="1382" r:id="rId13"/>
+    <p:sldId id="1372" r:id="rId14"/>
   </p:sldIdLst>
   <p:sldSz cx="12192000" cy="6858000"/>
   <p:notesSz cx="6858000" cy="9144000"/>
@@ -204,7 +209,7 @@
           <a:p>
             <a:fld id="{CA1F7DAD-AACB-410C-9AA4-BE5099812397}" type="datetimeFigureOut">
               <a:rPr lang="en-US" smtClean="0"/>
-              <a:t>6/18/2024</a:t>
+              <a:t>6/22/2024</a:t>
             </a:fld>
             <a:endParaRPr lang="en-US"/>
           </a:p>
@@ -620,7 +625,7 @@
           <a:p>
             <a:fld id="{FCFED414-B8BD-4977-925E-1C2AFAB354A8}" type="slidenum">
               <a:rPr lang="en-US" smtClean="0"/>
-              <a:t>8</a:t>
+              <a:t>13</a:t>
             </a:fld>
             <a:endParaRPr lang="en-US"/>
           </a:p>
@@ -1130,7 +1135,7 @@
           <a:p>
             <a:fld id="{8F7D2F49-1857-4E7D-8050-DC698401AAB7}" type="datetimeFigureOut">
               <a:rPr lang="en-US" smtClean="0"/>
-              <a:t>6/18/2024</a:t>
+              <a:t>6/22/2024</a:t>
             </a:fld>
             <a:endParaRPr lang="en-US"/>
           </a:p>
@@ -2477,7 +2482,7 @@
           <a:p>
             <a:fld id="{8F7D2F49-1857-4E7D-8050-DC698401AAB7}" type="datetimeFigureOut">
               <a:rPr lang="en-US" smtClean="0"/>
-              <a:t>6/18/2024</a:t>
+              <a:t>6/22/2024</a:t>
             </a:fld>
             <a:endParaRPr lang="en-US"/>
           </a:p>
@@ -3187,7 +3192,7 @@
         </p:nvSpPr>
         <p:spPr>
           <a:xfrm>
-            <a:off x="2170393" y="538787"/>
+            <a:off x="514588" y="489359"/>
             <a:ext cx="7474348" cy="1754326"/>
           </a:xfrm>
           <a:prstGeom prst="rect">
@@ -3201,7 +3206,6 @@
           </a:bodyPr>
           <a:lstStyle/>
           <a:p>
-            <a:pPr algn="ctr"/>
             <a:r>
               <a:rPr lang="en-US" sz="5400"/>
               <a:t>Leveraging Slack for Student Collaboration</a:t>
@@ -3223,8 +3227,8 @@
         </p:nvSpPr>
         <p:spPr>
           <a:xfrm>
-            <a:off x="3131319" y="2644170"/>
-            <a:ext cx="6654292" cy="1569660"/>
+            <a:off x="659028" y="2951804"/>
+            <a:ext cx="8608540" cy="2677656"/>
           </a:xfrm>
           <a:prstGeom prst="rect">
             <a:avLst/>
@@ -3257,16 +3261,31 @@
             </a:r>
           </a:p>
           <a:p>
+            <a:endParaRPr lang="en-US" sz="2400"/>
+          </a:p>
+          <a:p>
             <a:r>
               <a:rPr lang="en-US" sz="2400"/>
-              <a:t>Kathryn Arraya</a:t>
-            </a:r>
-            <a:endParaRPr lang="en-US" sz="2400" dirty="0"/>
+              <a:t>Student Presenters:</a:t>
+            </a:r>
           </a:p>
           <a:p>
             <a:r>
               <a:rPr lang="en-US" sz="2400"/>
-              <a:t>Steven Gsell</a:t>
+              <a:t>Kathryn Arraya 	(A.S. Data Science Technology)</a:t>
+            </a:r>
+          </a:p>
+          <a:p>
+            <a:r>
+              <a:rPr lang="en-US" sz="2400"/>
+              <a:t>Steven Gsell  		(B.A.S. Information Systems Technology, </a:t>
+            </a:r>
+            <a:br>
+              <a:rPr lang="en-US" sz="2400"/>
+            </a:br>
+            <a:r>
+              <a:rPr lang="en-US" sz="2400"/>
+              <a:t>                                         Application Development Concentration)</a:t>
             </a:r>
             <a:endParaRPr lang="en-US" sz="2400" dirty="0"/>
           </a:p>
@@ -3276,6 +3295,585 @@
     <p:extLst>
       <p:ext uri="{BB962C8B-B14F-4D97-AF65-F5344CB8AC3E}">
         <p14:creationId xmlns:p14="http://schemas.microsoft.com/office/powerpoint/2010/main" val="2440045289"/>
+      </p:ext>
+    </p:extLst>
+  </p:cSld>
+  <p:clrMapOvr>
+    <a:masterClrMapping/>
+  </p:clrMapOvr>
+</p:sld>
+</file>
+
+<file path=ppt/slides/slide10.xml><?xml version="1.0" encoding="utf-8"?>
+<p:sld xmlns:a="http://schemas.openxmlformats.org/drawingml/2006/main" xmlns:r="http://schemas.openxmlformats.org/officeDocument/2006/relationships" xmlns:p="http://schemas.openxmlformats.org/presentationml/2006/main">
+  <p:cSld>
+    <p:spTree>
+      <p:nvGrpSpPr>
+        <p:cNvPr id="1" name=""/>
+        <p:cNvGrpSpPr/>
+        <p:nvPr/>
+      </p:nvGrpSpPr>
+      <p:grpSpPr>
+        <a:xfrm>
+          <a:off x="0" y="0"/>
+          <a:ext cx="0" cy="0"/>
+          <a:chOff x="0" y="0"/>
+          <a:chExt cx="0" cy="0"/>
+        </a:xfrm>
+      </p:grpSpPr>
+      <p:sp>
+        <p:nvSpPr>
+          <p:cNvPr id="2" name="Title 1">
+            <a:extLst>
+              <a:ext uri="{FF2B5EF4-FFF2-40B4-BE49-F238E27FC236}">
+                <a16:creationId xmlns:a16="http://schemas.microsoft.com/office/drawing/2014/main" id="{1193C801-427D-4761-B139-63C3D71F6842}"/>
+              </a:ext>
+            </a:extLst>
+          </p:cNvPr>
+          <p:cNvSpPr>
+            <a:spLocks noGrp="1"/>
+          </p:cNvSpPr>
+          <p:nvPr>
+            <p:ph type="title"/>
+          </p:nvPr>
+        </p:nvSpPr>
+        <p:spPr>
+          <a:xfrm>
+            <a:off x="838200" y="290652"/>
+            <a:ext cx="10941908" cy="780769"/>
+          </a:xfrm>
+        </p:spPr>
+        <p:txBody>
+          <a:bodyPr/>
+          <a:lstStyle/>
+          <a:p>
+            <a:r>
+              <a:rPr lang="en-US"/>
+              <a:t>Administering the Workspace</a:t>
+            </a:r>
+          </a:p>
+        </p:txBody>
+      </p:sp>
+      <p:sp>
+        <p:nvSpPr>
+          <p:cNvPr id="3" name="Content Placeholder 2">
+            <a:extLst>
+              <a:ext uri="{FF2B5EF4-FFF2-40B4-BE49-F238E27FC236}">
+                <a16:creationId xmlns:a16="http://schemas.microsoft.com/office/drawing/2014/main" id="{8105E254-772A-4AB1-8230-33418D800ECD}"/>
+              </a:ext>
+            </a:extLst>
+          </p:cNvPr>
+          <p:cNvSpPr>
+            <a:spLocks noGrp="1"/>
+          </p:cNvSpPr>
+          <p:nvPr>
+            <p:ph idx="1"/>
+          </p:nvPr>
+        </p:nvSpPr>
+        <p:spPr>
+          <a:xfrm>
+            <a:off x="838200" y="1071421"/>
+            <a:ext cx="10515600" cy="4851584"/>
+          </a:xfrm>
+        </p:spPr>
+        <p:txBody>
+          <a:bodyPr>
+            <a:normAutofit fontScale="92500" lnSpcReduction="20000"/>
+          </a:bodyPr>
+          <a:lstStyle/>
+          <a:p>
+            <a:pPr marL="169863" indent="-169863">
+              <a:lnSpc>
+                <a:spcPct val="120000"/>
+              </a:lnSpc>
+              <a:spcBef>
+                <a:spcPts val="500"/>
+              </a:spcBef>
+            </a:pPr>
+            <a:r>
+              <a:rPr lang="en-US" sz="2000"/>
+              <a:t>Canvas Announcement</a:t>
+            </a:r>
+            <a:endParaRPr lang="en-US" sz="2000">
+              <a:solidFill>
+                <a:srgbClr val="000000"/>
+              </a:solidFill>
+            </a:endParaRPr>
+          </a:p>
+          <a:p>
+            <a:pPr marL="457200" indent="0">
+              <a:lnSpc>
+                <a:spcPct val="120000"/>
+              </a:lnSpc>
+              <a:spcBef>
+                <a:spcPts val="500"/>
+              </a:spcBef>
+              <a:buNone/>
+            </a:pPr>
+            <a:r>
+              <a:rPr lang="en-US" sz="2000" b="1">
+                <a:solidFill>
+                  <a:srgbClr val="000000"/>
+                </a:solidFill>
+              </a:rPr>
+              <a:t>Slack Workspace Invitation</a:t>
+            </a:r>
+          </a:p>
+          <a:p>
+            <a:pPr marL="457200" indent="0">
+              <a:lnSpc>
+                <a:spcPct val="120000"/>
+              </a:lnSpc>
+              <a:spcBef>
+                <a:spcPts val="500"/>
+              </a:spcBef>
+              <a:buNone/>
+            </a:pPr>
+            <a:r>
+              <a:rPr lang="en-US" sz="1800">
+                <a:solidFill>
+                  <a:srgbClr val="000000"/>
+                </a:solidFill>
+              </a:rPr>
+              <a:t>Here is the invite link for our Slack workspace:</a:t>
+            </a:r>
+          </a:p>
+          <a:p>
+            <a:pPr marL="457200" indent="0">
+              <a:lnSpc>
+                <a:spcPct val="120000"/>
+              </a:lnSpc>
+              <a:spcBef>
+                <a:spcPts val="500"/>
+              </a:spcBef>
+              <a:buNone/>
+            </a:pPr>
+            <a:r>
+              <a:rPr lang="en-US" sz="1800">
+                <a:solidFill>
+                  <a:srgbClr val="000000"/>
+                </a:solidFill>
+              </a:rPr>
+              <a:t>	https://join.slack.com/t/summer24-workspace/shared_invite/... </a:t>
+            </a:r>
+          </a:p>
+          <a:p>
+            <a:pPr marL="914400" lvl="1" indent="0">
+              <a:lnSpc>
+                <a:spcPct val="120000"/>
+              </a:lnSpc>
+              <a:buNone/>
+            </a:pPr>
+            <a:r>
+              <a:rPr lang="en-US" sz="1600">
+                <a:solidFill>
+                  <a:srgbClr val="000000"/>
+                </a:solidFill>
+              </a:rPr>
+              <a:t>You can download Slack for Windows here: https://slack.com/downloads/windows</a:t>
+            </a:r>
+            <a:br>
+              <a:rPr lang="en-US" sz="1600">
+                <a:solidFill>
+                  <a:srgbClr val="000000"/>
+                </a:solidFill>
+              </a:rPr>
+            </a:br>
+            <a:r>
+              <a:rPr lang="en-US" sz="1600">
+                <a:solidFill>
+                  <a:srgbClr val="000000"/>
+                </a:solidFill>
+              </a:rPr>
+              <a:t>You can download Slack for Mac here: https://slack.com/downloads/mac </a:t>
+            </a:r>
+            <a:br>
+              <a:rPr lang="en-US" sz="1600">
+                <a:solidFill>
+                  <a:srgbClr val="000000"/>
+                </a:solidFill>
+              </a:rPr>
+            </a:br>
+            <a:r>
+              <a:rPr lang="en-US" sz="1600">
+                <a:solidFill>
+                  <a:srgbClr val="000000"/>
+                </a:solidFill>
+              </a:rPr>
+              <a:t>There is also a Slack app for iOS and Android devices.</a:t>
+            </a:r>
+          </a:p>
+          <a:p>
+            <a:pPr marL="457200" indent="0">
+              <a:lnSpc>
+                <a:spcPct val="120000"/>
+              </a:lnSpc>
+              <a:spcBef>
+                <a:spcPts val="500"/>
+              </a:spcBef>
+              <a:buNone/>
+            </a:pPr>
+            <a:r>
+              <a:rPr lang="en-US" sz="1800">
+                <a:solidFill>
+                  <a:srgbClr val="000000"/>
+                </a:solidFill>
+              </a:rPr>
+              <a:t>If you haven't used Slack before, each workspace contains channels for discussion topics.</a:t>
+            </a:r>
+          </a:p>
+          <a:p>
+            <a:pPr marL="914400" indent="-457200">
+              <a:lnSpc>
+                <a:spcPct val="120000"/>
+              </a:lnSpc>
+              <a:spcBef>
+                <a:spcPts val="500"/>
+              </a:spcBef>
+            </a:pPr>
+            <a:r>
+              <a:rPr lang="en-US" sz="1800">
+                <a:solidFill>
+                  <a:srgbClr val="000000"/>
+                </a:solidFill>
+              </a:rPr>
+              <a:t>The workspace has a dedicated channel for this course: #cop3330c</a:t>
+            </a:r>
+          </a:p>
+          <a:p>
+            <a:pPr marL="914400" indent="-457200">
+              <a:lnSpc>
+                <a:spcPct val="120000"/>
+              </a:lnSpc>
+              <a:spcBef>
+                <a:spcPts val="500"/>
+              </a:spcBef>
+            </a:pPr>
+            <a:r>
+              <a:rPr lang="en-US" sz="1800">
+                <a:solidFill>
+                  <a:srgbClr val="000000"/>
+                </a:solidFill>
+              </a:rPr>
+              <a:t>We also have a #general channel for general IT questions and discussions. This channel is shared among many other courses that are running this semester.</a:t>
+            </a:r>
+          </a:p>
+          <a:p>
+            <a:pPr marL="914400" indent="-457200">
+              <a:lnSpc>
+                <a:spcPct val="120000"/>
+              </a:lnSpc>
+              <a:spcBef>
+                <a:spcPts val="500"/>
+              </a:spcBef>
+            </a:pPr>
+            <a:r>
+              <a:rPr lang="en-US" sz="1800">
+                <a:solidFill>
+                  <a:srgbClr val="000000"/>
+                </a:solidFill>
+              </a:rPr>
+              <a:t>The #random channel is for fun stuff: technology memes, personal/job announcements, etc. that you would like to share with the class.</a:t>
+            </a:r>
+          </a:p>
+          <a:p>
+            <a:pPr marL="457200" indent="0">
+              <a:lnSpc>
+                <a:spcPct val="120000"/>
+              </a:lnSpc>
+              <a:spcBef>
+                <a:spcPts val="500"/>
+              </a:spcBef>
+              <a:buNone/>
+            </a:pPr>
+            <a:r>
+              <a:rPr lang="en-US" sz="1800" b="1">
+                <a:solidFill>
+                  <a:srgbClr val="000000"/>
+                </a:solidFill>
+              </a:rPr>
+              <a:t>All Slack posts must remain family-friendly. Be respectful. Do not DM without consent from the recipient. Do not share code solutions for course assignments before the due date, but feel free to share ideas, hints, and algorithms.</a:t>
+            </a:r>
+          </a:p>
+        </p:txBody>
+      </p:sp>
+    </p:spTree>
+    <p:extLst>
+      <p:ext uri="{BB962C8B-B14F-4D97-AF65-F5344CB8AC3E}">
+        <p14:creationId xmlns:p14="http://schemas.microsoft.com/office/powerpoint/2010/main" val="178654159"/>
+      </p:ext>
+    </p:extLst>
+  </p:cSld>
+  <p:clrMapOvr>
+    <a:masterClrMapping/>
+  </p:clrMapOvr>
+</p:sld>
+</file>
+
+<file path=ppt/slides/slide11.xml><?xml version="1.0" encoding="utf-8"?>
+<p:sld xmlns:a="http://schemas.openxmlformats.org/drawingml/2006/main" xmlns:r="http://schemas.openxmlformats.org/officeDocument/2006/relationships" xmlns:p="http://schemas.openxmlformats.org/presentationml/2006/main">
+  <p:cSld>
+    <p:spTree>
+      <p:nvGrpSpPr>
+        <p:cNvPr id="1" name=""/>
+        <p:cNvGrpSpPr/>
+        <p:nvPr/>
+      </p:nvGrpSpPr>
+      <p:grpSpPr>
+        <a:xfrm>
+          <a:off x="0" y="0"/>
+          <a:ext cx="0" cy="0"/>
+          <a:chOff x="0" y="0"/>
+          <a:chExt cx="0" cy="0"/>
+        </a:xfrm>
+      </p:grpSpPr>
+      <p:sp>
+        <p:nvSpPr>
+          <p:cNvPr id="2" name="Title 1">
+            <a:extLst>
+              <a:ext uri="{FF2B5EF4-FFF2-40B4-BE49-F238E27FC236}">
+                <a16:creationId xmlns:a16="http://schemas.microsoft.com/office/drawing/2014/main" id="{1193C801-427D-4761-B139-63C3D71F6842}"/>
+              </a:ext>
+            </a:extLst>
+          </p:cNvPr>
+          <p:cNvSpPr>
+            <a:spLocks noGrp="1"/>
+          </p:cNvSpPr>
+          <p:nvPr>
+            <p:ph type="title"/>
+          </p:nvPr>
+        </p:nvSpPr>
+        <p:spPr>
+          <a:xfrm>
+            <a:off x="838200" y="290652"/>
+            <a:ext cx="10941908" cy="780769"/>
+          </a:xfrm>
+        </p:spPr>
+        <p:txBody>
+          <a:bodyPr/>
+          <a:lstStyle/>
+          <a:p>
+            <a:r>
+              <a:rPr lang="en-US"/>
+              <a:t>Student Experience (Kate Araya)</a:t>
+            </a:r>
+          </a:p>
+        </p:txBody>
+      </p:sp>
+      <p:sp>
+        <p:nvSpPr>
+          <p:cNvPr id="3" name="Content Placeholder 2">
+            <a:extLst>
+              <a:ext uri="{FF2B5EF4-FFF2-40B4-BE49-F238E27FC236}">
+                <a16:creationId xmlns:a16="http://schemas.microsoft.com/office/drawing/2014/main" id="{8105E254-772A-4AB1-8230-33418D800ECD}"/>
+              </a:ext>
+            </a:extLst>
+          </p:cNvPr>
+          <p:cNvSpPr>
+            <a:spLocks noGrp="1"/>
+          </p:cNvSpPr>
+          <p:nvPr>
+            <p:ph idx="1"/>
+          </p:nvPr>
+        </p:nvSpPr>
+        <p:spPr>
+          <a:xfrm>
+            <a:off x="838200" y="1071421"/>
+            <a:ext cx="10515600" cy="4851584"/>
+          </a:xfrm>
+        </p:spPr>
+        <p:txBody>
+          <a:bodyPr>
+            <a:normAutofit/>
+          </a:bodyPr>
+          <a:lstStyle/>
+          <a:p>
+            <a:pPr marL="169863" indent="-169863">
+              <a:lnSpc>
+                <a:spcPct val="120000"/>
+              </a:lnSpc>
+              <a:spcBef>
+                <a:spcPts val="500"/>
+              </a:spcBef>
+            </a:pPr>
+            <a:endParaRPr lang="en-US" sz="1800" b="1">
+              <a:solidFill>
+                <a:srgbClr val="000000"/>
+              </a:solidFill>
+            </a:endParaRPr>
+          </a:p>
+        </p:txBody>
+      </p:sp>
+    </p:spTree>
+    <p:extLst>
+      <p:ext uri="{BB962C8B-B14F-4D97-AF65-F5344CB8AC3E}">
+        <p14:creationId xmlns:p14="http://schemas.microsoft.com/office/powerpoint/2010/main" val="3558463562"/>
+      </p:ext>
+    </p:extLst>
+  </p:cSld>
+  <p:clrMapOvr>
+    <a:masterClrMapping/>
+  </p:clrMapOvr>
+</p:sld>
+</file>
+
+<file path=ppt/slides/slide12.xml><?xml version="1.0" encoding="utf-8"?>
+<p:sld xmlns:a="http://schemas.openxmlformats.org/drawingml/2006/main" xmlns:r="http://schemas.openxmlformats.org/officeDocument/2006/relationships" xmlns:p="http://schemas.openxmlformats.org/presentationml/2006/main">
+  <p:cSld>
+    <p:spTree>
+      <p:nvGrpSpPr>
+        <p:cNvPr id="1" name=""/>
+        <p:cNvGrpSpPr/>
+        <p:nvPr/>
+      </p:nvGrpSpPr>
+      <p:grpSpPr>
+        <a:xfrm>
+          <a:off x="0" y="0"/>
+          <a:ext cx="0" cy="0"/>
+          <a:chOff x="0" y="0"/>
+          <a:chExt cx="0" cy="0"/>
+        </a:xfrm>
+      </p:grpSpPr>
+      <p:sp>
+        <p:nvSpPr>
+          <p:cNvPr id="2" name="Title 1">
+            <a:extLst>
+              <a:ext uri="{FF2B5EF4-FFF2-40B4-BE49-F238E27FC236}">
+                <a16:creationId xmlns:a16="http://schemas.microsoft.com/office/drawing/2014/main" id="{1193C801-427D-4761-B139-63C3D71F6842}"/>
+              </a:ext>
+            </a:extLst>
+          </p:cNvPr>
+          <p:cNvSpPr>
+            <a:spLocks noGrp="1"/>
+          </p:cNvSpPr>
+          <p:nvPr>
+            <p:ph type="title"/>
+          </p:nvPr>
+        </p:nvSpPr>
+        <p:spPr>
+          <a:xfrm>
+            <a:off x="838200" y="290652"/>
+            <a:ext cx="10941908" cy="780769"/>
+          </a:xfrm>
+        </p:spPr>
+        <p:txBody>
+          <a:bodyPr/>
+          <a:lstStyle/>
+          <a:p>
+            <a:r>
+              <a:rPr lang="en-US"/>
+              <a:t>Student Experience (Steven Gsell)</a:t>
+            </a:r>
+          </a:p>
+        </p:txBody>
+      </p:sp>
+      <p:sp>
+        <p:nvSpPr>
+          <p:cNvPr id="3" name="Content Placeholder 2">
+            <a:extLst>
+              <a:ext uri="{FF2B5EF4-FFF2-40B4-BE49-F238E27FC236}">
+                <a16:creationId xmlns:a16="http://schemas.microsoft.com/office/drawing/2014/main" id="{8105E254-772A-4AB1-8230-33418D800ECD}"/>
+              </a:ext>
+            </a:extLst>
+          </p:cNvPr>
+          <p:cNvSpPr>
+            <a:spLocks noGrp="1"/>
+          </p:cNvSpPr>
+          <p:nvPr>
+            <p:ph idx="1"/>
+          </p:nvPr>
+        </p:nvSpPr>
+        <p:spPr>
+          <a:xfrm>
+            <a:off x="838200" y="1071421"/>
+            <a:ext cx="10515600" cy="4851584"/>
+          </a:xfrm>
+        </p:spPr>
+        <p:txBody>
+          <a:bodyPr>
+            <a:normAutofit/>
+          </a:bodyPr>
+          <a:lstStyle/>
+          <a:p>
+            <a:pPr marL="169863" indent="-169863">
+              <a:lnSpc>
+                <a:spcPct val="120000"/>
+              </a:lnSpc>
+              <a:spcBef>
+                <a:spcPts val="500"/>
+              </a:spcBef>
+            </a:pPr>
+            <a:endParaRPr lang="en-US" sz="1800" b="1">
+              <a:solidFill>
+                <a:srgbClr val="000000"/>
+              </a:solidFill>
+            </a:endParaRPr>
+          </a:p>
+        </p:txBody>
+      </p:sp>
+    </p:spTree>
+    <p:extLst>
+      <p:ext uri="{BB962C8B-B14F-4D97-AF65-F5344CB8AC3E}">
+        <p14:creationId xmlns:p14="http://schemas.microsoft.com/office/powerpoint/2010/main" val="928223919"/>
+      </p:ext>
+    </p:extLst>
+  </p:cSld>
+  <p:clrMapOvr>
+    <a:masterClrMapping/>
+  </p:clrMapOvr>
+</p:sld>
+</file>
+
+<file path=ppt/slides/slide13.xml><?xml version="1.0" encoding="utf-8"?>
+<p:sld xmlns:a="http://schemas.openxmlformats.org/drawingml/2006/main" xmlns:r="http://schemas.openxmlformats.org/officeDocument/2006/relationships" xmlns:p="http://schemas.openxmlformats.org/presentationml/2006/main">
+  <p:cSld>
+    <p:spTree>
+      <p:nvGrpSpPr>
+        <p:cNvPr id="1" name=""/>
+        <p:cNvGrpSpPr/>
+        <p:nvPr/>
+      </p:nvGrpSpPr>
+      <p:grpSpPr>
+        <a:xfrm>
+          <a:off x="0" y="0"/>
+          <a:ext cx="0" cy="0"/>
+          <a:chOff x="0" y="0"/>
+          <a:chExt cx="0" cy="0"/>
+        </a:xfrm>
+      </p:grpSpPr>
+      <p:pic>
+        <p:nvPicPr>
+          <p:cNvPr id="5" name="Content Placeholder 4">
+            <a:extLst>
+              <a:ext uri="{FF2B5EF4-FFF2-40B4-BE49-F238E27FC236}">
+                <a16:creationId xmlns:a16="http://schemas.microsoft.com/office/drawing/2014/main" id="{075A8137-7C75-A9F5-529F-4D6C410FDC24}"/>
+              </a:ext>
+            </a:extLst>
+          </p:cNvPr>
+          <p:cNvPicPr>
+            <a:picLocks noGrp="1" noChangeAspect="1"/>
+          </p:cNvPicPr>
+          <p:nvPr>
+            <p:ph idx="1"/>
+          </p:nvPr>
+        </p:nvPicPr>
+        <p:blipFill>
+          <a:blip r:embed="rId3"/>
+          <a:stretch>
+            <a:fillRect/>
+          </a:stretch>
+        </p:blipFill>
+        <p:spPr>
+          <a:xfrm>
+            <a:off x="954072" y="1017201"/>
+            <a:ext cx="10283856" cy="2678819"/>
+          </a:xfrm>
+        </p:spPr>
+      </p:pic>
+    </p:spTree>
+    <p:extLst>
+      <p:ext uri="{BB962C8B-B14F-4D97-AF65-F5344CB8AC3E}">
+        <p14:creationId xmlns:p14="http://schemas.microsoft.com/office/powerpoint/2010/main" val="593074532"/>
       </p:ext>
     </p:extLst>
   </p:cSld>
@@ -3452,8 +4050,8 @@
         </p:nvSpPr>
         <p:spPr>
           <a:xfrm>
-            <a:off x="838200" y="1307939"/>
-            <a:ext cx="10515600" cy="4615066"/>
+            <a:off x="838200" y="1145059"/>
+            <a:ext cx="10515600" cy="4777946"/>
           </a:xfrm>
         </p:spPr>
         <p:txBody>
@@ -3495,7 +4093,7 @@
             <a:pPr lvl="1"/>
             <a:r>
               <a:rPr lang="en-US"/>
-              <a:t>Office 365 (including SharePoint Online)</a:t>
+              <a:t>Office 365 (Microsoft Teams, SharePoint)</a:t>
             </a:r>
           </a:p>
           <a:p>
@@ -3510,6 +4108,13 @@
             <a:r>
               <a:rPr lang="en-US"/>
               <a:t>Google Workspace</a:t>
+            </a:r>
+          </a:p>
+          <a:p>
+            <a:pPr lvl="1"/>
+            <a:r>
+              <a:rPr lang="en-US"/>
+              <a:t>WebEx</a:t>
             </a:r>
           </a:p>
           <a:p>
@@ -3615,13 +4220,13 @@
         </p:nvSpPr>
         <p:spPr>
           <a:xfrm>
-            <a:off x="838200" y="1307939"/>
-            <a:ext cx="10515600" cy="4615066"/>
+            <a:off x="838200" y="1071421"/>
+            <a:ext cx="10515600" cy="4851584"/>
           </a:xfrm>
         </p:spPr>
         <p:txBody>
           <a:bodyPr>
-            <a:normAutofit fontScale="85000" lnSpcReduction="10000"/>
+            <a:normAutofit fontScale="92500" lnSpcReduction="20000"/>
           </a:bodyPr>
           <a:lstStyle/>
           <a:p>
@@ -3744,8 +4349,8 @@
         </p:nvSpPr>
         <p:spPr>
           <a:xfrm>
-            <a:off x="838200" y="1307939"/>
-            <a:ext cx="10515600" cy="4615066"/>
+            <a:off x="838200" y="1071421"/>
+            <a:ext cx="10515600" cy="4851584"/>
           </a:xfrm>
         </p:spPr>
         <p:txBody>
@@ -3778,7 +4383,12 @@
               <a:rPr lang="en-US" sz="2800"/>
               <a:t>eatures like channel organization, search functionality, and customizability</a:t>
             </a:r>
-            <a:endParaRPr lang="en-US"/>
+          </a:p>
+          <a:p>
+            <a:r>
+              <a:rPr lang="en-US"/>
+              <a:t>Real-time collaboration (huddles)</a:t>
+            </a:r>
           </a:p>
         </p:txBody>
       </p:sp>
@@ -3840,7 +4450,7 @@
           <a:p>
             <a:r>
               <a:rPr lang="en-US"/>
-              <a:t>Shared Undergraduate Workspace Advantages</a:t>
+              <a:t>Shared Undergraduate Workspace</a:t>
             </a:r>
           </a:p>
         </p:txBody>
@@ -3863,25 +4473,25 @@
         </p:nvSpPr>
         <p:spPr>
           <a:xfrm>
-            <a:off x="838200" y="1307939"/>
-            <a:ext cx="10515600" cy="4615066"/>
+            <a:off x="838200" y="1071421"/>
+            <a:ext cx="10515600" cy="4851584"/>
           </a:xfrm>
         </p:spPr>
         <p:txBody>
           <a:bodyPr>
-            <a:normAutofit fontScale="77500" lnSpcReduction="20000"/>
+            <a:normAutofit fontScale="85000" lnSpcReduction="20000"/>
           </a:bodyPr>
           <a:lstStyle/>
           <a:p>
             <a:r>
               <a:rPr lang="en-US"/>
-              <a:t>Centralized Communication: consolidates communication channels for all courses, making it easier for students to stay informed about announcements, assignments, and deadlines.</a:t>
-            </a:r>
-          </a:p>
-          <a:p>
-            <a:r>
-              <a:rPr lang="en-US"/>
-              <a:t>Collaboration Opportunities: collaboration across courses on interdisciplinary projects, share resources, and coursework.</a:t>
+              <a:t>Centralized communication: consolidates communication channels for all courses, making it easier for students to stay informed about announcements, assignments, and deadlines.</a:t>
+            </a:r>
+          </a:p>
+          <a:p>
+            <a:r>
+              <a:rPr lang="en-US"/>
+              <a:t>Collaboration opportunities: collaboration across courses on interdisciplinary projects, share resources, and coursework.</a:t>
             </a:r>
           </a:p>
           <a:p>
@@ -3893,19 +4503,19 @@
           <a:p>
             <a:r>
               <a:rPr lang="en-US"/>
-              <a:t>Resource Sharing: sharing of relevant resources such as articles, tutorials, and tools across multiple courses, enriching the learning material available to everyone.</a:t>
-            </a:r>
-          </a:p>
-          <a:p>
-            <a:r>
-              <a:rPr lang="en-US"/>
-              <a:t>Real-Time Support: real-time support from instructors and peers, which can be particularly beneficial for addressing questions and issues promptly.</a:t>
-            </a:r>
-          </a:p>
-          <a:p>
-            <a:r>
-              <a:rPr lang="en-US"/>
-              <a:t>Community Building: helps build a sense of community among students and instructors, encouraging engagement and participation beyond the confines of individual courses.</a:t>
+              <a:t>Resource sharing: sharing of relevant resources such as articles, tutorials, and tools across multiple courses, enriching the learning material available to everyone.</a:t>
+            </a:r>
+          </a:p>
+          <a:p>
+            <a:r>
+              <a:rPr lang="en-US"/>
+              <a:t>Real-Time support: real-time support from instructors and peers, which can be particularly beneficial for addressing questions and issues promptly.</a:t>
+            </a:r>
+          </a:p>
+          <a:p>
+            <a:r>
+              <a:rPr lang="en-US"/>
+              <a:t>Community building: helps build a sense of community among students and instructors, encouraging engagement and participation beyond the confines of individual courses.</a:t>
             </a:r>
           </a:p>
         </p:txBody>
@@ -3968,7 +4578,7 @@
           <a:p>
             <a:r>
               <a:rPr lang="en-US"/>
-              <a:t>Shared Undergraduate Workspace Advantages</a:t>
+              <a:t>Shared Undergraduate Workspace</a:t>
             </a:r>
           </a:p>
         </p:txBody>
@@ -3991,49 +4601,49 @@
         </p:nvSpPr>
         <p:spPr>
           <a:xfrm>
-            <a:off x="838200" y="1307939"/>
-            <a:ext cx="10515600" cy="4615066"/>
+            <a:off x="838200" y="1071421"/>
+            <a:ext cx="10515600" cy="4851584"/>
           </a:xfrm>
         </p:spPr>
         <p:txBody>
           <a:bodyPr>
-            <a:normAutofit fontScale="77500" lnSpcReduction="20000"/>
+            <a:normAutofit fontScale="85000" lnSpcReduction="20000"/>
           </a:bodyPr>
           <a:lstStyle/>
           <a:p>
             <a:r>
               <a:rPr lang="en-US"/>
-              <a:t>Cross-Course Announcements: announcements reach all students across different courses simultaneously, ensuring important information is disseminated quickly and efficiently.</a:t>
-            </a:r>
-          </a:p>
-          <a:p>
-            <a:r>
-              <a:rPr lang="en-US"/>
-              <a:t>Facilitating Mentorship: senior students or those who have taken certain courses can mentor juniors, providing guidance and sharing their experiences, which can be very beneficial for newcomers.</a:t>
-            </a:r>
-          </a:p>
-          <a:p>
-            <a:r>
-              <a:rPr lang="en-US"/>
-              <a:t>Integrated Tools and Apps: integrations with various tools (e.g., GitHub, Trello, Google Drive) can streamline project management and collaborative tasks across courses, enhancing productivity and learning.</a:t>
-            </a:r>
-          </a:p>
-          <a:p>
-            <a:r>
-              <a:rPr lang="en-US"/>
-              <a:t>Enhanced Learning Experience: informal communication style can make students feel more comfortable asking questions and participating in discussions, leading to a more engaging and interactive learning experience.</a:t>
-            </a:r>
-          </a:p>
-          <a:p>
-            <a:r>
-              <a:rPr lang="en-US"/>
-              <a:t>Feedback and Improvement: Instructors gather feedback from students about the courses in real-time, allowing for continuous improvement based on student input.</a:t>
-            </a:r>
-          </a:p>
-          <a:p>
-            <a:r>
-              <a:rPr lang="en-US"/>
-              <a:t>Event Coordination: Organizing events, such as hackathons, guest lectures, or study sessions, becomes easier.</a:t>
+              <a:t>Cross-course announcements: announcements reach all students across different courses simultaneously, ensuring important information is disseminated quickly and efficiently.</a:t>
+            </a:r>
+          </a:p>
+          <a:p>
+            <a:r>
+              <a:rPr lang="en-US"/>
+              <a:t>Facilitating mentorship: senior students or those who have taken certain courses can mentor juniors, providing guidance and sharing their experiences, which can be very beneficial for newcomers.</a:t>
+            </a:r>
+          </a:p>
+          <a:p>
+            <a:r>
+              <a:rPr lang="en-US"/>
+              <a:t>Integrated tools and apps: integrations (e.g., GitHub, Trello, Google Drive) can streamline project management and collaborative tasks across courses, enhancing productivity and learning.</a:t>
+            </a:r>
+          </a:p>
+          <a:p>
+            <a:r>
+              <a:rPr lang="en-US"/>
+              <a:t>Enhanced learning experience: informal communication style can make students feel more comfortable asking questions and participating in discussions, leading to a more engaging and interactive learning experience.</a:t>
+            </a:r>
+          </a:p>
+          <a:p>
+            <a:r>
+              <a:rPr lang="en-US"/>
+              <a:t>Feedback and improvement: feedback from students about the courses in real-time, allowing for continuous improvement based on student input.</a:t>
+            </a:r>
+          </a:p>
+          <a:p>
+            <a:r>
+              <a:rPr lang="en-US"/>
+              <a:t>Event coordination: organize events, such as hackathons, guest lectures, or study sessions, becomes easier.</a:t>
             </a:r>
           </a:p>
         </p:txBody>
@@ -4068,39 +4678,363 @@
           <a:chExt cx="0" cy="0"/>
         </a:xfrm>
       </p:grpSpPr>
-      <p:pic>
-        <p:nvPicPr>
-          <p:cNvPr id="5" name="Content Placeholder 4">
+      <p:sp>
+        <p:nvSpPr>
+          <p:cNvPr id="2" name="Title 1">
             <a:extLst>
               <a:ext uri="{FF2B5EF4-FFF2-40B4-BE49-F238E27FC236}">
-                <a16:creationId xmlns:a16="http://schemas.microsoft.com/office/drawing/2014/main" id="{075A8137-7C75-A9F5-529F-4D6C410FDC24}"/>
+                <a16:creationId xmlns:a16="http://schemas.microsoft.com/office/drawing/2014/main" id="{1193C801-427D-4761-B139-63C3D71F6842}"/>
               </a:ext>
             </a:extLst>
           </p:cNvPr>
-          <p:cNvPicPr>
-            <a:picLocks noGrp="1" noChangeAspect="1"/>
-          </p:cNvPicPr>
+          <p:cNvSpPr>
+            <a:spLocks noGrp="1"/>
+          </p:cNvSpPr>
+          <p:nvPr>
+            <p:ph type="title"/>
+          </p:nvPr>
+        </p:nvSpPr>
+        <p:spPr>
+          <a:xfrm>
+            <a:off x="838200" y="290652"/>
+            <a:ext cx="10941908" cy="780769"/>
+          </a:xfrm>
+        </p:spPr>
+        <p:txBody>
+          <a:bodyPr/>
+          <a:lstStyle/>
+          <a:p>
+            <a:r>
+              <a:rPr lang="en-US"/>
+              <a:t>Organizing the Workspace</a:t>
+            </a:r>
+          </a:p>
+        </p:txBody>
+      </p:sp>
+      <p:sp>
+        <p:nvSpPr>
+          <p:cNvPr id="3" name="Content Placeholder 2">
+            <a:extLst>
+              <a:ext uri="{FF2B5EF4-FFF2-40B4-BE49-F238E27FC236}">
+                <a16:creationId xmlns:a16="http://schemas.microsoft.com/office/drawing/2014/main" id="{8105E254-772A-4AB1-8230-33418D800ECD}"/>
+              </a:ext>
+            </a:extLst>
+          </p:cNvPr>
+          <p:cNvSpPr>
+            <a:spLocks noGrp="1"/>
+          </p:cNvSpPr>
           <p:nvPr>
             <p:ph idx="1"/>
           </p:nvPr>
-        </p:nvPicPr>
-        <p:blipFill>
-          <a:blip r:embed="rId3"/>
-          <a:stretch>
-            <a:fillRect/>
-          </a:stretch>
-        </p:blipFill>
-        <p:spPr>
-          <a:xfrm>
-            <a:off x="954072" y="1017201"/>
-            <a:ext cx="10283856" cy="2678819"/>
-          </a:xfrm>
-        </p:spPr>
-      </p:pic>
+        </p:nvSpPr>
+        <p:spPr>
+          <a:xfrm>
+            <a:off x="838200" y="1202724"/>
+            <a:ext cx="10515600" cy="4720281"/>
+          </a:xfrm>
+        </p:spPr>
+        <p:txBody>
+          <a:bodyPr>
+            <a:normAutofit fontScale="92500" lnSpcReduction="10000"/>
+          </a:bodyPr>
+          <a:lstStyle/>
+          <a:p>
+            <a:r>
+              <a:rPr lang="en-US" sz="2600"/>
+              <a:t>Dedicated workspaces for individual courses ("v1")</a:t>
+            </a:r>
+          </a:p>
+          <a:p>
+            <a:r>
+              <a:rPr lang="en-US" sz="2600"/>
+              <a:t>Shared workspace per semester ("v2"), one channel per course e.g.,</a:t>
+            </a:r>
+          </a:p>
+          <a:p>
+            <a:pPr marL="461963" indent="0">
+              <a:buNone/>
+            </a:pPr>
+            <a:r>
+              <a:rPr lang="en-US" b="1"/>
+              <a:t>Summer 2024</a:t>
+            </a:r>
+          </a:p>
+          <a:p>
+            <a:pPr marL="914400" indent="0">
+              <a:buNone/>
+            </a:pPr>
+            <a:r>
+              <a:rPr lang="en-US"/>
+              <a:t># general - all students are members; shared general content</a:t>
+            </a:r>
+          </a:p>
+          <a:p>
+            <a:pPr marL="914400" indent="0">
+              <a:buNone/>
+            </a:pPr>
+            <a:r>
+              <a:rPr lang="en-US"/>
+              <a:t># random - all students are members; "fun" content (memes)</a:t>
+            </a:r>
+          </a:p>
+          <a:p>
+            <a:pPr marL="914400" indent="0">
+              <a:buNone/>
+            </a:pPr>
+            <a:r>
+              <a:rPr lang="en-US"/>
+              <a:t># COP2800C - course-specific channel, restricted membership</a:t>
+            </a:r>
+          </a:p>
+          <a:p>
+            <a:pPr marL="914400" indent="0">
+              <a:buNone/>
+            </a:pPr>
+            <a:r>
+              <a:rPr lang="en-US"/>
+              <a:t># CEN3330C - course-specific channel, restricted membership</a:t>
+            </a:r>
+          </a:p>
+          <a:p>
+            <a:pPr marL="914400" indent="0">
+              <a:buNone/>
+            </a:pPr>
+            <a:r>
+              <a:rPr lang="en-US"/>
+              <a:t># CEN4025C  - course-specific channel, restricted membership</a:t>
+            </a:r>
+          </a:p>
+          <a:p>
+            <a:pPr marL="914400" indent="0">
+              <a:buNone/>
+            </a:pPr>
+            <a:r>
+              <a:rPr lang="en-US"/>
+              <a:t>...</a:t>
+            </a:r>
+          </a:p>
+          <a:p>
+            <a:r>
+              <a:rPr lang="en-US" sz="2600"/>
+              <a:t>NOTE: some lower-level courses are excluded from shared workspaces to avoid distractions for first-time college students</a:t>
+            </a:r>
+          </a:p>
+          <a:p>
+            <a:endParaRPr lang="en-US"/>
+          </a:p>
+          <a:p>
+            <a:endParaRPr lang="en-US"/>
+          </a:p>
+        </p:txBody>
+      </p:sp>
     </p:spTree>
     <p:extLst>
       <p:ext uri="{BB962C8B-B14F-4D97-AF65-F5344CB8AC3E}">
-        <p14:creationId xmlns:p14="http://schemas.microsoft.com/office/powerpoint/2010/main" val="593074532"/>
+        <p14:creationId xmlns:p14="http://schemas.microsoft.com/office/powerpoint/2010/main" val="922338911"/>
+      </p:ext>
+    </p:extLst>
+  </p:cSld>
+  <p:clrMapOvr>
+    <a:masterClrMapping/>
+  </p:clrMapOvr>
+</p:sld>
+</file>
+
+<file path=ppt/slides/slide9.xml><?xml version="1.0" encoding="utf-8"?>
+<p:sld xmlns:a="http://schemas.openxmlformats.org/drawingml/2006/main" xmlns:r="http://schemas.openxmlformats.org/officeDocument/2006/relationships" xmlns:p="http://schemas.openxmlformats.org/presentationml/2006/main">
+  <p:cSld>
+    <p:spTree>
+      <p:nvGrpSpPr>
+        <p:cNvPr id="1" name=""/>
+        <p:cNvGrpSpPr/>
+        <p:nvPr/>
+      </p:nvGrpSpPr>
+      <p:grpSpPr>
+        <a:xfrm>
+          <a:off x="0" y="0"/>
+          <a:ext cx="0" cy="0"/>
+          <a:chOff x="0" y="0"/>
+          <a:chExt cx="0" cy="0"/>
+        </a:xfrm>
+      </p:grpSpPr>
+      <p:sp>
+        <p:nvSpPr>
+          <p:cNvPr id="2" name="Title 1">
+            <a:extLst>
+              <a:ext uri="{FF2B5EF4-FFF2-40B4-BE49-F238E27FC236}">
+                <a16:creationId xmlns:a16="http://schemas.microsoft.com/office/drawing/2014/main" id="{1193C801-427D-4761-B139-63C3D71F6842}"/>
+              </a:ext>
+            </a:extLst>
+          </p:cNvPr>
+          <p:cNvSpPr>
+            <a:spLocks noGrp="1"/>
+          </p:cNvSpPr>
+          <p:nvPr>
+            <p:ph type="title"/>
+          </p:nvPr>
+        </p:nvSpPr>
+        <p:spPr>
+          <a:xfrm>
+            <a:off x="838200" y="290652"/>
+            <a:ext cx="10941908" cy="780769"/>
+          </a:xfrm>
+        </p:spPr>
+        <p:txBody>
+          <a:bodyPr/>
+          <a:lstStyle/>
+          <a:p>
+            <a:r>
+              <a:rPr lang="en-US"/>
+              <a:t>Administering the Workspace</a:t>
+            </a:r>
+          </a:p>
+        </p:txBody>
+      </p:sp>
+      <p:sp>
+        <p:nvSpPr>
+          <p:cNvPr id="3" name="Content Placeholder 2">
+            <a:extLst>
+              <a:ext uri="{FF2B5EF4-FFF2-40B4-BE49-F238E27FC236}">
+                <a16:creationId xmlns:a16="http://schemas.microsoft.com/office/drawing/2014/main" id="{8105E254-772A-4AB1-8230-33418D800ECD}"/>
+              </a:ext>
+            </a:extLst>
+          </p:cNvPr>
+          <p:cNvSpPr>
+            <a:spLocks noGrp="1"/>
+          </p:cNvSpPr>
+          <p:nvPr>
+            <p:ph idx="1"/>
+          </p:nvPr>
+        </p:nvSpPr>
+        <p:spPr>
+          <a:xfrm>
+            <a:off x="838200" y="1071421"/>
+            <a:ext cx="10515600" cy="4851584"/>
+          </a:xfrm>
+        </p:spPr>
+        <p:txBody>
+          <a:bodyPr>
+            <a:normAutofit/>
+          </a:bodyPr>
+          <a:lstStyle/>
+          <a:p>
+            <a:r>
+              <a:rPr lang="en-US"/>
+              <a:t>Instructors are workspace creators w/full admin rights</a:t>
+            </a:r>
+          </a:p>
+          <a:p>
+            <a:r>
+              <a:rPr lang="en-US"/>
+              <a:t>Can delete posts if necessary</a:t>
+            </a:r>
+          </a:p>
+          <a:p>
+            <a:pPr marL="230188" indent="-225425">
+              <a:lnSpc>
+                <a:spcPct val="115000"/>
+              </a:lnSpc>
+              <a:spcBef>
+                <a:spcPts val="0"/>
+              </a:spcBef>
+            </a:pPr>
+            <a:r>
+              <a:rPr lang="en-US"/>
+              <a:t>Syllabus (Technology Requirements):</a:t>
+            </a:r>
+          </a:p>
+          <a:p>
+            <a:pPr lvl="1" indent="0">
+              <a:lnSpc>
+                <a:spcPct val="115000"/>
+              </a:lnSpc>
+              <a:spcBef>
+                <a:spcPts val="0"/>
+              </a:spcBef>
+              <a:buNone/>
+            </a:pPr>
+            <a:r>
+              <a:rPr lang="en-US" b="1">
+                <a:solidFill>
+                  <a:srgbClr val="000000"/>
+                </a:solidFill>
+                <a:effectLst/>
+                <a:latin typeface="Calibri" panose="020F0502020204030204" pitchFamily="34" charset="0"/>
+                <a:ea typeface="Calibri" panose="020F0502020204030204" pitchFamily="34" charset="0"/>
+                <a:cs typeface="Times New Roman" panose="02020603050405020304" pitchFamily="18" charset="0"/>
+              </a:rPr>
+              <a:t>Slack</a:t>
+            </a:r>
+            <a:endParaRPr lang="en-US">
+              <a:solidFill>
+                <a:srgbClr val="000000"/>
+              </a:solidFill>
+              <a:effectLst/>
+              <a:latin typeface="Calibri" panose="020F0502020204030204" pitchFamily="34" charset="0"/>
+              <a:ea typeface="Times New Roman" panose="02020603050405020304" pitchFamily="18" charset="0"/>
+              <a:cs typeface="Times New Roman" panose="02020603050405020304" pitchFamily="18" charset="0"/>
+            </a:endParaRPr>
+          </a:p>
+          <a:p>
+            <a:pPr lvl="1" indent="0">
+              <a:spcBef>
+                <a:spcPts val="0"/>
+              </a:spcBef>
+              <a:buNone/>
+            </a:pPr>
+            <a:r>
+              <a:rPr lang="en-US">
+                <a:solidFill>
+                  <a:srgbClr val="000000"/>
+                </a:solidFill>
+                <a:effectLst/>
+                <a:latin typeface="Calibri" panose="020F0502020204030204" pitchFamily="34" charset="0"/>
+                <a:ea typeface="Calibri" panose="020F0502020204030204" pitchFamily="34" charset="0"/>
+                <a:cs typeface="Times New Roman" panose="02020603050405020304" pitchFamily="18" charset="0"/>
+              </a:rPr>
+              <a:t>We will collaborate using Slack, an industry-standard collaboration tool. Slack is free (disregard their prompting to upgrade to the paid version, we do not use it). Instructions for joining the Slack workspace and course channel will be provided in Canvas. Slack runs on Windows and Mac (</a:t>
+            </a:r>
+            <a:r>
+              <a:rPr lang="en-US" u="sng">
+                <a:solidFill>
+                  <a:srgbClr val="000000"/>
+                </a:solidFill>
+                <a:effectLst/>
+                <a:latin typeface="Calibri" panose="020F0502020204030204" pitchFamily="34" charset="0"/>
+                <a:ea typeface="Calibri" panose="020F0502020204030204" pitchFamily="34" charset="0"/>
+                <a:cs typeface="Times New Roman" panose="02020603050405020304" pitchFamily="18" charset="0"/>
+                <a:hlinkClick r:id="rId2"/>
+              </a:rPr>
+              <a:t>https://slack.com/downloads</a:t>
+            </a:r>
+            <a:r>
+              <a:rPr lang="en-US">
+                <a:solidFill>
+                  <a:srgbClr val="000000"/>
+                </a:solidFill>
+                <a:effectLst/>
+                <a:latin typeface="Calibri" panose="020F0502020204030204" pitchFamily="34" charset="0"/>
+                <a:ea typeface="Calibri" panose="020F0502020204030204" pitchFamily="34" charset="0"/>
+                <a:cs typeface="Times New Roman" panose="02020603050405020304" pitchFamily="18" charset="0"/>
+              </a:rPr>
+              <a:t>)</a:t>
+            </a:r>
+          </a:p>
+          <a:p>
+            <a:endParaRPr lang="en-US"/>
+          </a:p>
+          <a:p>
+            <a:endParaRPr lang="en-US"/>
+          </a:p>
+          <a:p>
+            <a:endParaRPr lang="en-US"/>
+          </a:p>
+        </p:txBody>
+      </p:sp>
+    </p:spTree>
+    <p:extLst>
+      <p:ext uri="{BB962C8B-B14F-4D97-AF65-F5344CB8AC3E}">
+        <p14:creationId xmlns:p14="http://schemas.microsoft.com/office/powerpoint/2010/main" val="1878030025"/>
       </p:ext>
     </p:extLst>
   </p:cSld>

</xml_diff>

<commit_message>
Steven Gsell section added
</commit_message>
<xml_diff>
--- a/LeveragingSlackForStudentCollaboration.pptx
+++ b/LeveragingSlackForStudentCollaboration.pptx
@@ -5,7 +5,7 @@
     <p:sldMasterId id="2147483660" r:id="rId1"/>
   </p:sldMasterIdLst>
   <p:notesMasterIdLst>
-    <p:notesMasterId r:id="rId15"/>
+    <p:notesMasterId r:id="rId21"/>
   </p:notesMasterIdLst>
   <p:sldIdLst>
     <p:sldId id="309" r:id="rId2"/>
@@ -19,8 +19,14 @@
     <p:sldId id="1379" r:id="rId10"/>
     <p:sldId id="1380" r:id="rId11"/>
     <p:sldId id="1381" r:id="rId12"/>
-    <p:sldId id="1382" r:id="rId13"/>
-    <p:sldId id="1372" r:id="rId14"/>
+    <p:sldId id="1383" r:id="rId13"/>
+    <p:sldId id="1384" r:id="rId14"/>
+    <p:sldId id="1385" r:id="rId15"/>
+    <p:sldId id="1386" r:id="rId16"/>
+    <p:sldId id="1387" r:id="rId17"/>
+    <p:sldId id="1388" r:id="rId18"/>
+    <p:sldId id="1389" r:id="rId19"/>
+    <p:sldId id="1372" r:id="rId20"/>
   </p:sldIdLst>
   <p:sldSz cx="12192000" cy="6858000"/>
   <p:notesSz cx="6858000" cy="9144000"/>
@@ -127,6 +133,84 @@
 </p:presentation>
 </file>
 
+<file path=ppt/revisionInfo.xml><?xml version="1.0" encoding="utf-8"?>
+<p1510:revInfo xmlns:a="http://schemas.openxmlformats.org/drawingml/2006/main" xmlns:r="http://schemas.openxmlformats.org/officeDocument/2006/relationships" xmlns:p1510="http://schemas.microsoft.com/office/powerpoint/2015/10/main">
+  <p1510:revLst>
+    <p1510:client id="{D88466B7-03C0-4978-B1B6-A6C2E089C6A2}" v="1" dt="2024-07-08T00:23:02.830"/>
+  </p1510:revLst>
+</p1510:revInfo>
+</file>
+
+<file path=ppt/changesInfos/changesInfo1.xml><?xml version="1.0" encoding="utf-8"?>
+<pc:chgInfo xmlns:a="http://schemas.openxmlformats.org/drawingml/2006/main" xmlns:r="http://schemas.openxmlformats.org/officeDocument/2006/relationships" xmlns:ac="http://schemas.microsoft.com/office/drawing/2013/main/command" xmlns:pc="http://schemas.microsoft.com/office/powerpoint/2013/main/command">
+  <pc:docChgLst>
+    <pc:chgData name="Gsell, Steven D." userId="6e84bc59-7e38-490f-9209-f43946aa50d2" providerId="ADAL" clId="{D88466B7-03C0-4978-B1B6-A6C2E089C6A2}"/>
+    <pc:docChg chg="addSld delSld modSld">
+      <pc:chgData name="Gsell, Steven D." userId="6e84bc59-7e38-490f-9209-f43946aa50d2" providerId="ADAL" clId="{D88466B7-03C0-4978-B1B6-A6C2E089C6A2}" dt="2024-07-08T00:23:15.774" v="1" actId="2696"/>
+      <pc:docMkLst>
+        <pc:docMk/>
+      </pc:docMkLst>
+      <pc:sldChg chg="del">
+        <pc:chgData name="Gsell, Steven D." userId="6e84bc59-7e38-490f-9209-f43946aa50d2" providerId="ADAL" clId="{D88466B7-03C0-4978-B1B6-A6C2E089C6A2}" dt="2024-07-08T00:23:15.774" v="1" actId="2696"/>
+        <pc:sldMkLst>
+          <pc:docMk/>
+          <pc:sldMk cId="928223919" sldId="1382"/>
+        </pc:sldMkLst>
+      </pc:sldChg>
+      <pc:sldChg chg="add">
+        <pc:chgData name="Gsell, Steven D." userId="6e84bc59-7e38-490f-9209-f43946aa50d2" providerId="ADAL" clId="{D88466B7-03C0-4978-B1B6-A6C2E089C6A2}" dt="2024-07-08T00:23:02.822" v="0"/>
+        <pc:sldMkLst>
+          <pc:docMk/>
+          <pc:sldMk cId="985310508" sldId="1383"/>
+        </pc:sldMkLst>
+      </pc:sldChg>
+      <pc:sldChg chg="add">
+        <pc:chgData name="Gsell, Steven D." userId="6e84bc59-7e38-490f-9209-f43946aa50d2" providerId="ADAL" clId="{D88466B7-03C0-4978-B1B6-A6C2E089C6A2}" dt="2024-07-08T00:23:02.822" v="0"/>
+        <pc:sldMkLst>
+          <pc:docMk/>
+          <pc:sldMk cId="504903178" sldId="1384"/>
+        </pc:sldMkLst>
+      </pc:sldChg>
+      <pc:sldChg chg="add">
+        <pc:chgData name="Gsell, Steven D." userId="6e84bc59-7e38-490f-9209-f43946aa50d2" providerId="ADAL" clId="{D88466B7-03C0-4978-B1B6-A6C2E089C6A2}" dt="2024-07-08T00:23:02.822" v="0"/>
+        <pc:sldMkLst>
+          <pc:docMk/>
+          <pc:sldMk cId="2440337316" sldId="1385"/>
+        </pc:sldMkLst>
+      </pc:sldChg>
+      <pc:sldChg chg="add">
+        <pc:chgData name="Gsell, Steven D." userId="6e84bc59-7e38-490f-9209-f43946aa50d2" providerId="ADAL" clId="{D88466B7-03C0-4978-B1B6-A6C2E089C6A2}" dt="2024-07-08T00:23:02.822" v="0"/>
+        <pc:sldMkLst>
+          <pc:docMk/>
+          <pc:sldMk cId="275916581" sldId="1386"/>
+        </pc:sldMkLst>
+      </pc:sldChg>
+      <pc:sldChg chg="add">
+        <pc:chgData name="Gsell, Steven D." userId="6e84bc59-7e38-490f-9209-f43946aa50d2" providerId="ADAL" clId="{D88466B7-03C0-4978-B1B6-A6C2E089C6A2}" dt="2024-07-08T00:23:02.822" v="0"/>
+        <pc:sldMkLst>
+          <pc:docMk/>
+          <pc:sldMk cId="3943678850" sldId="1387"/>
+        </pc:sldMkLst>
+      </pc:sldChg>
+      <pc:sldChg chg="add">
+        <pc:chgData name="Gsell, Steven D." userId="6e84bc59-7e38-490f-9209-f43946aa50d2" providerId="ADAL" clId="{D88466B7-03C0-4978-B1B6-A6C2E089C6A2}" dt="2024-07-08T00:23:02.822" v="0"/>
+        <pc:sldMkLst>
+          <pc:docMk/>
+          <pc:sldMk cId="2257766621" sldId="1388"/>
+        </pc:sldMkLst>
+      </pc:sldChg>
+      <pc:sldChg chg="add">
+        <pc:chgData name="Gsell, Steven D." userId="6e84bc59-7e38-490f-9209-f43946aa50d2" providerId="ADAL" clId="{D88466B7-03C0-4978-B1B6-A6C2E089C6A2}" dt="2024-07-08T00:23:02.822" v="0"/>
+        <pc:sldMkLst>
+          <pc:docMk/>
+          <pc:sldMk cId="857814757" sldId="1389"/>
+        </pc:sldMkLst>
+      </pc:sldChg>
+    </pc:docChg>
+  </pc:docChgLst>
+</pc:chgInfo>
+</file>
+
 <file path=ppt/notesMasters/notesMaster1.xml><?xml version="1.0" encoding="utf-8"?>
 <p:notesMaster xmlns:a="http://schemas.openxmlformats.org/drawingml/2006/main" xmlns:r="http://schemas.openxmlformats.org/officeDocument/2006/relationships" xmlns:p="http://schemas.openxmlformats.org/presentationml/2006/main">
   <p:cSld>
@@ -209,7 +293,7 @@
           <a:p>
             <a:fld id="{CA1F7DAD-AACB-410C-9AA4-BE5099812397}" type="datetimeFigureOut">
               <a:rPr lang="en-US" smtClean="0"/>
-              <a:t>6/22/2024</a:t>
+              <a:t>7/7/2024</a:t>
             </a:fld>
             <a:endParaRPr lang="en-US"/>
           </a:p>
@@ -604,7 +688,57 @@
           <a:bodyPr/>
           <a:lstStyle/>
           <a:p>
-            <a:endParaRPr lang="en-US"/>
+            <a:pPr marL="285750" indent="-285750">
+              <a:buFont typeface="Arial" panose="020B0604020202020204" pitchFamily="34" charset="0"/>
+              <a:buChar char="•"/>
+            </a:pPr>
+            <a:r>
+              <a:rPr lang="en-US" sz="1200" dirty="0"/>
+              <a:t>Software projects in a class setting can be chaotic without clear communication</a:t>
+            </a:r>
+          </a:p>
+          <a:p>
+            <a:pPr marL="285750" indent="-285750">
+              <a:buFont typeface="Arial" panose="020B0604020202020204" pitchFamily="34" charset="0"/>
+              <a:buChar char="•"/>
+            </a:pPr>
+            <a:endParaRPr lang="en-US" sz="1200" dirty="0"/>
+          </a:p>
+          <a:p>
+            <a:pPr marL="285750" indent="-285750">
+              <a:buFont typeface="Arial" panose="020B0604020202020204" pitchFamily="34" charset="0"/>
+              <a:buChar char="•"/>
+            </a:pPr>
+            <a:r>
+              <a:rPr lang="en-US" sz="1200" dirty="0"/>
+              <a:t>We are all learning and perhaps working with several new technologies for the first time. We are also learning HOW to learn in a fast-paced tech environment.</a:t>
+            </a:r>
+          </a:p>
+          <a:p>
+            <a:pPr marL="285750" indent="-285750">
+              <a:buFont typeface="Arial" panose="020B0604020202020204" pitchFamily="34" charset="0"/>
+              <a:buChar char="•"/>
+            </a:pPr>
+            <a:endParaRPr lang="en-US" sz="1200" dirty="0"/>
+          </a:p>
+          <a:p>
+            <a:pPr marL="285750" indent="-285750">
+              <a:buFont typeface="Arial" panose="020B0604020202020204" pitchFamily="34" charset="0"/>
+              <a:buChar char="•"/>
+            </a:pPr>
+            <a:r>
+              <a:rPr lang="en-US" sz="1200" dirty="0"/>
+              <a:t>When our groups run into problems, Slack allows us to pinpoint the problem as a group and see the clear solution when someone finds it!</a:t>
+            </a:r>
+          </a:p>
+          <a:p>
+            <a:endParaRPr lang="en-US" dirty="0"/>
+          </a:p>
+          <a:p>
+            <a:r>
+              <a:rPr lang="en-US" dirty="0"/>
+              <a:t>(Dustin was able to pinpoint a problem with our Spring-Boot API and share what he found with our group. It was part of a dependency that we could manually exclude.)</a:t>
+            </a:r>
           </a:p>
         </p:txBody>
       </p:sp>
@@ -623,9 +757,1123 @@
           <a:bodyPr/>
           <a:lstStyle/>
           <a:p>
+            <a:pPr marL="0" marR="0" lvl="0" indent="0" algn="r" defTabSz="914400" rtl="0" eaLnBrk="1" fontAlgn="auto" latinLnBrk="0" hangingPunct="1">
+              <a:lnSpc>
+                <a:spcPct val="100000"/>
+              </a:lnSpc>
+              <a:spcBef>
+                <a:spcPts val="0"/>
+              </a:spcBef>
+              <a:spcAft>
+                <a:spcPts val="0"/>
+              </a:spcAft>
+              <a:buClrTx/>
+              <a:buSzTx/>
+              <a:buFontTx/>
+              <a:buNone/>
+              <a:tabLst/>
+              <a:defRPr/>
+            </a:pPr>
+            <a:fld id="{AE9ECEFE-5C53-4261-924B-F0AA5F7E0BB8}" type="slidenum">
+              <a:rPr kumimoji="0" lang="en-US" sz="1200" b="0" i="0" u="none" strike="noStrike" kern="1200" cap="none" spc="0" normalizeH="0" baseline="0" noProof="0" smtClean="0">
+                <a:ln>
+                  <a:noFill/>
+                </a:ln>
+                <a:solidFill>
+                  <a:prstClr val="black"/>
+                </a:solidFill>
+                <a:effectLst/>
+                <a:uLnTx/>
+                <a:uFillTx/>
+                <a:latin typeface="Calibri" panose="020F0502020204030204"/>
+                <a:ea typeface="+mn-ea"/>
+                <a:cs typeface="+mn-cs"/>
+              </a:rPr>
+              <a:pPr marL="0" marR="0" lvl="0" indent="0" algn="r" defTabSz="914400" rtl="0" eaLnBrk="1" fontAlgn="auto" latinLnBrk="0" hangingPunct="1">
+                <a:lnSpc>
+                  <a:spcPct val="100000"/>
+                </a:lnSpc>
+                <a:spcBef>
+                  <a:spcPts val="0"/>
+                </a:spcBef>
+                <a:spcAft>
+                  <a:spcPts val="0"/>
+                </a:spcAft>
+                <a:buClrTx/>
+                <a:buSzTx/>
+                <a:buFontTx/>
+                <a:buNone/>
+                <a:tabLst/>
+                <a:defRPr/>
+              </a:pPr>
+              <a:t>13</a:t>
+            </a:fld>
+            <a:endParaRPr kumimoji="0" lang="en-US" sz="1200" b="0" i="0" u="none" strike="noStrike" kern="1200" cap="none" spc="0" normalizeH="0" baseline="0" noProof="0">
+              <a:ln>
+                <a:noFill/>
+              </a:ln>
+              <a:solidFill>
+                <a:prstClr val="black"/>
+              </a:solidFill>
+              <a:effectLst/>
+              <a:uLnTx/>
+              <a:uFillTx/>
+              <a:latin typeface="Calibri" panose="020F0502020204030204"/>
+              <a:ea typeface="+mn-ea"/>
+              <a:cs typeface="+mn-cs"/>
+            </a:endParaRPr>
+          </a:p>
+        </p:txBody>
+      </p:sp>
+    </p:spTree>
+    <p:extLst>
+      <p:ext uri="{BB962C8B-B14F-4D97-AF65-F5344CB8AC3E}">
+        <p14:creationId xmlns:p14="http://schemas.microsoft.com/office/powerpoint/2010/main" val="3993838157"/>
+      </p:ext>
+    </p:extLst>
+  </p:cSld>
+  <p:clrMapOvr>
+    <a:masterClrMapping/>
+  </p:clrMapOvr>
+</p:notes>
+</file>
+
+<file path=ppt/notesSlides/notesSlide3.xml><?xml version="1.0" encoding="utf-8"?>
+<p:notes xmlns:a="http://schemas.openxmlformats.org/drawingml/2006/main" xmlns:r="http://schemas.openxmlformats.org/officeDocument/2006/relationships" xmlns:p="http://schemas.openxmlformats.org/presentationml/2006/main">
+  <p:cSld>
+    <p:spTree>
+      <p:nvGrpSpPr>
+        <p:cNvPr id="1" name=""/>
+        <p:cNvGrpSpPr/>
+        <p:nvPr/>
+      </p:nvGrpSpPr>
+      <p:grpSpPr>
+        <a:xfrm>
+          <a:off x="0" y="0"/>
+          <a:ext cx="0" cy="0"/>
+          <a:chOff x="0" y="0"/>
+          <a:chExt cx="0" cy="0"/>
+        </a:xfrm>
+      </p:grpSpPr>
+      <p:sp>
+        <p:nvSpPr>
+          <p:cNvPr id="2" name="Slide Image Placeholder 1"/>
+          <p:cNvSpPr>
+            <a:spLocks noGrp="1" noRot="1" noChangeAspect="1"/>
+          </p:cNvSpPr>
+          <p:nvPr>
+            <p:ph type="sldImg"/>
+          </p:nvPr>
+        </p:nvSpPr>
+        <p:spPr/>
+      </p:sp>
+      <p:sp>
+        <p:nvSpPr>
+          <p:cNvPr id="3" name="Notes Placeholder 2"/>
+          <p:cNvSpPr>
+            <a:spLocks noGrp="1"/>
+          </p:cNvSpPr>
+          <p:nvPr>
+            <p:ph type="body" idx="1"/>
+          </p:nvPr>
+        </p:nvSpPr>
+        <p:spPr/>
+        <p:txBody>
+          <a:bodyPr/>
+          <a:lstStyle/>
+          <a:p>
+            <a:pPr marL="285750" indent="-285750">
+              <a:buFont typeface="Arial" panose="020B0604020202020204" pitchFamily="34" charset="0"/>
+              <a:buChar char="•"/>
+            </a:pPr>
+            <a:r>
+              <a:rPr lang="en-US" sz="1200" dirty="0"/>
+              <a:t>Juggling different groups can quickly become a chore without the proper tools.</a:t>
+            </a:r>
+          </a:p>
+          <a:p>
+            <a:pPr marL="285750" indent="-285750">
+              <a:buFont typeface="Arial" panose="020B0604020202020204" pitchFamily="34" charset="0"/>
+              <a:buChar char="•"/>
+            </a:pPr>
+            <a:endParaRPr lang="en-US" sz="1200" dirty="0"/>
+          </a:p>
+          <a:p>
+            <a:pPr marL="285750" indent="-285750">
+              <a:buFont typeface="Arial" panose="020B0604020202020204" pitchFamily="34" charset="0"/>
+              <a:buChar char="•"/>
+            </a:pPr>
+            <a:r>
+              <a:rPr lang="en-US" sz="1200" dirty="0"/>
+              <a:t>Slack allows you to have multiple workspaces at once, with a user-friendly UI to jump between all your groups.</a:t>
+            </a:r>
+          </a:p>
+          <a:p>
+            <a:pPr marL="285750" indent="-285750">
+              <a:buFont typeface="Arial" panose="020B0604020202020204" pitchFamily="34" charset="0"/>
+              <a:buChar char="•"/>
+            </a:pPr>
+            <a:endParaRPr lang="en-US" sz="1200" dirty="0"/>
+          </a:p>
+          <a:p>
+            <a:pPr marL="285750" indent="-285750">
+              <a:buFont typeface="Arial" panose="020B0604020202020204" pitchFamily="34" charset="0"/>
+              <a:buChar char="•"/>
+            </a:pPr>
+            <a:r>
+              <a:rPr lang="en-US" sz="1200" dirty="0"/>
+              <a:t>Having clearly defined workspaces allows for easy transitioning from one group to another. </a:t>
+            </a:r>
+          </a:p>
+          <a:p>
+            <a:endParaRPr lang="en-US" dirty="0"/>
+          </a:p>
+          <a:p>
+            <a:r>
+              <a:rPr lang="en-US" dirty="0"/>
+              <a:t>(At FSCJ it can get to be a little much if you are taking multiple IT classes at the same time. Slack allows a handy workspace system to jump between your groups of peers.)</a:t>
+            </a:r>
+          </a:p>
+        </p:txBody>
+      </p:sp>
+      <p:sp>
+        <p:nvSpPr>
+          <p:cNvPr id="4" name="Slide Number Placeholder 3"/>
+          <p:cNvSpPr>
+            <a:spLocks noGrp="1"/>
+          </p:cNvSpPr>
+          <p:nvPr>
+            <p:ph type="sldNum" sz="quarter" idx="5"/>
+          </p:nvPr>
+        </p:nvSpPr>
+        <p:spPr/>
+        <p:txBody>
+          <a:bodyPr/>
+          <a:lstStyle/>
+          <a:p>
+            <a:pPr marL="0" marR="0" lvl="0" indent="0" algn="r" defTabSz="914400" rtl="0" eaLnBrk="1" fontAlgn="auto" latinLnBrk="0" hangingPunct="1">
+              <a:lnSpc>
+                <a:spcPct val="100000"/>
+              </a:lnSpc>
+              <a:spcBef>
+                <a:spcPts val="0"/>
+              </a:spcBef>
+              <a:spcAft>
+                <a:spcPts val="0"/>
+              </a:spcAft>
+              <a:buClrTx/>
+              <a:buSzTx/>
+              <a:buFontTx/>
+              <a:buNone/>
+              <a:tabLst/>
+              <a:defRPr/>
+            </a:pPr>
+            <a:fld id="{AE9ECEFE-5C53-4261-924B-F0AA5F7E0BB8}" type="slidenum">
+              <a:rPr kumimoji="0" lang="en-US" sz="1200" b="0" i="0" u="none" strike="noStrike" kern="1200" cap="none" spc="0" normalizeH="0" baseline="0" noProof="0" smtClean="0">
+                <a:ln>
+                  <a:noFill/>
+                </a:ln>
+                <a:solidFill>
+                  <a:prstClr val="black"/>
+                </a:solidFill>
+                <a:effectLst/>
+                <a:uLnTx/>
+                <a:uFillTx/>
+                <a:latin typeface="Calibri" panose="020F0502020204030204"/>
+                <a:ea typeface="+mn-ea"/>
+                <a:cs typeface="+mn-cs"/>
+              </a:rPr>
+              <a:pPr marL="0" marR="0" lvl="0" indent="0" algn="r" defTabSz="914400" rtl="0" eaLnBrk="1" fontAlgn="auto" latinLnBrk="0" hangingPunct="1">
+                <a:lnSpc>
+                  <a:spcPct val="100000"/>
+                </a:lnSpc>
+                <a:spcBef>
+                  <a:spcPts val="0"/>
+                </a:spcBef>
+                <a:spcAft>
+                  <a:spcPts val="0"/>
+                </a:spcAft>
+                <a:buClrTx/>
+                <a:buSzTx/>
+                <a:buFontTx/>
+                <a:buNone/>
+                <a:tabLst/>
+                <a:defRPr/>
+              </a:pPr>
+              <a:t>14</a:t>
+            </a:fld>
+            <a:endParaRPr kumimoji="0" lang="en-US" sz="1200" b="0" i="0" u="none" strike="noStrike" kern="1200" cap="none" spc="0" normalizeH="0" baseline="0" noProof="0">
+              <a:ln>
+                <a:noFill/>
+              </a:ln>
+              <a:solidFill>
+                <a:prstClr val="black"/>
+              </a:solidFill>
+              <a:effectLst/>
+              <a:uLnTx/>
+              <a:uFillTx/>
+              <a:latin typeface="Calibri" panose="020F0502020204030204"/>
+              <a:ea typeface="+mn-ea"/>
+              <a:cs typeface="+mn-cs"/>
+            </a:endParaRPr>
+          </a:p>
+        </p:txBody>
+      </p:sp>
+    </p:spTree>
+    <p:extLst>
+      <p:ext uri="{BB962C8B-B14F-4D97-AF65-F5344CB8AC3E}">
+        <p14:creationId xmlns:p14="http://schemas.microsoft.com/office/powerpoint/2010/main" val="1973195403"/>
+      </p:ext>
+    </p:extLst>
+  </p:cSld>
+  <p:clrMapOvr>
+    <a:masterClrMapping/>
+  </p:clrMapOvr>
+</p:notes>
+</file>
+
+<file path=ppt/notesSlides/notesSlide4.xml><?xml version="1.0" encoding="utf-8"?>
+<p:notes xmlns:a="http://schemas.openxmlformats.org/drawingml/2006/main" xmlns:r="http://schemas.openxmlformats.org/officeDocument/2006/relationships" xmlns:p="http://schemas.openxmlformats.org/presentationml/2006/main">
+  <p:cSld>
+    <p:spTree>
+      <p:nvGrpSpPr>
+        <p:cNvPr id="1" name=""/>
+        <p:cNvGrpSpPr/>
+        <p:nvPr/>
+      </p:nvGrpSpPr>
+      <p:grpSpPr>
+        <a:xfrm>
+          <a:off x="0" y="0"/>
+          <a:ext cx="0" cy="0"/>
+          <a:chOff x="0" y="0"/>
+          <a:chExt cx="0" cy="0"/>
+        </a:xfrm>
+      </p:grpSpPr>
+      <p:sp>
+        <p:nvSpPr>
+          <p:cNvPr id="2" name="Slide Image Placeholder 1"/>
+          <p:cNvSpPr>
+            <a:spLocks noGrp="1" noRot="1" noChangeAspect="1"/>
+          </p:cNvSpPr>
+          <p:nvPr>
+            <p:ph type="sldImg"/>
+          </p:nvPr>
+        </p:nvSpPr>
+        <p:spPr/>
+      </p:sp>
+      <p:sp>
+        <p:nvSpPr>
+          <p:cNvPr id="3" name="Notes Placeholder 2"/>
+          <p:cNvSpPr>
+            <a:spLocks noGrp="1"/>
+          </p:cNvSpPr>
+          <p:nvPr>
+            <p:ph type="body" idx="1"/>
+          </p:nvPr>
+        </p:nvSpPr>
+        <p:spPr/>
+        <p:txBody>
+          <a:bodyPr/>
+          <a:lstStyle/>
+          <a:p>
+            <a:pPr marL="285750" indent="-285750">
+              <a:buFont typeface="Arial" panose="020B0604020202020204" pitchFamily="34" charset="0"/>
+              <a:buChar char="•"/>
+            </a:pPr>
+            <a:r>
+              <a:rPr lang="en-US" sz="1200" dirty="0"/>
+              <a:t>One of the most noticeable things about Slack is the customization that is possible through their add-on apps!</a:t>
+            </a:r>
+          </a:p>
+          <a:p>
+            <a:pPr marL="285750" indent="-285750">
+              <a:buFont typeface="Arial" panose="020B0604020202020204" pitchFamily="34" charset="0"/>
+              <a:buChar char="•"/>
+            </a:pPr>
+            <a:endParaRPr lang="en-US" sz="1200" dirty="0"/>
+          </a:p>
+          <a:p>
+            <a:pPr marL="285750" indent="-285750">
+              <a:buFont typeface="Arial" panose="020B0604020202020204" pitchFamily="34" charset="0"/>
+              <a:buChar char="•"/>
+            </a:pPr>
+            <a:r>
+              <a:rPr lang="en-US" sz="1200" dirty="0"/>
+              <a:t>There are thousands of useful apps that can be added to a Slack workspace that supports the task your group is trying to accomplish.</a:t>
+            </a:r>
+          </a:p>
+          <a:p>
+            <a:pPr marL="285750" indent="-285750">
+              <a:buFont typeface="Arial" panose="020B0604020202020204" pitchFamily="34" charset="0"/>
+              <a:buChar char="•"/>
+            </a:pPr>
+            <a:endParaRPr lang="en-US" sz="1200" dirty="0"/>
+          </a:p>
+          <a:p>
+            <a:pPr marL="285750" indent="-285750">
+              <a:buFont typeface="Arial" panose="020B0604020202020204" pitchFamily="34" charset="0"/>
+              <a:buChar char="•"/>
+            </a:pPr>
+            <a:r>
+              <a:rPr lang="en-US" sz="1200" dirty="0"/>
+              <a:t>This customization allows for adaptation to different technologies and for an ever-changing Agile environment.</a:t>
+            </a:r>
+          </a:p>
+          <a:p>
+            <a:endParaRPr lang="en-US" dirty="0"/>
+          </a:p>
+        </p:txBody>
+      </p:sp>
+      <p:sp>
+        <p:nvSpPr>
+          <p:cNvPr id="4" name="Slide Number Placeholder 3"/>
+          <p:cNvSpPr>
+            <a:spLocks noGrp="1"/>
+          </p:cNvSpPr>
+          <p:nvPr>
+            <p:ph type="sldNum" sz="quarter" idx="5"/>
+          </p:nvPr>
+        </p:nvSpPr>
+        <p:spPr/>
+        <p:txBody>
+          <a:bodyPr/>
+          <a:lstStyle/>
+          <a:p>
+            <a:pPr marL="0" marR="0" lvl="0" indent="0" algn="r" defTabSz="914400" rtl="0" eaLnBrk="1" fontAlgn="auto" latinLnBrk="0" hangingPunct="1">
+              <a:lnSpc>
+                <a:spcPct val="100000"/>
+              </a:lnSpc>
+              <a:spcBef>
+                <a:spcPts val="0"/>
+              </a:spcBef>
+              <a:spcAft>
+                <a:spcPts val="0"/>
+              </a:spcAft>
+              <a:buClrTx/>
+              <a:buSzTx/>
+              <a:buFontTx/>
+              <a:buNone/>
+              <a:tabLst/>
+              <a:defRPr/>
+            </a:pPr>
+            <a:fld id="{AE9ECEFE-5C53-4261-924B-F0AA5F7E0BB8}" type="slidenum">
+              <a:rPr kumimoji="0" lang="en-US" sz="1200" b="0" i="0" u="none" strike="noStrike" kern="1200" cap="none" spc="0" normalizeH="0" baseline="0" noProof="0" smtClean="0">
+                <a:ln>
+                  <a:noFill/>
+                </a:ln>
+                <a:solidFill>
+                  <a:prstClr val="black"/>
+                </a:solidFill>
+                <a:effectLst/>
+                <a:uLnTx/>
+                <a:uFillTx/>
+                <a:latin typeface="Calibri" panose="020F0502020204030204"/>
+                <a:ea typeface="+mn-ea"/>
+                <a:cs typeface="+mn-cs"/>
+              </a:rPr>
+              <a:pPr marL="0" marR="0" lvl="0" indent="0" algn="r" defTabSz="914400" rtl="0" eaLnBrk="1" fontAlgn="auto" latinLnBrk="0" hangingPunct="1">
+                <a:lnSpc>
+                  <a:spcPct val="100000"/>
+                </a:lnSpc>
+                <a:spcBef>
+                  <a:spcPts val="0"/>
+                </a:spcBef>
+                <a:spcAft>
+                  <a:spcPts val="0"/>
+                </a:spcAft>
+                <a:buClrTx/>
+                <a:buSzTx/>
+                <a:buFontTx/>
+                <a:buNone/>
+                <a:tabLst/>
+                <a:defRPr/>
+              </a:pPr>
+              <a:t>15</a:t>
+            </a:fld>
+            <a:endParaRPr kumimoji="0" lang="en-US" sz="1200" b="0" i="0" u="none" strike="noStrike" kern="1200" cap="none" spc="0" normalizeH="0" baseline="0" noProof="0">
+              <a:ln>
+                <a:noFill/>
+              </a:ln>
+              <a:solidFill>
+                <a:prstClr val="black"/>
+              </a:solidFill>
+              <a:effectLst/>
+              <a:uLnTx/>
+              <a:uFillTx/>
+              <a:latin typeface="Calibri" panose="020F0502020204030204"/>
+              <a:ea typeface="+mn-ea"/>
+              <a:cs typeface="+mn-cs"/>
+            </a:endParaRPr>
+          </a:p>
+        </p:txBody>
+      </p:sp>
+    </p:spTree>
+    <p:extLst>
+      <p:ext uri="{BB962C8B-B14F-4D97-AF65-F5344CB8AC3E}">
+        <p14:creationId xmlns:p14="http://schemas.microsoft.com/office/powerpoint/2010/main" val="1117955501"/>
+      </p:ext>
+    </p:extLst>
+  </p:cSld>
+  <p:clrMapOvr>
+    <a:masterClrMapping/>
+  </p:clrMapOvr>
+</p:notes>
+</file>
+
+<file path=ppt/notesSlides/notesSlide5.xml><?xml version="1.0" encoding="utf-8"?>
+<p:notes xmlns:a="http://schemas.openxmlformats.org/drawingml/2006/main" xmlns:r="http://schemas.openxmlformats.org/officeDocument/2006/relationships" xmlns:p="http://schemas.openxmlformats.org/presentationml/2006/main">
+  <p:cSld>
+    <p:spTree>
+      <p:nvGrpSpPr>
+        <p:cNvPr id="1" name=""/>
+        <p:cNvGrpSpPr/>
+        <p:nvPr/>
+      </p:nvGrpSpPr>
+      <p:grpSpPr>
+        <a:xfrm>
+          <a:off x="0" y="0"/>
+          <a:ext cx="0" cy="0"/>
+          <a:chOff x="0" y="0"/>
+          <a:chExt cx="0" cy="0"/>
+        </a:xfrm>
+      </p:grpSpPr>
+      <p:sp>
+        <p:nvSpPr>
+          <p:cNvPr id="2" name="Slide Image Placeholder 1"/>
+          <p:cNvSpPr>
+            <a:spLocks noGrp="1" noRot="1" noChangeAspect="1"/>
+          </p:cNvSpPr>
+          <p:nvPr>
+            <p:ph type="sldImg"/>
+          </p:nvPr>
+        </p:nvSpPr>
+        <p:spPr/>
+      </p:sp>
+      <p:sp>
+        <p:nvSpPr>
+          <p:cNvPr id="3" name="Notes Placeholder 2"/>
+          <p:cNvSpPr>
+            <a:spLocks noGrp="1"/>
+          </p:cNvSpPr>
+          <p:nvPr>
+            <p:ph type="body" idx="1"/>
+          </p:nvPr>
+        </p:nvSpPr>
+        <p:spPr/>
+        <p:txBody>
+          <a:bodyPr/>
+          <a:lstStyle/>
+          <a:p>
+            <a:pPr marL="285750" indent="-285750">
+              <a:buFont typeface="Arial" panose="020B0604020202020204" pitchFamily="34" charset="0"/>
+              <a:buChar char="•"/>
+            </a:pPr>
+            <a:r>
+              <a:rPr lang="en-US" sz="1200" dirty="0"/>
+              <a:t>How often have you gone to push your code only to see that you need to pull the new updated first?</a:t>
+            </a:r>
+          </a:p>
+          <a:p>
+            <a:pPr marL="285750" indent="-285750">
+              <a:buFont typeface="Arial" panose="020B0604020202020204" pitchFamily="34" charset="0"/>
+              <a:buChar char="•"/>
+            </a:pPr>
+            <a:endParaRPr lang="en-US" sz="1200" dirty="0"/>
+          </a:p>
+          <a:p>
+            <a:pPr marL="285750" indent="-285750">
+              <a:buFont typeface="Arial" panose="020B0604020202020204" pitchFamily="34" charset="0"/>
+              <a:buChar char="•"/>
+            </a:pPr>
+            <a:r>
+              <a:rPr lang="en-US" sz="1200" dirty="0"/>
+              <a:t>Some of our groups have utilized the GitHub plugin for Slack. This allows the group to be up to date with every update and change happening.</a:t>
+            </a:r>
+          </a:p>
+          <a:p>
+            <a:pPr marL="285750" indent="-285750">
+              <a:buFont typeface="Arial" panose="020B0604020202020204" pitchFamily="34" charset="0"/>
+              <a:buChar char="•"/>
+            </a:pPr>
+            <a:endParaRPr lang="en-US" sz="1200" dirty="0"/>
+          </a:p>
+          <a:p>
+            <a:pPr marL="285750" indent="-285750">
+              <a:buFont typeface="Arial" panose="020B0604020202020204" pitchFamily="34" charset="0"/>
+              <a:buChar char="•"/>
+            </a:pPr>
+            <a:r>
+              <a:rPr lang="en-US" sz="1200" dirty="0"/>
+              <a:t>This allows cohesion of progress updates when the group reconvenes to discuss the next steps!</a:t>
+            </a:r>
+          </a:p>
+          <a:p>
+            <a:endParaRPr lang="en-US" dirty="0"/>
+          </a:p>
+        </p:txBody>
+      </p:sp>
+      <p:sp>
+        <p:nvSpPr>
+          <p:cNvPr id="4" name="Slide Number Placeholder 3"/>
+          <p:cNvSpPr>
+            <a:spLocks noGrp="1"/>
+          </p:cNvSpPr>
+          <p:nvPr>
+            <p:ph type="sldNum" sz="quarter" idx="5"/>
+          </p:nvPr>
+        </p:nvSpPr>
+        <p:spPr/>
+        <p:txBody>
+          <a:bodyPr/>
+          <a:lstStyle/>
+          <a:p>
+            <a:pPr marL="0" marR="0" lvl="0" indent="0" algn="r" defTabSz="914400" rtl="0" eaLnBrk="1" fontAlgn="auto" latinLnBrk="0" hangingPunct="1">
+              <a:lnSpc>
+                <a:spcPct val="100000"/>
+              </a:lnSpc>
+              <a:spcBef>
+                <a:spcPts val="0"/>
+              </a:spcBef>
+              <a:spcAft>
+                <a:spcPts val="0"/>
+              </a:spcAft>
+              <a:buClrTx/>
+              <a:buSzTx/>
+              <a:buFontTx/>
+              <a:buNone/>
+              <a:tabLst/>
+              <a:defRPr/>
+            </a:pPr>
+            <a:fld id="{AE9ECEFE-5C53-4261-924B-F0AA5F7E0BB8}" type="slidenum">
+              <a:rPr kumimoji="0" lang="en-US" sz="1200" b="0" i="0" u="none" strike="noStrike" kern="1200" cap="none" spc="0" normalizeH="0" baseline="0" noProof="0" smtClean="0">
+                <a:ln>
+                  <a:noFill/>
+                </a:ln>
+                <a:solidFill>
+                  <a:prstClr val="black"/>
+                </a:solidFill>
+                <a:effectLst/>
+                <a:uLnTx/>
+                <a:uFillTx/>
+                <a:latin typeface="Calibri" panose="020F0502020204030204"/>
+                <a:ea typeface="+mn-ea"/>
+                <a:cs typeface="+mn-cs"/>
+              </a:rPr>
+              <a:pPr marL="0" marR="0" lvl="0" indent="0" algn="r" defTabSz="914400" rtl="0" eaLnBrk="1" fontAlgn="auto" latinLnBrk="0" hangingPunct="1">
+                <a:lnSpc>
+                  <a:spcPct val="100000"/>
+                </a:lnSpc>
+                <a:spcBef>
+                  <a:spcPts val="0"/>
+                </a:spcBef>
+                <a:spcAft>
+                  <a:spcPts val="0"/>
+                </a:spcAft>
+                <a:buClrTx/>
+                <a:buSzTx/>
+                <a:buFontTx/>
+                <a:buNone/>
+                <a:tabLst/>
+                <a:defRPr/>
+              </a:pPr>
+              <a:t>16</a:t>
+            </a:fld>
+            <a:endParaRPr kumimoji="0" lang="en-US" sz="1200" b="0" i="0" u="none" strike="noStrike" kern="1200" cap="none" spc="0" normalizeH="0" baseline="0" noProof="0">
+              <a:ln>
+                <a:noFill/>
+              </a:ln>
+              <a:solidFill>
+                <a:prstClr val="black"/>
+              </a:solidFill>
+              <a:effectLst/>
+              <a:uLnTx/>
+              <a:uFillTx/>
+              <a:latin typeface="Calibri" panose="020F0502020204030204"/>
+              <a:ea typeface="+mn-ea"/>
+              <a:cs typeface="+mn-cs"/>
+            </a:endParaRPr>
+          </a:p>
+        </p:txBody>
+      </p:sp>
+    </p:spTree>
+    <p:extLst>
+      <p:ext uri="{BB962C8B-B14F-4D97-AF65-F5344CB8AC3E}">
+        <p14:creationId xmlns:p14="http://schemas.microsoft.com/office/powerpoint/2010/main" val="2657851505"/>
+      </p:ext>
+    </p:extLst>
+  </p:cSld>
+  <p:clrMapOvr>
+    <a:masterClrMapping/>
+  </p:clrMapOvr>
+</p:notes>
+</file>
+
+<file path=ppt/notesSlides/notesSlide6.xml><?xml version="1.0" encoding="utf-8"?>
+<p:notes xmlns:a="http://schemas.openxmlformats.org/drawingml/2006/main" xmlns:r="http://schemas.openxmlformats.org/officeDocument/2006/relationships" xmlns:p="http://schemas.openxmlformats.org/presentationml/2006/main">
+  <p:cSld>
+    <p:spTree>
+      <p:nvGrpSpPr>
+        <p:cNvPr id="1" name=""/>
+        <p:cNvGrpSpPr/>
+        <p:nvPr/>
+      </p:nvGrpSpPr>
+      <p:grpSpPr>
+        <a:xfrm>
+          <a:off x="0" y="0"/>
+          <a:ext cx="0" cy="0"/>
+          <a:chOff x="0" y="0"/>
+          <a:chExt cx="0" cy="0"/>
+        </a:xfrm>
+      </p:grpSpPr>
+      <p:sp>
+        <p:nvSpPr>
+          <p:cNvPr id="2" name="Slide Image Placeholder 1"/>
+          <p:cNvSpPr>
+            <a:spLocks noGrp="1" noRot="1" noChangeAspect="1"/>
+          </p:cNvSpPr>
+          <p:nvPr>
+            <p:ph type="sldImg"/>
+          </p:nvPr>
+        </p:nvSpPr>
+        <p:spPr/>
+      </p:sp>
+      <p:sp>
+        <p:nvSpPr>
+          <p:cNvPr id="3" name="Notes Placeholder 2"/>
+          <p:cNvSpPr>
+            <a:spLocks noGrp="1"/>
+          </p:cNvSpPr>
+          <p:nvPr>
+            <p:ph type="body" idx="1"/>
+          </p:nvPr>
+        </p:nvSpPr>
+        <p:spPr/>
+        <p:txBody>
+          <a:bodyPr/>
+          <a:lstStyle/>
+          <a:p>
+            <a:pPr marL="285750" indent="-285750">
+              <a:buFont typeface="Arial" panose="020B0604020202020204" pitchFamily="34" charset="0"/>
+              <a:buChar char="•"/>
+            </a:pPr>
+            <a:r>
+              <a:rPr lang="en-US" sz="1200" dirty="0"/>
+              <a:t>By utilizing the Slack Huddle feature our groups are able to have a live collaboration on demand.</a:t>
+            </a:r>
+          </a:p>
+          <a:p>
+            <a:pPr marL="285750" indent="-285750">
+              <a:buFont typeface="Arial" panose="020B0604020202020204" pitchFamily="34" charset="0"/>
+              <a:buChar char="•"/>
+            </a:pPr>
+            <a:endParaRPr lang="en-US" sz="1200" dirty="0"/>
+          </a:p>
+          <a:p>
+            <a:pPr marL="285750" indent="-285750">
+              <a:buFont typeface="Arial" panose="020B0604020202020204" pitchFamily="34" charset="0"/>
+              <a:buChar char="•"/>
+            </a:pPr>
+            <a:r>
+              <a:rPr lang="en-US" sz="1200" dirty="0"/>
+              <a:t>If there is any confusion to the project at hand there can be clarification in the matter of seconds!</a:t>
+            </a:r>
+          </a:p>
+          <a:p>
+            <a:pPr marL="285750" indent="-285750">
+              <a:buFont typeface="Arial" panose="020B0604020202020204" pitchFamily="34" charset="0"/>
+              <a:buChar char="•"/>
+            </a:pPr>
+            <a:endParaRPr lang="en-US" sz="1200" dirty="0"/>
+          </a:p>
+          <a:p>
+            <a:pPr marL="285750" indent="-285750">
+              <a:buFont typeface="Arial" panose="020B0604020202020204" pitchFamily="34" charset="0"/>
+              <a:buChar char="•"/>
+            </a:pPr>
+            <a:r>
+              <a:rPr lang="en-US" sz="1200" dirty="0"/>
+              <a:t>The cliché goes that a picture speaks a thousands words. So 30fps screen sharing should speak about 30,000 words per second. (pause for laughter)</a:t>
+            </a:r>
+          </a:p>
+          <a:p>
+            <a:endParaRPr lang="en-US" dirty="0"/>
+          </a:p>
+        </p:txBody>
+      </p:sp>
+      <p:sp>
+        <p:nvSpPr>
+          <p:cNvPr id="4" name="Slide Number Placeholder 3"/>
+          <p:cNvSpPr>
+            <a:spLocks noGrp="1"/>
+          </p:cNvSpPr>
+          <p:nvPr>
+            <p:ph type="sldNum" sz="quarter" idx="5"/>
+          </p:nvPr>
+        </p:nvSpPr>
+        <p:spPr/>
+        <p:txBody>
+          <a:bodyPr/>
+          <a:lstStyle/>
+          <a:p>
+            <a:pPr marL="0" marR="0" lvl="0" indent="0" algn="r" defTabSz="914400" rtl="0" eaLnBrk="1" fontAlgn="auto" latinLnBrk="0" hangingPunct="1">
+              <a:lnSpc>
+                <a:spcPct val="100000"/>
+              </a:lnSpc>
+              <a:spcBef>
+                <a:spcPts val="0"/>
+              </a:spcBef>
+              <a:spcAft>
+                <a:spcPts val="0"/>
+              </a:spcAft>
+              <a:buClrTx/>
+              <a:buSzTx/>
+              <a:buFontTx/>
+              <a:buNone/>
+              <a:tabLst/>
+              <a:defRPr/>
+            </a:pPr>
+            <a:fld id="{AE9ECEFE-5C53-4261-924B-F0AA5F7E0BB8}" type="slidenum">
+              <a:rPr kumimoji="0" lang="en-US" sz="1200" b="0" i="0" u="none" strike="noStrike" kern="1200" cap="none" spc="0" normalizeH="0" baseline="0" noProof="0" smtClean="0">
+                <a:ln>
+                  <a:noFill/>
+                </a:ln>
+                <a:solidFill>
+                  <a:prstClr val="black"/>
+                </a:solidFill>
+                <a:effectLst/>
+                <a:uLnTx/>
+                <a:uFillTx/>
+                <a:latin typeface="Calibri" panose="020F0502020204030204"/>
+                <a:ea typeface="+mn-ea"/>
+                <a:cs typeface="+mn-cs"/>
+              </a:rPr>
+              <a:pPr marL="0" marR="0" lvl="0" indent="0" algn="r" defTabSz="914400" rtl="0" eaLnBrk="1" fontAlgn="auto" latinLnBrk="0" hangingPunct="1">
+                <a:lnSpc>
+                  <a:spcPct val="100000"/>
+                </a:lnSpc>
+                <a:spcBef>
+                  <a:spcPts val="0"/>
+                </a:spcBef>
+                <a:spcAft>
+                  <a:spcPts val="0"/>
+                </a:spcAft>
+                <a:buClrTx/>
+                <a:buSzTx/>
+                <a:buFontTx/>
+                <a:buNone/>
+                <a:tabLst/>
+                <a:defRPr/>
+              </a:pPr>
+              <a:t>17</a:t>
+            </a:fld>
+            <a:endParaRPr kumimoji="0" lang="en-US" sz="1200" b="0" i="0" u="none" strike="noStrike" kern="1200" cap="none" spc="0" normalizeH="0" baseline="0" noProof="0">
+              <a:ln>
+                <a:noFill/>
+              </a:ln>
+              <a:solidFill>
+                <a:prstClr val="black"/>
+              </a:solidFill>
+              <a:effectLst/>
+              <a:uLnTx/>
+              <a:uFillTx/>
+              <a:latin typeface="Calibri" panose="020F0502020204030204"/>
+              <a:ea typeface="+mn-ea"/>
+              <a:cs typeface="+mn-cs"/>
+            </a:endParaRPr>
+          </a:p>
+        </p:txBody>
+      </p:sp>
+    </p:spTree>
+    <p:extLst>
+      <p:ext uri="{BB962C8B-B14F-4D97-AF65-F5344CB8AC3E}">
+        <p14:creationId xmlns:p14="http://schemas.microsoft.com/office/powerpoint/2010/main" val="3548995294"/>
+      </p:ext>
+    </p:extLst>
+  </p:cSld>
+  <p:clrMapOvr>
+    <a:masterClrMapping/>
+  </p:clrMapOvr>
+</p:notes>
+</file>
+
+<file path=ppt/notesSlides/notesSlide7.xml><?xml version="1.0" encoding="utf-8"?>
+<p:notes xmlns:a="http://schemas.openxmlformats.org/drawingml/2006/main" xmlns:r="http://schemas.openxmlformats.org/officeDocument/2006/relationships" xmlns:p="http://schemas.openxmlformats.org/presentationml/2006/main">
+  <p:cSld>
+    <p:spTree>
+      <p:nvGrpSpPr>
+        <p:cNvPr id="1" name=""/>
+        <p:cNvGrpSpPr/>
+        <p:nvPr/>
+      </p:nvGrpSpPr>
+      <p:grpSpPr>
+        <a:xfrm>
+          <a:off x="0" y="0"/>
+          <a:ext cx="0" cy="0"/>
+          <a:chOff x="0" y="0"/>
+          <a:chExt cx="0" cy="0"/>
+        </a:xfrm>
+      </p:grpSpPr>
+      <p:sp>
+        <p:nvSpPr>
+          <p:cNvPr id="2" name="Slide Image Placeholder 1"/>
+          <p:cNvSpPr>
+            <a:spLocks noGrp="1" noRot="1" noChangeAspect="1"/>
+          </p:cNvSpPr>
+          <p:nvPr>
+            <p:ph type="sldImg"/>
+          </p:nvPr>
+        </p:nvSpPr>
+        <p:spPr/>
+      </p:sp>
+      <p:sp>
+        <p:nvSpPr>
+          <p:cNvPr id="3" name="Notes Placeholder 2"/>
+          <p:cNvSpPr>
+            <a:spLocks noGrp="1"/>
+          </p:cNvSpPr>
+          <p:nvPr>
+            <p:ph type="body" idx="1"/>
+          </p:nvPr>
+        </p:nvSpPr>
+        <p:spPr/>
+        <p:txBody>
+          <a:bodyPr/>
+          <a:lstStyle/>
+          <a:p>
+            <a:pPr marL="285750" indent="-285750">
+              <a:buFont typeface="Arial" panose="020B0604020202020204" pitchFamily="34" charset="0"/>
+              <a:buChar char="•"/>
+            </a:pPr>
+            <a:r>
+              <a:rPr lang="en-US" sz="1200" dirty="0"/>
+              <a:t>Sometimes our computer notifications can cause a bit of a stressful spike in our bodies when we hear that jingle or notification noise. (pop </a:t>
+            </a:r>
+            <a:r>
+              <a:rPr lang="en-US" sz="1200" dirty="0" err="1"/>
+              <a:t>pop</a:t>
+            </a:r>
+            <a:r>
+              <a:rPr lang="en-US" sz="1200" dirty="0"/>
+              <a:t> </a:t>
+            </a:r>
+            <a:r>
+              <a:rPr lang="en-US" sz="1200" dirty="0" err="1"/>
+              <a:t>pop</a:t>
+            </a:r>
+            <a:r>
+              <a:rPr lang="en-US" sz="1200" dirty="0"/>
+              <a:t> brush </a:t>
+            </a:r>
+            <a:r>
+              <a:rPr lang="en-US" sz="1200" dirty="0" err="1"/>
+              <a:t>brush</a:t>
+            </a:r>
+            <a:r>
+              <a:rPr lang="en-US" sz="1200" dirty="0"/>
+              <a:t> brush)</a:t>
+            </a:r>
+          </a:p>
+          <a:p>
+            <a:pPr marL="285750" indent="-285750">
+              <a:buFont typeface="Arial" panose="020B0604020202020204" pitchFamily="34" charset="0"/>
+              <a:buChar char="•"/>
+            </a:pPr>
+            <a:endParaRPr lang="en-US" sz="1200" dirty="0"/>
+          </a:p>
+          <a:p>
+            <a:pPr marL="285750" indent="-285750">
+              <a:buFont typeface="Arial" panose="020B0604020202020204" pitchFamily="34" charset="0"/>
+              <a:buChar char="•"/>
+            </a:pPr>
+            <a:r>
+              <a:rPr lang="en-US" sz="1200" dirty="0"/>
+              <a:t>In a healthy group setting, those notifications can perk you up and bring motivation to your work-flow!</a:t>
+            </a:r>
+          </a:p>
+          <a:p>
+            <a:pPr marL="285750" indent="-285750">
+              <a:buFont typeface="Arial" panose="020B0604020202020204" pitchFamily="34" charset="0"/>
+              <a:buChar char="•"/>
+            </a:pPr>
+            <a:endParaRPr lang="en-US" sz="1200" dirty="0"/>
+          </a:p>
+          <a:p>
+            <a:pPr marL="285750" indent="-285750">
+              <a:buFont typeface="Arial" panose="020B0604020202020204" pitchFamily="34" charset="0"/>
+              <a:buChar char="•"/>
+            </a:pPr>
+            <a:r>
+              <a:rPr lang="en-US" sz="1200" dirty="0"/>
+              <a:t>Efficiency is always important, especially in the tech world. However, we find our group is most efficient when we are all laughing with each other.</a:t>
+            </a:r>
+          </a:p>
+          <a:p>
+            <a:endParaRPr lang="en-US" dirty="0"/>
+          </a:p>
+        </p:txBody>
+      </p:sp>
+      <p:sp>
+        <p:nvSpPr>
+          <p:cNvPr id="4" name="Slide Number Placeholder 3"/>
+          <p:cNvSpPr>
+            <a:spLocks noGrp="1"/>
+          </p:cNvSpPr>
+          <p:nvPr>
+            <p:ph type="sldNum" sz="quarter" idx="5"/>
+          </p:nvPr>
+        </p:nvSpPr>
+        <p:spPr/>
+        <p:txBody>
+          <a:bodyPr/>
+          <a:lstStyle/>
+          <a:p>
+            <a:pPr marL="0" marR="0" lvl="0" indent="0" algn="r" defTabSz="914400" rtl="0" eaLnBrk="1" fontAlgn="auto" latinLnBrk="0" hangingPunct="1">
+              <a:lnSpc>
+                <a:spcPct val="100000"/>
+              </a:lnSpc>
+              <a:spcBef>
+                <a:spcPts val="0"/>
+              </a:spcBef>
+              <a:spcAft>
+                <a:spcPts val="0"/>
+              </a:spcAft>
+              <a:buClrTx/>
+              <a:buSzTx/>
+              <a:buFontTx/>
+              <a:buNone/>
+              <a:tabLst/>
+              <a:defRPr/>
+            </a:pPr>
+            <a:fld id="{AE9ECEFE-5C53-4261-924B-F0AA5F7E0BB8}" type="slidenum">
+              <a:rPr kumimoji="0" lang="en-US" sz="1200" b="0" i="0" u="none" strike="noStrike" kern="1200" cap="none" spc="0" normalizeH="0" baseline="0" noProof="0" smtClean="0">
+                <a:ln>
+                  <a:noFill/>
+                </a:ln>
+                <a:solidFill>
+                  <a:prstClr val="black"/>
+                </a:solidFill>
+                <a:effectLst/>
+                <a:uLnTx/>
+                <a:uFillTx/>
+                <a:latin typeface="Calibri" panose="020F0502020204030204"/>
+                <a:ea typeface="+mn-ea"/>
+                <a:cs typeface="+mn-cs"/>
+              </a:rPr>
+              <a:pPr marL="0" marR="0" lvl="0" indent="0" algn="r" defTabSz="914400" rtl="0" eaLnBrk="1" fontAlgn="auto" latinLnBrk="0" hangingPunct="1">
+                <a:lnSpc>
+                  <a:spcPct val="100000"/>
+                </a:lnSpc>
+                <a:spcBef>
+                  <a:spcPts val="0"/>
+                </a:spcBef>
+                <a:spcAft>
+                  <a:spcPts val="0"/>
+                </a:spcAft>
+                <a:buClrTx/>
+                <a:buSzTx/>
+                <a:buFontTx/>
+                <a:buNone/>
+                <a:tabLst/>
+                <a:defRPr/>
+              </a:pPr>
+              <a:t>18</a:t>
+            </a:fld>
+            <a:endParaRPr kumimoji="0" lang="en-US" sz="1200" b="0" i="0" u="none" strike="noStrike" kern="1200" cap="none" spc="0" normalizeH="0" baseline="0" noProof="0">
+              <a:ln>
+                <a:noFill/>
+              </a:ln>
+              <a:solidFill>
+                <a:prstClr val="black"/>
+              </a:solidFill>
+              <a:effectLst/>
+              <a:uLnTx/>
+              <a:uFillTx/>
+              <a:latin typeface="Calibri" panose="020F0502020204030204"/>
+              <a:ea typeface="+mn-ea"/>
+              <a:cs typeface="+mn-cs"/>
+            </a:endParaRPr>
+          </a:p>
+        </p:txBody>
+      </p:sp>
+    </p:spTree>
+    <p:extLst>
+      <p:ext uri="{BB962C8B-B14F-4D97-AF65-F5344CB8AC3E}">
+        <p14:creationId xmlns:p14="http://schemas.microsoft.com/office/powerpoint/2010/main" val="2785805056"/>
+      </p:ext>
+    </p:extLst>
+  </p:cSld>
+  <p:clrMapOvr>
+    <a:masterClrMapping/>
+  </p:clrMapOvr>
+</p:notes>
+</file>
+
+<file path=ppt/notesSlides/notesSlide8.xml><?xml version="1.0" encoding="utf-8"?>
+<p:notes xmlns:a="http://schemas.openxmlformats.org/drawingml/2006/main" xmlns:r="http://schemas.openxmlformats.org/officeDocument/2006/relationships" xmlns:p="http://schemas.openxmlformats.org/presentationml/2006/main">
+  <p:cSld>
+    <p:spTree>
+      <p:nvGrpSpPr>
+        <p:cNvPr id="1" name=""/>
+        <p:cNvGrpSpPr/>
+        <p:nvPr/>
+      </p:nvGrpSpPr>
+      <p:grpSpPr>
+        <a:xfrm>
+          <a:off x="0" y="0"/>
+          <a:ext cx="0" cy="0"/>
+          <a:chOff x="0" y="0"/>
+          <a:chExt cx="0" cy="0"/>
+        </a:xfrm>
+      </p:grpSpPr>
+      <p:sp>
+        <p:nvSpPr>
+          <p:cNvPr id="2" name="Slide Image Placeholder 1"/>
+          <p:cNvSpPr>
+            <a:spLocks noGrp="1" noRot="1" noChangeAspect="1"/>
+          </p:cNvSpPr>
+          <p:nvPr>
+            <p:ph type="sldImg"/>
+          </p:nvPr>
+        </p:nvSpPr>
+        <p:spPr/>
+      </p:sp>
+      <p:sp>
+        <p:nvSpPr>
+          <p:cNvPr id="3" name="Notes Placeholder 2"/>
+          <p:cNvSpPr>
+            <a:spLocks noGrp="1"/>
+          </p:cNvSpPr>
+          <p:nvPr>
+            <p:ph type="body" idx="1"/>
+          </p:nvPr>
+        </p:nvSpPr>
+        <p:spPr/>
+        <p:txBody>
+          <a:bodyPr/>
+          <a:lstStyle/>
+          <a:p>
+            <a:endParaRPr lang="en-US"/>
+          </a:p>
+        </p:txBody>
+      </p:sp>
+      <p:sp>
+        <p:nvSpPr>
+          <p:cNvPr id="4" name="Slide Number Placeholder 3"/>
+          <p:cNvSpPr>
+            <a:spLocks noGrp="1"/>
+          </p:cNvSpPr>
+          <p:nvPr>
+            <p:ph type="sldNum" sz="quarter" idx="5"/>
+          </p:nvPr>
+        </p:nvSpPr>
+        <p:spPr/>
+        <p:txBody>
+          <a:bodyPr/>
+          <a:lstStyle/>
+          <a:p>
             <a:fld id="{FCFED414-B8BD-4977-925E-1C2AFAB354A8}" type="slidenum">
               <a:rPr lang="en-US" smtClean="0"/>
-              <a:t>13</a:t>
+              <a:t>19</a:t>
             </a:fld>
             <a:endParaRPr lang="en-US"/>
           </a:p>
@@ -1135,7 +2383,7 @@
           <a:p>
             <a:fld id="{8F7D2F49-1857-4E7D-8050-DC698401AAB7}" type="datetimeFigureOut">
               <a:rPr lang="en-US" smtClean="0"/>
-              <a:t>6/22/2024</a:t>
+              <a:t>7/7/2024</a:t>
             </a:fld>
             <a:endParaRPr lang="en-US"/>
           </a:p>
@@ -2482,7 +3730,7 @@
           <a:p>
             <a:fld id="{8F7D2F49-1857-4E7D-8050-DC698401AAB7}" type="datetimeFigureOut">
               <a:rPr lang="en-US" smtClean="0"/>
-              <a:t>6/22/2024</a:t>
+              <a:t>7/7/2024</a:t>
             </a:fld>
             <a:endParaRPr lang="en-US"/>
           </a:p>
@@ -3753,7 +5001,7 @@
         <p:spPr>
           <a:xfrm>
             <a:off x="838200" y="290652"/>
-            <a:ext cx="10941908" cy="780769"/>
+            <a:ext cx="10515600" cy="780769"/>
           </a:xfrm>
         </p:spPr>
         <p:txBody>
@@ -3761,7 +5009,7 @@
           <a:lstStyle/>
           <a:p>
             <a:r>
-              <a:rPr lang="en-US"/>
+              <a:rPr lang="en-US" dirty="0"/>
               <a:t>Student Experience (Steven Gsell)</a:t>
             </a:r>
           </a:p>
@@ -3785,8 +5033,8 @@
         </p:nvSpPr>
         <p:spPr>
           <a:xfrm>
-            <a:off x="838200" y="1071421"/>
-            <a:ext cx="10515600" cy="4851584"/>
+            <a:off x="838200" y="1307939"/>
+            <a:ext cx="10515600" cy="4615066"/>
           </a:xfrm>
         </p:spPr>
         <p:txBody>
@@ -3795,26 +5043,42 @@
           </a:bodyPr>
           <a:lstStyle/>
           <a:p>
-            <a:pPr marL="169863" indent="-169863">
-              <a:lnSpc>
-                <a:spcPct val="120000"/>
-              </a:lnSpc>
-              <a:spcBef>
-                <a:spcPts val="500"/>
-              </a:spcBef>
-            </a:pPr>
-            <a:endParaRPr lang="en-US" sz="1800" b="1">
-              <a:solidFill>
-                <a:srgbClr val="000000"/>
-              </a:solidFill>
-            </a:endParaRPr>
+            <a:r>
+              <a:rPr lang="en-US" dirty="0"/>
+              <a:t>Yes, it sounds just like the animal!</a:t>
+            </a:r>
+          </a:p>
+          <a:p>
+            <a:r>
+              <a:rPr lang="en-US" sz="2800" dirty="0"/>
+              <a:t>Current FSCJ student pursuing B.A.S in Computer Information Systems</a:t>
+            </a:r>
+          </a:p>
+          <a:p>
+            <a:r>
+              <a:rPr lang="en-US" dirty="0"/>
+              <a:t>Focus on software development</a:t>
+            </a:r>
+          </a:p>
+          <a:p>
+            <a:r>
+              <a:rPr lang="en-US" sz="2800" dirty="0"/>
+              <a:t>Been using Slack in multiple classes throughout education at FSCJ</a:t>
+            </a:r>
+          </a:p>
+          <a:p>
+            <a:r>
+              <a:rPr lang="en-US" dirty="0"/>
+              <a:t>Observed how Slack can add cohesion of communication in groups</a:t>
+            </a:r>
+            <a:endParaRPr lang="en-US" sz="2800" dirty="0"/>
           </a:p>
         </p:txBody>
       </p:sp>
     </p:spTree>
     <p:extLst>
       <p:ext uri="{BB962C8B-B14F-4D97-AF65-F5344CB8AC3E}">
-        <p14:creationId xmlns:p14="http://schemas.microsoft.com/office/powerpoint/2010/main" val="928223919"/>
+        <p14:creationId xmlns:p14="http://schemas.microsoft.com/office/powerpoint/2010/main" val="985310508"/>
       </p:ext>
     </p:extLst>
   </p:cSld>
@@ -3825,6 +5089,2190 @@
 </file>
 
 <file path=ppt/slides/slide13.xml><?xml version="1.0" encoding="utf-8"?>
+<p:sld xmlns:a="http://schemas.openxmlformats.org/drawingml/2006/main" xmlns:r="http://schemas.openxmlformats.org/officeDocument/2006/relationships" xmlns:p="http://schemas.openxmlformats.org/presentationml/2006/main">
+  <p:cSld>
+    <p:spTree>
+      <p:nvGrpSpPr>
+        <p:cNvPr id="1" name=""/>
+        <p:cNvGrpSpPr/>
+        <p:nvPr/>
+      </p:nvGrpSpPr>
+      <p:grpSpPr>
+        <a:xfrm>
+          <a:off x="0" y="0"/>
+          <a:ext cx="0" cy="0"/>
+          <a:chOff x="0" y="0"/>
+          <a:chExt cx="0" cy="0"/>
+        </a:xfrm>
+      </p:grpSpPr>
+      <p:sp>
+        <p:nvSpPr>
+          <p:cNvPr id="2" name="Title 1">
+            <a:extLst>
+              <a:ext uri="{FF2B5EF4-FFF2-40B4-BE49-F238E27FC236}">
+                <a16:creationId xmlns:a16="http://schemas.microsoft.com/office/drawing/2014/main" id="{1193C801-427D-4761-B139-63C3D71F6842}"/>
+              </a:ext>
+            </a:extLst>
+          </p:cNvPr>
+          <p:cNvSpPr>
+            <a:spLocks noGrp="1"/>
+          </p:cNvSpPr>
+          <p:nvPr>
+            <p:ph type="title"/>
+          </p:nvPr>
+        </p:nvSpPr>
+        <p:spPr>
+          <a:xfrm>
+            <a:off x="838200" y="290652"/>
+            <a:ext cx="10515600" cy="780769"/>
+          </a:xfrm>
+        </p:spPr>
+        <p:txBody>
+          <a:bodyPr/>
+          <a:lstStyle/>
+          <a:p>
+            <a:r>
+              <a:rPr lang="en-US" dirty="0"/>
+              <a:t>Allows for Group Problem Solving</a:t>
+            </a:r>
+          </a:p>
+        </p:txBody>
+      </p:sp>
+      <p:pic>
+        <p:nvPicPr>
+          <p:cNvPr id="5" name="Content Placeholder 4">
+            <a:extLst>
+              <a:ext uri="{FF2B5EF4-FFF2-40B4-BE49-F238E27FC236}">
+                <a16:creationId xmlns:a16="http://schemas.microsoft.com/office/drawing/2014/main" id="{54FA8369-B24F-3DFD-C8A1-C0B1C986F776}"/>
+              </a:ext>
+            </a:extLst>
+          </p:cNvPr>
+          <p:cNvPicPr>
+            <a:picLocks noGrp="1" noChangeAspect="1"/>
+          </p:cNvPicPr>
+          <p:nvPr>
+            <p:ph idx="1"/>
+          </p:nvPr>
+        </p:nvPicPr>
+        <p:blipFill>
+          <a:blip r:embed="rId3">
+            <a:extLst>
+              <a:ext uri="{28A0092B-C50C-407E-A947-70E740481C1C}">
+                <a14:useLocalDpi xmlns:a14="http://schemas.microsoft.com/office/drawing/2010/main" val="0"/>
+              </a:ext>
+            </a:extLst>
+          </a:blip>
+          <a:srcRect/>
+          <a:stretch/>
+        </p:blipFill>
+        <p:spPr>
+          <a:xfrm>
+            <a:off x="6096000" y="1121568"/>
+            <a:ext cx="5441405" cy="4614863"/>
+          </a:xfrm>
+          <a:effectLst>
+            <a:outerShdw blurRad="190500" dist="38100" dir="2700000" sx="102000" sy="102000" algn="tl" rotWithShape="0">
+              <a:prstClr val="black">
+                <a:alpha val="40000"/>
+              </a:prstClr>
+            </a:outerShdw>
+          </a:effectLst>
+        </p:spPr>
+      </p:pic>
+      <p:sp>
+        <p:nvSpPr>
+          <p:cNvPr id="10" name="TextBox 9">
+            <a:extLst>
+              <a:ext uri="{FF2B5EF4-FFF2-40B4-BE49-F238E27FC236}">
+                <a16:creationId xmlns:a16="http://schemas.microsoft.com/office/drawing/2014/main" id="{978843E6-49FE-CE26-265D-A2D19E4793C0}"/>
+              </a:ext>
+            </a:extLst>
+          </p:cNvPr>
+          <p:cNvSpPr txBox="1"/>
+          <p:nvPr/>
+        </p:nvSpPr>
+        <p:spPr>
+          <a:xfrm>
+            <a:off x="838200" y="1238081"/>
+            <a:ext cx="4915237" cy="3785652"/>
+          </a:xfrm>
+          <a:prstGeom prst="rect">
+            <a:avLst/>
+          </a:prstGeom>
+          <a:noFill/>
+        </p:spPr>
+        <p:txBody>
+          <a:bodyPr wrap="square" rtlCol="0">
+            <a:spAutoFit/>
+          </a:bodyPr>
+          <a:lstStyle/>
+          <a:p>
+            <a:pPr marL="285750" marR="0" lvl="0" indent="-285750" algn="l" defTabSz="914400" rtl="0" eaLnBrk="1" fontAlgn="auto" latinLnBrk="0" hangingPunct="1">
+              <a:lnSpc>
+                <a:spcPct val="100000"/>
+              </a:lnSpc>
+              <a:spcBef>
+                <a:spcPts val="0"/>
+              </a:spcBef>
+              <a:spcAft>
+                <a:spcPts val="0"/>
+              </a:spcAft>
+              <a:buClrTx/>
+              <a:buSzTx/>
+              <a:buFont typeface="Arial" panose="020B0604020202020204" pitchFamily="34" charset="0"/>
+              <a:buChar char="•"/>
+              <a:tabLst/>
+              <a:defRPr/>
+            </a:pPr>
+            <a:r>
+              <a:rPr kumimoji="0" lang="en-US" sz="2000" b="0" i="0" u="none" strike="noStrike" kern="1200" cap="none" spc="0" normalizeH="0" baseline="0" noProof="0" dirty="0">
+                <a:ln>
+                  <a:noFill/>
+                </a:ln>
+                <a:solidFill>
+                  <a:srgbClr val="007598"/>
+                </a:solidFill>
+                <a:effectLst/>
+                <a:uLnTx/>
+                <a:uFillTx/>
+                <a:latin typeface="Calibri" panose="020F0502020204030204"/>
+                <a:ea typeface="+mn-ea"/>
+                <a:cs typeface="+mn-cs"/>
+              </a:rPr>
+              <a:t>Software projects in a class setting can be chaotic without clear communication</a:t>
+            </a:r>
+          </a:p>
+          <a:p>
+            <a:pPr marL="285750" marR="0" lvl="0" indent="-285750" algn="l" defTabSz="914400" rtl="0" eaLnBrk="1" fontAlgn="auto" latinLnBrk="0" hangingPunct="1">
+              <a:lnSpc>
+                <a:spcPct val="100000"/>
+              </a:lnSpc>
+              <a:spcBef>
+                <a:spcPts val="0"/>
+              </a:spcBef>
+              <a:spcAft>
+                <a:spcPts val="0"/>
+              </a:spcAft>
+              <a:buClrTx/>
+              <a:buSzTx/>
+              <a:buFont typeface="Arial" panose="020B0604020202020204" pitchFamily="34" charset="0"/>
+              <a:buChar char="•"/>
+              <a:tabLst/>
+              <a:defRPr/>
+            </a:pPr>
+            <a:endParaRPr kumimoji="0" lang="en-US" sz="2000" b="0" i="0" u="none" strike="noStrike" kern="1200" cap="none" spc="0" normalizeH="0" baseline="0" noProof="0" dirty="0">
+              <a:ln>
+                <a:noFill/>
+              </a:ln>
+              <a:solidFill>
+                <a:srgbClr val="007598"/>
+              </a:solidFill>
+              <a:effectLst/>
+              <a:uLnTx/>
+              <a:uFillTx/>
+              <a:latin typeface="Calibri" panose="020F0502020204030204"/>
+              <a:ea typeface="+mn-ea"/>
+              <a:cs typeface="+mn-cs"/>
+            </a:endParaRPr>
+          </a:p>
+          <a:p>
+            <a:pPr marL="285750" marR="0" lvl="0" indent="-285750" algn="l" defTabSz="914400" rtl="0" eaLnBrk="1" fontAlgn="auto" latinLnBrk="0" hangingPunct="1">
+              <a:lnSpc>
+                <a:spcPct val="100000"/>
+              </a:lnSpc>
+              <a:spcBef>
+                <a:spcPts val="0"/>
+              </a:spcBef>
+              <a:spcAft>
+                <a:spcPts val="0"/>
+              </a:spcAft>
+              <a:buClrTx/>
+              <a:buSzTx/>
+              <a:buFont typeface="Arial" panose="020B0604020202020204" pitchFamily="34" charset="0"/>
+              <a:buChar char="•"/>
+              <a:tabLst/>
+              <a:defRPr/>
+            </a:pPr>
+            <a:r>
+              <a:rPr kumimoji="0" lang="en-US" sz="2000" b="0" i="0" u="none" strike="noStrike" kern="1200" cap="none" spc="0" normalizeH="0" baseline="0" noProof="0" dirty="0">
+                <a:ln>
+                  <a:noFill/>
+                </a:ln>
+                <a:solidFill>
+                  <a:srgbClr val="007598"/>
+                </a:solidFill>
+                <a:effectLst/>
+                <a:uLnTx/>
+                <a:uFillTx/>
+                <a:latin typeface="Calibri" panose="020F0502020204030204"/>
+                <a:ea typeface="+mn-ea"/>
+                <a:cs typeface="+mn-cs"/>
+              </a:rPr>
+              <a:t>We are all learning and perhaps working with several new technologies for the first time. We are also learning HOW to learn in a fast-paced tech environment.</a:t>
+            </a:r>
+          </a:p>
+          <a:p>
+            <a:pPr marL="285750" marR="0" lvl="0" indent="-285750" algn="l" defTabSz="914400" rtl="0" eaLnBrk="1" fontAlgn="auto" latinLnBrk="0" hangingPunct="1">
+              <a:lnSpc>
+                <a:spcPct val="100000"/>
+              </a:lnSpc>
+              <a:spcBef>
+                <a:spcPts val="0"/>
+              </a:spcBef>
+              <a:spcAft>
+                <a:spcPts val="0"/>
+              </a:spcAft>
+              <a:buClrTx/>
+              <a:buSzTx/>
+              <a:buFont typeface="Arial" panose="020B0604020202020204" pitchFamily="34" charset="0"/>
+              <a:buChar char="•"/>
+              <a:tabLst/>
+              <a:defRPr/>
+            </a:pPr>
+            <a:endParaRPr kumimoji="0" lang="en-US" sz="2000" b="0" i="0" u="none" strike="noStrike" kern="1200" cap="none" spc="0" normalizeH="0" baseline="0" noProof="0" dirty="0">
+              <a:ln>
+                <a:noFill/>
+              </a:ln>
+              <a:solidFill>
+                <a:srgbClr val="007598"/>
+              </a:solidFill>
+              <a:effectLst/>
+              <a:uLnTx/>
+              <a:uFillTx/>
+              <a:latin typeface="Calibri" panose="020F0502020204030204"/>
+              <a:ea typeface="+mn-ea"/>
+              <a:cs typeface="+mn-cs"/>
+            </a:endParaRPr>
+          </a:p>
+          <a:p>
+            <a:pPr marL="285750" marR="0" lvl="0" indent="-285750" algn="l" defTabSz="914400" rtl="0" eaLnBrk="1" fontAlgn="auto" latinLnBrk="0" hangingPunct="1">
+              <a:lnSpc>
+                <a:spcPct val="100000"/>
+              </a:lnSpc>
+              <a:spcBef>
+                <a:spcPts val="0"/>
+              </a:spcBef>
+              <a:spcAft>
+                <a:spcPts val="0"/>
+              </a:spcAft>
+              <a:buClrTx/>
+              <a:buSzTx/>
+              <a:buFont typeface="Arial" panose="020B0604020202020204" pitchFamily="34" charset="0"/>
+              <a:buChar char="•"/>
+              <a:tabLst/>
+              <a:defRPr/>
+            </a:pPr>
+            <a:r>
+              <a:rPr kumimoji="0" lang="en-US" sz="2000" b="0" i="0" u="none" strike="noStrike" kern="1200" cap="none" spc="0" normalizeH="0" baseline="0" noProof="0" dirty="0">
+                <a:ln>
+                  <a:noFill/>
+                </a:ln>
+                <a:solidFill>
+                  <a:srgbClr val="007598"/>
+                </a:solidFill>
+                <a:effectLst/>
+                <a:uLnTx/>
+                <a:uFillTx/>
+                <a:latin typeface="Calibri" panose="020F0502020204030204"/>
+                <a:ea typeface="+mn-ea"/>
+                <a:cs typeface="+mn-cs"/>
+              </a:rPr>
+              <a:t>When our groups run into problems, Slack allows us to pinpoint the problem as a group and see the clear solution when someone finds it!</a:t>
+            </a:r>
+          </a:p>
+        </p:txBody>
+      </p:sp>
+    </p:spTree>
+    <p:extLst>
+      <p:ext uri="{BB962C8B-B14F-4D97-AF65-F5344CB8AC3E}">
+        <p14:creationId xmlns:p14="http://schemas.microsoft.com/office/powerpoint/2010/main" val="504903178"/>
+      </p:ext>
+    </p:extLst>
+  </p:cSld>
+  <p:clrMapOvr>
+    <a:masterClrMapping/>
+  </p:clrMapOvr>
+</p:sld>
+</file>
+
+<file path=ppt/slides/slide14.xml><?xml version="1.0" encoding="utf-8"?>
+<p:sld xmlns:a="http://schemas.openxmlformats.org/drawingml/2006/main" xmlns:r="http://schemas.openxmlformats.org/officeDocument/2006/relationships" xmlns:p="http://schemas.openxmlformats.org/presentationml/2006/main">
+  <p:cSld>
+    <p:spTree>
+      <p:nvGrpSpPr>
+        <p:cNvPr id="1" name=""/>
+        <p:cNvGrpSpPr/>
+        <p:nvPr/>
+      </p:nvGrpSpPr>
+      <p:grpSpPr>
+        <a:xfrm>
+          <a:off x="0" y="0"/>
+          <a:ext cx="0" cy="0"/>
+          <a:chOff x="0" y="0"/>
+          <a:chExt cx="0" cy="0"/>
+        </a:xfrm>
+      </p:grpSpPr>
+      <p:sp>
+        <p:nvSpPr>
+          <p:cNvPr id="2" name="Title 1">
+            <a:extLst>
+              <a:ext uri="{FF2B5EF4-FFF2-40B4-BE49-F238E27FC236}">
+                <a16:creationId xmlns:a16="http://schemas.microsoft.com/office/drawing/2014/main" id="{1193C801-427D-4761-B139-63C3D71F6842}"/>
+              </a:ext>
+            </a:extLst>
+          </p:cNvPr>
+          <p:cNvSpPr>
+            <a:spLocks noGrp="1"/>
+          </p:cNvSpPr>
+          <p:nvPr>
+            <p:ph type="title"/>
+          </p:nvPr>
+        </p:nvSpPr>
+        <p:spPr>
+          <a:xfrm>
+            <a:off x="838200" y="290652"/>
+            <a:ext cx="10515600" cy="780769"/>
+          </a:xfrm>
+        </p:spPr>
+        <p:txBody>
+          <a:bodyPr/>
+          <a:lstStyle/>
+          <a:p>
+            <a:r>
+              <a:rPr lang="en-US" dirty="0"/>
+              <a:t>Allows Organized Group Separation </a:t>
+            </a:r>
+          </a:p>
+        </p:txBody>
+      </p:sp>
+      <p:sp>
+        <p:nvSpPr>
+          <p:cNvPr id="10" name="TextBox 9">
+            <a:extLst>
+              <a:ext uri="{FF2B5EF4-FFF2-40B4-BE49-F238E27FC236}">
+                <a16:creationId xmlns:a16="http://schemas.microsoft.com/office/drawing/2014/main" id="{978843E6-49FE-CE26-265D-A2D19E4793C0}"/>
+              </a:ext>
+            </a:extLst>
+          </p:cNvPr>
+          <p:cNvSpPr txBox="1"/>
+          <p:nvPr/>
+        </p:nvSpPr>
+        <p:spPr>
+          <a:xfrm>
+            <a:off x="838200" y="1238081"/>
+            <a:ext cx="4915237" cy="3170099"/>
+          </a:xfrm>
+          <a:prstGeom prst="rect">
+            <a:avLst/>
+          </a:prstGeom>
+          <a:noFill/>
+        </p:spPr>
+        <p:txBody>
+          <a:bodyPr wrap="square" rtlCol="0">
+            <a:spAutoFit/>
+          </a:bodyPr>
+          <a:lstStyle/>
+          <a:p>
+            <a:pPr marL="285750" marR="0" lvl="0" indent="-285750" algn="l" defTabSz="914400" rtl="0" eaLnBrk="1" fontAlgn="auto" latinLnBrk="0" hangingPunct="1">
+              <a:lnSpc>
+                <a:spcPct val="100000"/>
+              </a:lnSpc>
+              <a:spcBef>
+                <a:spcPts val="0"/>
+              </a:spcBef>
+              <a:spcAft>
+                <a:spcPts val="0"/>
+              </a:spcAft>
+              <a:buClrTx/>
+              <a:buSzTx/>
+              <a:buFont typeface="Arial" panose="020B0604020202020204" pitchFamily="34" charset="0"/>
+              <a:buChar char="•"/>
+              <a:tabLst/>
+              <a:defRPr/>
+            </a:pPr>
+            <a:r>
+              <a:rPr kumimoji="0" lang="en-US" sz="2000" b="0" i="0" u="none" strike="noStrike" kern="1200" cap="none" spc="0" normalizeH="0" baseline="0" noProof="0" dirty="0">
+                <a:ln>
+                  <a:noFill/>
+                </a:ln>
+                <a:solidFill>
+                  <a:srgbClr val="007598"/>
+                </a:solidFill>
+                <a:effectLst/>
+                <a:uLnTx/>
+                <a:uFillTx/>
+                <a:latin typeface="Calibri" panose="020F0502020204030204"/>
+                <a:ea typeface="+mn-ea"/>
+                <a:cs typeface="+mn-cs"/>
+              </a:rPr>
+              <a:t>Juggling different groups can quickly become a chore without the proper tools.</a:t>
+            </a:r>
+          </a:p>
+          <a:p>
+            <a:pPr marL="285750" marR="0" lvl="0" indent="-285750" algn="l" defTabSz="914400" rtl="0" eaLnBrk="1" fontAlgn="auto" latinLnBrk="0" hangingPunct="1">
+              <a:lnSpc>
+                <a:spcPct val="100000"/>
+              </a:lnSpc>
+              <a:spcBef>
+                <a:spcPts val="0"/>
+              </a:spcBef>
+              <a:spcAft>
+                <a:spcPts val="0"/>
+              </a:spcAft>
+              <a:buClrTx/>
+              <a:buSzTx/>
+              <a:buFont typeface="Arial" panose="020B0604020202020204" pitchFamily="34" charset="0"/>
+              <a:buChar char="•"/>
+              <a:tabLst/>
+              <a:defRPr/>
+            </a:pPr>
+            <a:endParaRPr kumimoji="0" lang="en-US" sz="2000" b="0" i="0" u="none" strike="noStrike" kern="1200" cap="none" spc="0" normalizeH="0" baseline="0" noProof="0" dirty="0">
+              <a:ln>
+                <a:noFill/>
+              </a:ln>
+              <a:solidFill>
+                <a:srgbClr val="007598"/>
+              </a:solidFill>
+              <a:effectLst/>
+              <a:uLnTx/>
+              <a:uFillTx/>
+              <a:latin typeface="Calibri" panose="020F0502020204030204"/>
+              <a:ea typeface="+mn-ea"/>
+              <a:cs typeface="+mn-cs"/>
+            </a:endParaRPr>
+          </a:p>
+          <a:p>
+            <a:pPr marL="285750" marR="0" lvl="0" indent="-285750" algn="l" defTabSz="914400" rtl="0" eaLnBrk="1" fontAlgn="auto" latinLnBrk="0" hangingPunct="1">
+              <a:lnSpc>
+                <a:spcPct val="100000"/>
+              </a:lnSpc>
+              <a:spcBef>
+                <a:spcPts val="0"/>
+              </a:spcBef>
+              <a:spcAft>
+                <a:spcPts val="0"/>
+              </a:spcAft>
+              <a:buClrTx/>
+              <a:buSzTx/>
+              <a:buFont typeface="Arial" panose="020B0604020202020204" pitchFamily="34" charset="0"/>
+              <a:buChar char="•"/>
+              <a:tabLst/>
+              <a:defRPr/>
+            </a:pPr>
+            <a:r>
+              <a:rPr kumimoji="0" lang="en-US" sz="2000" b="0" i="0" u="none" strike="noStrike" kern="1200" cap="none" spc="0" normalizeH="0" baseline="0" noProof="0" dirty="0">
+                <a:ln>
+                  <a:noFill/>
+                </a:ln>
+                <a:solidFill>
+                  <a:srgbClr val="007598"/>
+                </a:solidFill>
+                <a:effectLst/>
+                <a:uLnTx/>
+                <a:uFillTx/>
+                <a:latin typeface="Calibri" panose="020F0502020204030204"/>
+                <a:ea typeface="+mn-ea"/>
+                <a:cs typeface="+mn-cs"/>
+              </a:rPr>
+              <a:t>Slack allows you to have multiple workspaces at once, with a user-friendly UI to jump between all your groups.</a:t>
+            </a:r>
+          </a:p>
+          <a:p>
+            <a:pPr marL="285750" marR="0" lvl="0" indent="-285750" algn="l" defTabSz="914400" rtl="0" eaLnBrk="1" fontAlgn="auto" latinLnBrk="0" hangingPunct="1">
+              <a:lnSpc>
+                <a:spcPct val="100000"/>
+              </a:lnSpc>
+              <a:spcBef>
+                <a:spcPts val="0"/>
+              </a:spcBef>
+              <a:spcAft>
+                <a:spcPts val="0"/>
+              </a:spcAft>
+              <a:buClrTx/>
+              <a:buSzTx/>
+              <a:buFont typeface="Arial" panose="020B0604020202020204" pitchFamily="34" charset="0"/>
+              <a:buChar char="•"/>
+              <a:tabLst/>
+              <a:defRPr/>
+            </a:pPr>
+            <a:endParaRPr kumimoji="0" lang="en-US" sz="2000" b="0" i="0" u="none" strike="noStrike" kern="1200" cap="none" spc="0" normalizeH="0" baseline="0" noProof="0" dirty="0">
+              <a:ln>
+                <a:noFill/>
+              </a:ln>
+              <a:solidFill>
+                <a:srgbClr val="007598"/>
+              </a:solidFill>
+              <a:effectLst/>
+              <a:uLnTx/>
+              <a:uFillTx/>
+              <a:latin typeface="Calibri" panose="020F0502020204030204"/>
+              <a:ea typeface="+mn-ea"/>
+              <a:cs typeface="+mn-cs"/>
+            </a:endParaRPr>
+          </a:p>
+          <a:p>
+            <a:pPr marL="285750" marR="0" lvl="0" indent="-285750" algn="l" defTabSz="914400" rtl="0" eaLnBrk="1" fontAlgn="auto" latinLnBrk="0" hangingPunct="1">
+              <a:lnSpc>
+                <a:spcPct val="100000"/>
+              </a:lnSpc>
+              <a:spcBef>
+                <a:spcPts val="0"/>
+              </a:spcBef>
+              <a:spcAft>
+                <a:spcPts val="0"/>
+              </a:spcAft>
+              <a:buClrTx/>
+              <a:buSzTx/>
+              <a:buFont typeface="Arial" panose="020B0604020202020204" pitchFamily="34" charset="0"/>
+              <a:buChar char="•"/>
+              <a:tabLst/>
+              <a:defRPr/>
+            </a:pPr>
+            <a:r>
+              <a:rPr kumimoji="0" lang="en-US" sz="2000" b="0" i="0" u="none" strike="noStrike" kern="1200" cap="none" spc="0" normalizeH="0" baseline="0" noProof="0" dirty="0">
+                <a:ln>
+                  <a:noFill/>
+                </a:ln>
+                <a:solidFill>
+                  <a:srgbClr val="007598"/>
+                </a:solidFill>
+                <a:effectLst/>
+                <a:uLnTx/>
+                <a:uFillTx/>
+                <a:latin typeface="Calibri" panose="020F0502020204030204"/>
+                <a:ea typeface="+mn-ea"/>
+                <a:cs typeface="+mn-cs"/>
+              </a:rPr>
+              <a:t>Having clearly defined workspaces allows for easy transitioning from one group to another. </a:t>
+            </a:r>
+          </a:p>
+        </p:txBody>
+      </p:sp>
+      <p:pic>
+        <p:nvPicPr>
+          <p:cNvPr id="6" name="Content Placeholder 5">
+            <a:extLst>
+              <a:ext uri="{FF2B5EF4-FFF2-40B4-BE49-F238E27FC236}">
+                <a16:creationId xmlns:a16="http://schemas.microsoft.com/office/drawing/2014/main" id="{2DCB6C17-1E8C-6E62-A772-C36B095C05BB}"/>
+              </a:ext>
+            </a:extLst>
+          </p:cNvPr>
+          <p:cNvPicPr>
+            <a:picLocks noGrp="1" noChangeAspect="1"/>
+          </p:cNvPicPr>
+          <p:nvPr>
+            <p:ph idx="1"/>
+          </p:nvPr>
+        </p:nvPicPr>
+        <p:blipFill>
+          <a:blip r:embed="rId3">
+            <a:extLst>
+              <a:ext uri="{28A0092B-C50C-407E-A947-70E740481C1C}">
+                <a14:useLocalDpi xmlns:a14="http://schemas.microsoft.com/office/drawing/2010/main" val="0"/>
+              </a:ext>
+            </a:extLst>
+          </a:blip>
+          <a:srcRect/>
+          <a:stretch/>
+        </p:blipFill>
+        <p:spPr>
+          <a:xfrm>
+            <a:off x="6322454" y="1376552"/>
+            <a:ext cx="5306327" cy="4104895"/>
+          </a:xfrm>
+          <a:effectLst>
+            <a:outerShdw blurRad="190500" dist="38100" dir="2700000" sx="102000" sy="102000" algn="tl" rotWithShape="0">
+              <a:prstClr val="black">
+                <a:alpha val="40000"/>
+              </a:prstClr>
+            </a:outerShdw>
+          </a:effectLst>
+        </p:spPr>
+      </p:pic>
+      <p:sp>
+        <p:nvSpPr>
+          <p:cNvPr id="12" name="Rectangle 11">
+            <a:extLst>
+              <a:ext uri="{FF2B5EF4-FFF2-40B4-BE49-F238E27FC236}">
+                <a16:creationId xmlns:a16="http://schemas.microsoft.com/office/drawing/2014/main" id="{9F0AB30B-54F0-1D78-1303-343918EB6B18}"/>
+              </a:ext>
+            </a:extLst>
+          </p:cNvPr>
+          <p:cNvSpPr/>
+          <p:nvPr/>
+        </p:nvSpPr>
+        <p:spPr>
+          <a:xfrm>
+            <a:off x="6202017" y="1749287"/>
+            <a:ext cx="2097157" cy="1808922"/>
+          </a:xfrm>
+          <a:prstGeom prst="rect">
+            <a:avLst/>
+          </a:prstGeom>
+          <a:noFill/>
+          <a:ln w="57150">
+            <a:solidFill>
+              <a:srgbClr val="FF0000"/>
+            </a:solidFill>
+          </a:ln>
+        </p:spPr>
+        <p:style>
+          <a:lnRef idx="2">
+            <a:schemeClr val="accent1">
+              <a:shade val="15000"/>
+            </a:schemeClr>
+          </a:lnRef>
+          <a:fillRef idx="1">
+            <a:schemeClr val="accent1"/>
+          </a:fillRef>
+          <a:effectRef idx="0">
+            <a:schemeClr val="accent1"/>
+          </a:effectRef>
+          <a:fontRef idx="minor">
+            <a:schemeClr val="lt1"/>
+          </a:fontRef>
+        </p:style>
+        <p:txBody>
+          <a:bodyPr rtlCol="0" anchor="ctr"/>
+          <a:lstStyle/>
+          <a:p>
+            <a:pPr marL="0" marR="0" lvl="0" indent="0" algn="ctr" defTabSz="914400" rtl="0" eaLnBrk="1" fontAlgn="auto" latinLnBrk="0" hangingPunct="1">
+              <a:lnSpc>
+                <a:spcPct val="100000"/>
+              </a:lnSpc>
+              <a:spcBef>
+                <a:spcPts val="0"/>
+              </a:spcBef>
+              <a:spcAft>
+                <a:spcPts val="0"/>
+              </a:spcAft>
+              <a:buClrTx/>
+              <a:buSzTx/>
+              <a:buFontTx/>
+              <a:buNone/>
+              <a:tabLst/>
+              <a:defRPr/>
+            </a:pPr>
+            <a:endParaRPr kumimoji="0" lang="en-US" sz="1800" b="0" i="0" u="none" strike="noStrike" kern="1200" cap="none" spc="0" normalizeH="0" baseline="0" noProof="0">
+              <a:ln>
+                <a:noFill/>
+              </a:ln>
+              <a:solidFill>
+                <a:srgbClr val="FFFFFF"/>
+              </a:solidFill>
+              <a:effectLst/>
+              <a:uLnTx/>
+              <a:uFillTx/>
+              <a:latin typeface="Calibri" panose="020F0502020204030204"/>
+              <a:ea typeface="+mn-ea"/>
+              <a:cs typeface="+mn-cs"/>
+            </a:endParaRPr>
+          </a:p>
+        </p:txBody>
+      </p:sp>
+      <p:sp>
+        <p:nvSpPr>
+          <p:cNvPr id="11" name="Arrow: Right 10">
+            <a:extLst>
+              <a:ext uri="{FF2B5EF4-FFF2-40B4-BE49-F238E27FC236}">
+                <a16:creationId xmlns:a16="http://schemas.microsoft.com/office/drawing/2014/main" id="{828A5158-6DF2-C82B-41BB-8DDCA4199DCE}"/>
+              </a:ext>
+            </a:extLst>
+          </p:cNvPr>
+          <p:cNvSpPr/>
+          <p:nvPr/>
+        </p:nvSpPr>
+        <p:spPr>
+          <a:xfrm rot="12770960">
+            <a:off x="7938882" y="3594982"/>
+            <a:ext cx="1858618" cy="536713"/>
+          </a:xfrm>
+          <a:prstGeom prst="rightArrow">
+            <a:avLst/>
+          </a:prstGeom>
+          <a:solidFill>
+            <a:srgbClr val="FF0000"/>
+          </a:solidFill>
+        </p:spPr>
+        <p:style>
+          <a:lnRef idx="2">
+            <a:schemeClr val="accent1">
+              <a:shade val="15000"/>
+            </a:schemeClr>
+          </a:lnRef>
+          <a:fillRef idx="1">
+            <a:schemeClr val="accent1"/>
+          </a:fillRef>
+          <a:effectRef idx="0">
+            <a:schemeClr val="accent1"/>
+          </a:effectRef>
+          <a:fontRef idx="minor">
+            <a:schemeClr val="lt1"/>
+          </a:fontRef>
+        </p:style>
+        <p:txBody>
+          <a:bodyPr rtlCol="0" anchor="ctr"/>
+          <a:lstStyle/>
+          <a:p>
+            <a:pPr marL="0" marR="0" lvl="0" indent="0" algn="ctr" defTabSz="914400" rtl="0" eaLnBrk="1" fontAlgn="auto" latinLnBrk="0" hangingPunct="1">
+              <a:lnSpc>
+                <a:spcPct val="100000"/>
+              </a:lnSpc>
+              <a:spcBef>
+                <a:spcPts val="0"/>
+              </a:spcBef>
+              <a:spcAft>
+                <a:spcPts val="0"/>
+              </a:spcAft>
+              <a:buClrTx/>
+              <a:buSzTx/>
+              <a:buFontTx/>
+              <a:buNone/>
+              <a:tabLst/>
+              <a:defRPr/>
+            </a:pPr>
+            <a:endParaRPr kumimoji="0" lang="en-US" sz="1800" b="0" i="0" u="none" strike="noStrike" kern="1200" cap="none" spc="0" normalizeH="0" baseline="0" noProof="0">
+              <a:ln>
+                <a:noFill/>
+              </a:ln>
+              <a:solidFill>
+                <a:srgbClr val="FFFFFF"/>
+              </a:solidFill>
+              <a:effectLst/>
+              <a:uLnTx/>
+              <a:uFillTx/>
+              <a:latin typeface="Calibri" panose="020F0502020204030204"/>
+              <a:ea typeface="+mn-ea"/>
+              <a:cs typeface="+mn-cs"/>
+            </a:endParaRPr>
+          </a:p>
+        </p:txBody>
+      </p:sp>
+    </p:spTree>
+    <p:extLst>
+      <p:ext uri="{BB962C8B-B14F-4D97-AF65-F5344CB8AC3E}">
+        <p14:creationId xmlns:p14="http://schemas.microsoft.com/office/powerpoint/2010/main" val="2440337316"/>
+      </p:ext>
+    </p:extLst>
+  </p:cSld>
+  <p:clrMapOvr>
+    <a:masterClrMapping/>
+  </p:clrMapOvr>
+</p:sld>
+</file>
+
+<file path=ppt/slides/slide15.xml><?xml version="1.0" encoding="utf-8"?>
+<p:sld xmlns:a="http://schemas.openxmlformats.org/drawingml/2006/main" xmlns:r="http://schemas.openxmlformats.org/officeDocument/2006/relationships" xmlns:p="http://schemas.openxmlformats.org/presentationml/2006/main">
+  <p:cSld>
+    <p:spTree>
+      <p:nvGrpSpPr>
+        <p:cNvPr id="1" name=""/>
+        <p:cNvGrpSpPr/>
+        <p:nvPr/>
+      </p:nvGrpSpPr>
+      <p:grpSpPr>
+        <a:xfrm>
+          <a:off x="0" y="0"/>
+          <a:ext cx="0" cy="0"/>
+          <a:chOff x="0" y="0"/>
+          <a:chExt cx="0" cy="0"/>
+        </a:xfrm>
+      </p:grpSpPr>
+      <p:sp>
+        <p:nvSpPr>
+          <p:cNvPr id="2" name="Title 1">
+            <a:extLst>
+              <a:ext uri="{FF2B5EF4-FFF2-40B4-BE49-F238E27FC236}">
+                <a16:creationId xmlns:a16="http://schemas.microsoft.com/office/drawing/2014/main" id="{1193C801-427D-4761-B139-63C3D71F6842}"/>
+              </a:ext>
+            </a:extLst>
+          </p:cNvPr>
+          <p:cNvSpPr>
+            <a:spLocks noGrp="1"/>
+          </p:cNvSpPr>
+          <p:nvPr>
+            <p:ph type="title"/>
+          </p:nvPr>
+        </p:nvSpPr>
+        <p:spPr>
+          <a:xfrm>
+            <a:off x="838200" y="290652"/>
+            <a:ext cx="10515600" cy="780769"/>
+          </a:xfrm>
+        </p:spPr>
+        <p:txBody>
+          <a:bodyPr/>
+          <a:lstStyle/>
+          <a:p>
+            <a:r>
+              <a:rPr lang="en-US" dirty="0"/>
+              <a:t>Allows Communication Customization</a:t>
+            </a:r>
+          </a:p>
+        </p:txBody>
+      </p:sp>
+      <p:sp>
+        <p:nvSpPr>
+          <p:cNvPr id="10" name="TextBox 9">
+            <a:extLst>
+              <a:ext uri="{FF2B5EF4-FFF2-40B4-BE49-F238E27FC236}">
+                <a16:creationId xmlns:a16="http://schemas.microsoft.com/office/drawing/2014/main" id="{978843E6-49FE-CE26-265D-A2D19E4793C0}"/>
+              </a:ext>
+            </a:extLst>
+          </p:cNvPr>
+          <p:cNvSpPr txBox="1"/>
+          <p:nvPr/>
+        </p:nvSpPr>
+        <p:spPr>
+          <a:xfrm>
+            <a:off x="838200" y="1238081"/>
+            <a:ext cx="4915237" cy="3785652"/>
+          </a:xfrm>
+          <a:prstGeom prst="rect">
+            <a:avLst/>
+          </a:prstGeom>
+          <a:noFill/>
+        </p:spPr>
+        <p:txBody>
+          <a:bodyPr wrap="square" rtlCol="0">
+            <a:spAutoFit/>
+          </a:bodyPr>
+          <a:lstStyle/>
+          <a:p>
+            <a:pPr marL="285750" marR="0" lvl="0" indent="-285750" algn="l" defTabSz="914400" rtl="0" eaLnBrk="1" fontAlgn="auto" latinLnBrk="0" hangingPunct="1">
+              <a:lnSpc>
+                <a:spcPct val="100000"/>
+              </a:lnSpc>
+              <a:spcBef>
+                <a:spcPts val="0"/>
+              </a:spcBef>
+              <a:spcAft>
+                <a:spcPts val="0"/>
+              </a:spcAft>
+              <a:buClrTx/>
+              <a:buSzTx/>
+              <a:buFont typeface="Arial" panose="020B0604020202020204" pitchFamily="34" charset="0"/>
+              <a:buChar char="•"/>
+              <a:tabLst/>
+              <a:defRPr/>
+            </a:pPr>
+            <a:r>
+              <a:rPr kumimoji="0" lang="en-US" sz="2000" b="0" i="0" u="none" strike="noStrike" kern="1200" cap="none" spc="0" normalizeH="0" baseline="0" noProof="0" dirty="0">
+                <a:ln>
+                  <a:noFill/>
+                </a:ln>
+                <a:solidFill>
+                  <a:srgbClr val="007598"/>
+                </a:solidFill>
+                <a:effectLst/>
+                <a:uLnTx/>
+                <a:uFillTx/>
+                <a:latin typeface="Calibri" panose="020F0502020204030204"/>
+                <a:ea typeface="+mn-ea"/>
+                <a:cs typeface="+mn-cs"/>
+              </a:rPr>
+              <a:t>One of the most noticeable things about Slack is the customization that is possible through their add-on apps!</a:t>
+            </a:r>
+          </a:p>
+          <a:p>
+            <a:pPr marL="285750" marR="0" lvl="0" indent="-285750" algn="l" defTabSz="914400" rtl="0" eaLnBrk="1" fontAlgn="auto" latinLnBrk="0" hangingPunct="1">
+              <a:lnSpc>
+                <a:spcPct val="100000"/>
+              </a:lnSpc>
+              <a:spcBef>
+                <a:spcPts val="0"/>
+              </a:spcBef>
+              <a:spcAft>
+                <a:spcPts val="0"/>
+              </a:spcAft>
+              <a:buClrTx/>
+              <a:buSzTx/>
+              <a:buFont typeface="Arial" panose="020B0604020202020204" pitchFamily="34" charset="0"/>
+              <a:buChar char="•"/>
+              <a:tabLst/>
+              <a:defRPr/>
+            </a:pPr>
+            <a:endParaRPr kumimoji="0" lang="en-US" sz="2000" b="0" i="0" u="none" strike="noStrike" kern="1200" cap="none" spc="0" normalizeH="0" baseline="0" noProof="0" dirty="0">
+              <a:ln>
+                <a:noFill/>
+              </a:ln>
+              <a:solidFill>
+                <a:srgbClr val="007598"/>
+              </a:solidFill>
+              <a:effectLst/>
+              <a:uLnTx/>
+              <a:uFillTx/>
+              <a:latin typeface="Calibri" panose="020F0502020204030204"/>
+              <a:ea typeface="+mn-ea"/>
+              <a:cs typeface="+mn-cs"/>
+            </a:endParaRPr>
+          </a:p>
+          <a:p>
+            <a:pPr marL="285750" marR="0" lvl="0" indent="-285750" algn="l" defTabSz="914400" rtl="0" eaLnBrk="1" fontAlgn="auto" latinLnBrk="0" hangingPunct="1">
+              <a:lnSpc>
+                <a:spcPct val="100000"/>
+              </a:lnSpc>
+              <a:spcBef>
+                <a:spcPts val="0"/>
+              </a:spcBef>
+              <a:spcAft>
+                <a:spcPts val="0"/>
+              </a:spcAft>
+              <a:buClrTx/>
+              <a:buSzTx/>
+              <a:buFont typeface="Arial" panose="020B0604020202020204" pitchFamily="34" charset="0"/>
+              <a:buChar char="•"/>
+              <a:tabLst/>
+              <a:defRPr/>
+            </a:pPr>
+            <a:r>
+              <a:rPr kumimoji="0" lang="en-US" sz="2000" b="0" i="0" u="none" strike="noStrike" kern="1200" cap="none" spc="0" normalizeH="0" baseline="0" noProof="0" dirty="0">
+                <a:ln>
+                  <a:noFill/>
+                </a:ln>
+                <a:solidFill>
+                  <a:srgbClr val="007598"/>
+                </a:solidFill>
+                <a:effectLst/>
+                <a:uLnTx/>
+                <a:uFillTx/>
+                <a:latin typeface="Calibri" panose="020F0502020204030204"/>
+                <a:ea typeface="+mn-ea"/>
+                <a:cs typeface="+mn-cs"/>
+              </a:rPr>
+              <a:t>There are thousands of useful apps that can be added to a Slack workspace that supports the task your group is trying to accomplish.</a:t>
+            </a:r>
+          </a:p>
+          <a:p>
+            <a:pPr marL="285750" marR="0" lvl="0" indent="-285750" algn="l" defTabSz="914400" rtl="0" eaLnBrk="1" fontAlgn="auto" latinLnBrk="0" hangingPunct="1">
+              <a:lnSpc>
+                <a:spcPct val="100000"/>
+              </a:lnSpc>
+              <a:spcBef>
+                <a:spcPts val="0"/>
+              </a:spcBef>
+              <a:spcAft>
+                <a:spcPts val="0"/>
+              </a:spcAft>
+              <a:buClrTx/>
+              <a:buSzTx/>
+              <a:buFont typeface="Arial" panose="020B0604020202020204" pitchFamily="34" charset="0"/>
+              <a:buChar char="•"/>
+              <a:tabLst/>
+              <a:defRPr/>
+            </a:pPr>
+            <a:endParaRPr kumimoji="0" lang="en-US" sz="2000" b="0" i="0" u="none" strike="noStrike" kern="1200" cap="none" spc="0" normalizeH="0" baseline="0" noProof="0" dirty="0">
+              <a:ln>
+                <a:noFill/>
+              </a:ln>
+              <a:solidFill>
+                <a:srgbClr val="007598"/>
+              </a:solidFill>
+              <a:effectLst/>
+              <a:uLnTx/>
+              <a:uFillTx/>
+              <a:latin typeface="Calibri" panose="020F0502020204030204"/>
+              <a:ea typeface="+mn-ea"/>
+              <a:cs typeface="+mn-cs"/>
+            </a:endParaRPr>
+          </a:p>
+          <a:p>
+            <a:pPr marL="285750" marR="0" lvl="0" indent="-285750" algn="l" defTabSz="914400" rtl="0" eaLnBrk="1" fontAlgn="auto" latinLnBrk="0" hangingPunct="1">
+              <a:lnSpc>
+                <a:spcPct val="100000"/>
+              </a:lnSpc>
+              <a:spcBef>
+                <a:spcPts val="0"/>
+              </a:spcBef>
+              <a:spcAft>
+                <a:spcPts val="0"/>
+              </a:spcAft>
+              <a:buClrTx/>
+              <a:buSzTx/>
+              <a:buFont typeface="Arial" panose="020B0604020202020204" pitchFamily="34" charset="0"/>
+              <a:buChar char="•"/>
+              <a:tabLst/>
+              <a:defRPr/>
+            </a:pPr>
+            <a:r>
+              <a:rPr kumimoji="0" lang="en-US" sz="2000" b="0" i="0" u="none" strike="noStrike" kern="1200" cap="none" spc="0" normalizeH="0" baseline="0" noProof="0" dirty="0">
+                <a:ln>
+                  <a:noFill/>
+                </a:ln>
+                <a:solidFill>
+                  <a:srgbClr val="007598"/>
+                </a:solidFill>
+                <a:effectLst/>
+                <a:uLnTx/>
+                <a:uFillTx/>
+                <a:latin typeface="Calibri" panose="020F0502020204030204"/>
+                <a:ea typeface="+mn-ea"/>
+                <a:cs typeface="+mn-cs"/>
+              </a:rPr>
+              <a:t>This customization allows for adaptation to different technologies and for an ever-changing Agile environment.</a:t>
+            </a:r>
+          </a:p>
+        </p:txBody>
+      </p:sp>
+      <p:pic>
+        <p:nvPicPr>
+          <p:cNvPr id="7" name="Content Placeholder 6" descr="Slack app Directory Page">
+            <a:extLst>
+              <a:ext uri="{FF2B5EF4-FFF2-40B4-BE49-F238E27FC236}">
+                <a16:creationId xmlns:a16="http://schemas.microsoft.com/office/drawing/2014/main" id="{9D62BA66-3F60-D008-F105-D4180F011B57}"/>
+              </a:ext>
+            </a:extLst>
+          </p:cNvPr>
+          <p:cNvPicPr>
+            <a:picLocks noGrp="1" noChangeAspect="1"/>
+          </p:cNvPicPr>
+          <p:nvPr>
+            <p:ph idx="1"/>
+          </p:nvPr>
+        </p:nvPicPr>
+        <p:blipFill>
+          <a:blip r:embed="rId3">
+            <a:extLst>
+              <a:ext uri="{28A0092B-C50C-407E-A947-70E740481C1C}">
+                <a14:useLocalDpi xmlns:a14="http://schemas.microsoft.com/office/drawing/2010/main" val="0"/>
+              </a:ext>
+            </a:extLst>
+          </a:blip>
+          <a:stretch>
+            <a:fillRect/>
+          </a:stretch>
+        </p:blipFill>
+        <p:spPr>
+          <a:xfrm>
+            <a:off x="6096000" y="1602232"/>
+            <a:ext cx="5577283" cy="3421501"/>
+          </a:xfrm>
+          <a:effectLst>
+            <a:outerShdw blurRad="190500" dist="38100" dir="2700000" sx="102000" sy="102000" algn="tl" rotWithShape="0">
+              <a:prstClr val="black">
+                <a:alpha val="40000"/>
+              </a:prstClr>
+            </a:outerShdw>
+          </a:effectLst>
+        </p:spPr>
+      </p:pic>
+      <p:sp>
+        <p:nvSpPr>
+          <p:cNvPr id="8" name="TextBox 7">
+            <a:extLst>
+              <a:ext uri="{FF2B5EF4-FFF2-40B4-BE49-F238E27FC236}">
+                <a16:creationId xmlns:a16="http://schemas.microsoft.com/office/drawing/2014/main" id="{7E801D9D-D251-3DFA-A6F4-45AF8E839110}"/>
+              </a:ext>
+            </a:extLst>
+          </p:cNvPr>
+          <p:cNvSpPr txBox="1"/>
+          <p:nvPr/>
+        </p:nvSpPr>
+        <p:spPr>
+          <a:xfrm>
+            <a:off x="7721763" y="5185212"/>
+            <a:ext cx="2325756" cy="369332"/>
+          </a:xfrm>
+          <a:prstGeom prst="rect">
+            <a:avLst/>
+          </a:prstGeom>
+          <a:noFill/>
+        </p:spPr>
+        <p:txBody>
+          <a:bodyPr wrap="square" rtlCol="0">
+            <a:spAutoFit/>
+          </a:bodyPr>
+          <a:lstStyle/>
+          <a:p>
+            <a:pPr marL="0" marR="0" lvl="0" indent="0" algn="l" defTabSz="914400" rtl="0" eaLnBrk="1" fontAlgn="auto" latinLnBrk="0" hangingPunct="1">
+              <a:lnSpc>
+                <a:spcPct val="100000"/>
+              </a:lnSpc>
+              <a:spcBef>
+                <a:spcPts val="0"/>
+              </a:spcBef>
+              <a:spcAft>
+                <a:spcPts val="0"/>
+              </a:spcAft>
+              <a:buClrTx/>
+              <a:buSzTx/>
+              <a:buFontTx/>
+              <a:buNone/>
+              <a:tabLst/>
+              <a:defRPr/>
+            </a:pPr>
+            <a:r>
+              <a:rPr kumimoji="0" lang="en-US" sz="1800" b="0" i="0" u="none" strike="noStrike" kern="1200" cap="none" spc="0" normalizeH="0" baseline="0" noProof="0" dirty="0">
+                <a:ln>
+                  <a:noFill/>
+                </a:ln>
+                <a:solidFill>
+                  <a:srgbClr val="007598"/>
+                </a:solidFill>
+                <a:effectLst/>
+                <a:uLnTx/>
+                <a:uFillTx/>
+                <a:latin typeface="Calibri" panose="020F0502020204030204"/>
+                <a:ea typeface="+mn-ea"/>
+                <a:cs typeface="+mn-cs"/>
+                <a:hlinkClick r:id="rId4"/>
+              </a:rPr>
+              <a:t>https://slack.com/apps</a:t>
+            </a:r>
+            <a:endParaRPr kumimoji="0" lang="en-US" sz="1800" b="0" i="0" u="none" strike="noStrike" kern="1200" cap="none" spc="0" normalizeH="0" baseline="0" noProof="0" dirty="0">
+              <a:ln>
+                <a:noFill/>
+              </a:ln>
+              <a:solidFill>
+                <a:srgbClr val="007598"/>
+              </a:solidFill>
+              <a:effectLst/>
+              <a:uLnTx/>
+              <a:uFillTx/>
+              <a:latin typeface="Calibri" panose="020F0502020204030204"/>
+              <a:ea typeface="+mn-ea"/>
+              <a:cs typeface="+mn-cs"/>
+            </a:endParaRPr>
+          </a:p>
+        </p:txBody>
+      </p:sp>
+    </p:spTree>
+    <p:extLst>
+      <p:ext uri="{BB962C8B-B14F-4D97-AF65-F5344CB8AC3E}">
+        <p14:creationId xmlns:p14="http://schemas.microsoft.com/office/powerpoint/2010/main" val="275916581"/>
+      </p:ext>
+    </p:extLst>
+  </p:cSld>
+  <p:clrMapOvr>
+    <a:masterClrMapping/>
+  </p:clrMapOvr>
+</p:sld>
+</file>
+
+<file path=ppt/slides/slide16.xml><?xml version="1.0" encoding="utf-8"?>
+<p:sld xmlns:a="http://schemas.openxmlformats.org/drawingml/2006/main" xmlns:r="http://schemas.openxmlformats.org/officeDocument/2006/relationships" xmlns:p="http://schemas.openxmlformats.org/presentationml/2006/main">
+  <p:cSld>
+    <p:spTree>
+      <p:nvGrpSpPr>
+        <p:cNvPr id="1" name=""/>
+        <p:cNvGrpSpPr/>
+        <p:nvPr/>
+      </p:nvGrpSpPr>
+      <p:grpSpPr>
+        <a:xfrm>
+          <a:off x="0" y="0"/>
+          <a:ext cx="0" cy="0"/>
+          <a:chOff x="0" y="0"/>
+          <a:chExt cx="0" cy="0"/>
+        </a:xfrm>
+      </p:grpSpPr>
+      <p:sp>
+        <p:nvSpPr>
+          <p:cNvPr id="2" name="Title 1">
+            <a:extLst>
+              <a:ext uri="{FF2B5EF4-FFF2-40B4-BE49-F238E27FC236}">
+                <a16:creationId xmlns:a16="http://schemas.microsoft.com/office/drawing/2014/main" id="{1193C801-427D-4761-B139-63C3D71F6842}"/>
+              </a:ext>
+            </a:extLst>
+          </p:cNvPr>
+          <p:cNvSpPr>
+            <a:spLocks noGrp="1"/>
+          </p:cNvSpPr>
+          <p:nvPr>
+            <p:ph type="title"/>
+          </p:nvPr>
+        </p:nvSpPr>
+        <p:spPr>
+          <a:xfrm>
+            <a:off x="838200" y="290652"/>
+            <a:ext cx="10515600" cy="780769"/>
+          </a:xfrm>
+        </p:spPr>
+        <p:txBody>
+          <a:bodyPr/>
+          <a:lstStyle/>
+          <a:p>
+            <a:r>
+              <a:rPr lang="en-US" dirty="0"/>
+              <a:t>Allows Repository Transparency </a:t>
+            </a:r>
+          </a:p>
+        </p:txBody>
+      </p:sp>
+      <p:sp>
+        <p:nvSpPr>
+          <p:cNvPr id="10" name="TextBox 9">
+            <a:extLst>
+              <a:ext uri="{FF2B5EF4-FFF2-40B4-BE49-F238E27FC236}">
+                <a16:creationId xmlns:a16="http://schemas.microsoft.com/office/drawing/2014/main" id="{978843E6-49FE-CE26-265D-A2D19E4793C0}"/>
+              </a:ext>
+            </a:extLst>
+          </p:cNvPr>
+          <p:cNvSpPr txBox="1"/>
+          <p:nvPr/>
+        </p:nvSpPr>
+        <p:spPr>
+          <a:xfrm>
+            <a:off x="838200" y="1238081"/>
+            <a:ext cx="4915237" cy="3785652"/>
+          </a:xfrm>
+          <a:prstGeom prst="rect">
+            <a:avLst/>
+          </a:prstGeom>
+          <a:noFill/>
+        </p:spPr>
+        <p:txBody>
+          <a:bodyPr wrap="square" rtlCol="0">
+            <a:spAutoFit/>
+          </a:bodyPr>
+          <a:lstStyle/>
+          <a:p>
+            <a:pPr marL="285750" marR="0" lvl="0" indent="-285750" algn="l" defTabSz="914400" rtl="0" eaLnBrk="1" fontAlgn="auto" latinLnBrk="0" hangingPunct="1">
+              <a:lnSpc>
+                <a:spcPct val="100000"/>
+              </a:lnSpc>
+              <a:spcBef>
+                <a:spcPts val="0"/>
+              </a:spcBef>
+              <a:spcAft>
+                <a:spcPts val="0"/>
+              </a:spcAft>
+              <a:buClrTx/>
+              <a:buSzTx/>
+              <a:buFont typeface="Arial" panose="020B0604020202020204" pitchFamily="34" charset="0"/>
+              <a:buChar char="•"/>
+              <a:tabLst/>
+              <a:defRPr/>
+            </a:pPr>
+            <a:r>
+              <a:rPr kumimoji="0" lang="en-US" sz="2000" b="0" i="0" u="none" strike="noStrike" kern="1200" cap="none" spc="0" normalizeH="0" baseline="0" noProof="0" dirty="0">
+                <a:ln>
+                  <a:noFill/>
+                </a:ln>
+                <a:solidFill>
+                  <a:srgbClr val="007598"/>
+                </a:solidFill>
+                <a:effectLst/>
+                <a:uLnTx/>
+                <a:uFillTx/>
+                <a:latin typeface="Calibri" panose="020F0502020204030204"/>
+                <a:ea typeface="+mn-ea"/>
+                <a:cs typeface="+mn-cs"/>
+              </a:rPr>
+              <a:t>How often have you gone to push your code only to see that you need to pull the new updated first?</a:t>
+            </a:r>
+          </a:p>
+          <a:p>
+            <a:pPr marL="285750" marR="0" lvl="0" indent="-285750" algn="l" defTabSz="914400" rtl="0" eaLnBrk="1" fontAlgn="auto" latinLnBrk="0" hangingPunct="1">
+              <a:lnSpc>
+                <a:spcPct val="100000"/>
+              </a:lnSpc>
+              <a:spcBef>
+                <a:spcPts val="0"/>
+              </a:spcBef>
+              <a:spcAft>
+                <a:spcPts val="0"/>
+              </a:spcAft>
+              <a:buClrTx/>
+              <a:buSzTx/>
+              <a:buFont typeface="Arial" panose="020B0604020202020204" pitchFamily="34" charset="0"/>
+              <a:buChar char="•"/>
+              <a:tabLst/>
+              <a:defRPr/>
+            </a:pPr>
+            <a:endParaRPr kumimoji="0" lang="en-US" sz="2000" b="0" i="0" u="none" strike="noStrike" kern="1200" cap="none" spc="0" normalizeH="0" baseline="0" noProof="0" dirty="0">
+              <a:ln>
+                <a:noFill/>
+              </a:ln>
+              <a:solidFill>
+                <a:srgbClr val="007598"/>
+              </a:solidFill>
+              <a:effectLst/>
+              <a:uLnTx/>
+              <a:uFillTx/>
+              <a:latin typeface="Calibri" panose="020F0502020204030204"/>
+              <a:ea typeface="+mn-ea"/>
+              <a:cs typeface="+mn-cs"/>
+            </a:endParaRPr>
+          </a:p>
+          <a:p>
+            <a:pPr marL="285750" marR="0" lvl="0" indent="-285750" algn="l" defTabSz="914400" rtl="0" eaLnBrk="1" fontAlgn="auto" latinLnBrk="0" hangingPunct="1">
+              <a:lnSpc>
+                <a:spcPct val="100000"/>
+              </a:lnSpc>
+              <a:spcBef>
+                <a:spcPts val="0"/>
+              </a:spcBef>
+              <a:spcAft>
+                <a:spcPts val="0"/>
+              </a:spcAft>
+              <a:buClrTx/>
+              <a:buSzTx/>
+              <a:buFont typeface="Arial" panose="020B0604020202020204" pitchFamily="34" charset="0"/>
+              <a:buChar char="•"/>
+              <a:tabLst/>
+              <a:defRPr/>
+            </a:pPr>
+            <a:r>
+              <a:rPr kumimoji="0" lang="en-US" sz="2000" b="0" i="0" u="none" strike="noStrike" kern="1200" cap="none" spc="0" normalizeH="0" baseline="0" noProof="0" dirty="0">
+                <a:ln>
+                  <a:noFill/>
+                </a:ln>
+                <a:solidFill>
+                  <a:srgbClr val="007598"/>
+                </a:solidFill>
+                <a:effectLst/>
+                <a:uLnTx/>
+                <a:uFillTx/>
+                <a:latin typeface="Calibri" panose="020F0502020204030204"/>
+                <a:ea typeface="+mn-ea"/>
+                <a:cs typeface="+mn-cs"/>
+              </a:rPr>
+              <a:t>Some of our groups have utilized the GitHub plugin for Slack. This allows the group to be up to date with every update and change happening.</a:t>
+            </a:r>
+          </a:p>
+          <a:p>
+            <a:pPr marL="285750" marR="0" lvl="0" indent="-285750" algn="l" defTabSz="914400" rtl="0" eaLnBrk="1" fontAlgn="auto" latinLnBrk="0" hangingPunct="1">
+              <a:lnSpc>
+                <a:spcPct val="100000"/>
+              </a:lnSpc>
+              <a:spcBef>
+                <a:spcPts val="0"/>
+              </a:spcBef>
+              <a:spcAft>
+                <a:spcPts val="0"/>
+              </a:spcAft>
+              <a:buClrTx/>
+              <a:buSzTx/>
+              <a:buFont typeface="Arial" panose="020B0604020202020204" pitchFamily="34" charset="0"/>
+              <a:buChar char="•"/>
+              <a:tabLst/>
+              <a:defRPr/>
+            </a:pPr>
+            <a:endParaRPr kumimoji="0" lang="en-US" sz="2000" b="0" i="0" u="none" strike="noStrike" kern="1200" cap="none" spc="0" normalizeH="0" baseline="0" noProof="0" dirty="0">
+              <a:ln>
+                <a:noFill/>
+              </a:ln>
+              <a:solidFill>
+                <a:srgbClr val="007598"/>
+              </a:solidFill>
+              <a:effectLst/>
+              <a:uLnTx/>
+              <a:uFillTx/>
+              <a:latin typeface="Calibri" panose="020F0502020204030204"/>
+              <a:ea typeface="+mn-ea"/>
+              <a:cs typeface="+mn-cs"/>
+            </a:endParaRPr>
+          </a:p>
+          <a:p>
+            <a:pPr marL="285750" marR="0" lvl="0" indent="-285750" algn="l" defTabSz="914400" rtl="0" eaLnBrk="1" fontAlgn="auto" latinLnBrk="0" hangingPunct="1">
+              <a:lnSpc>
+                <a:spcPct val="100000"/>
+              </a:lnSpc>
+              <a:spcBef>
+                <a:spcPts val="0"/>
+              </a:spcBef>
+              <a:spcAft>
+                <a:spcPts val="0"/>
+              </a:spcAft>
+              <a:buClrTx/>
+              <a:buSzTx/>
+              <a:buFont typeface="Arial" panose="020B0604020202020204" pitchFamily="34" charset="0"/>
+              <a:buChar char="•"/>
+              <a:tabLst/>
+              <a:defRPr/>
+            </a:pPr>
+            <a:r>
+              <a:rPr kumimoji="0" lang="en-US" sz="2000" b="0" i="0" u="none" strike="noStrike" kern="1200" cap="none" spc="0" normalizeH="0" baseline="0" noProof="0" dirty="0">
+                <a:ln>
+                  <a:noFill/>
+                </a:ln>
+                <a:solidFill>
+                  <a:srgbClr val="007598"/>
+                </a:solidFill>
+                <a:effectLst/>
+                <a:uLnTx/>
+                <a:uFillTx/>
+                <a:latin typeface="Calibri" panose="020F0502020204030204"/>
+                <a:ea typeface="+mn-ea"/>
+                <a:cs typeface="+mn-cs"/>
+              </a:rPr>
+              <a:t>This allows cohesion of progress updates when the group reconvenes to discuss the next steps!</a:t>
+            </a:r>
+          </a:p>
+        </p:txBody>
+      </p:sp>
+      <p:pic>
+        <p:nvPicPr>
+          <p:cNvPr id="7" name="Content Placeholder 6">
+            <a:extLst>
+              <a:ext uri="{FF2B5EF4-FFF2-40B4-BE49-F238E27FC236}">
+                <a16:creationId xmlns:a16="http://schemas.microsoft.com/office/drawing/2014/main" id="{79CBEC20-A68A-CF72-63A4-21534BB00816}"/>
+              </a:ext>
+            </a:extLst>
+          </p:cNvPr>
+          <p:cNvPicPr>
+            <a:picLocks noGrp="1" noChangeAspect="1"/>
+          </p:cNvPicPr>
+          <p:nvPr>
+            <p:ph idx="1"/>
+          </p:nvPr>
+        </p:nvPicPr>
+        <p:blipFill>
+          <a:blip r:embed="rId3">
+            <a:extLst>
+              <a:ext uri="{28A0092B-C50C-407E-A947-70E740481C1C}">
+                <a14:useLocalDpi xmlns:a14="http://schemas.microsoft.com/office/drawing/2010/main" val="0"/>
+              </a:ext>
+            </a:extLst>
+          </a:blip>
+          <a:srcRect/>
+          <a:stretch/>
+        </p:blipFill>
+        <p:spPr>
+          <a:xfrm>
+            <a:off x="6249749" y="1238081"/>
+            <a:ext cx="5257800" cy="4618268"/>
+          </a:xfrm>
+          <a:effectLst>
+            <a:outerShdw blurRad="190500" dist="38100" dir="2700000" sx="102000" sy="102000" algn="tl" rotWithShape="0">
+              <a:prstClr val="black">
+                <a:alpha val="40000"/>
+              </a:prstClr>
+            </a:outerShdw>
+          </a:effectLst>
+        </p:spPr>
+      </p:pic>
+    </p:spTree>
+    <p:extLst>
+      <p:ext uri="{BB962C8B-B14F-4D97-AF65-F5344CB8AC3E}">
+        <p14:creationId xmlns:p14="http://schemas.microsoft.com/office/powerpoint/2010/main" val="3943678850"/>
+      </p:ext>
+    </p:extLst>
+  </p:cSld>
+  <p:clrMapOvr>
+    <a:masterClrMapping/>
+  </p:clrMapOvr>
+</p:sld>
+</file>
+
+<file path=ppt/slides/slide17.xml><?xml version="1.0" encoding="utf-8"?>
+<p:sld xmlns:a="http://schemas.openxmlformats.org/drawingml/2006/main" xmlns:r="http://schemas.openxmlformats.org/officeDocument/2006/relationships" xmlns:p="http://schemas.openxmlformats.org/presentationml/2006/main">
+  <p:cSld>
+    <p:spTree>
+      <p:nvGrpSpPr>
+        <p:cNvPr id="1" name=""/>
+        <p:cNvGrpSpPr/>
+        <p:nvPr/>
+      </p:nvGrpSpPr>
+      <p:grpSpPr>
+        <a:xfrm>
+          <a:off x="0" y="0"/>
+          <a:ext cx="0" cy="0"/>
+          <a:chOff x="0" y="0"/>
+          <a:chExt cx="0" cy="0"/>
+        </a:xfrm>
+      </p:grpSpPr>
+      <p:sp>
+        <p:nvSpPr>
+          <p:cNvPr id="2" name="Title 1">
+            <a:extLst>
+              <a:ext uri="{FF2B5EF4-FFF2-40B4-BE49-F238E27FC236}">
+                <a16:creationId xmlns:a16="http://schemas.microsoft.com/office/drawing/2014/main" id="{1193C801-427D-4761-B139-63C3D71F6842}"/>
+              </a:ext>
+            </a:extLst>
+          </p:cNvPr>
+          <p:cNvSpPr>
+            <a:spLocks noGrp="1"/>
+          </p:cNvSpPr>
+          <p:nvPr>
+            <p:ph type="title"/>
+          </p:nvPr>
+        </p:nvSpPr>
+        <p:spPr>
+          <a:xfrm>
+            <a:off x="838200" y="290652"/>
+            <a:ext cx="10515600" cy="780769"/>
+          </a:xfrm>
+        </p:spPr>
+        <p:txBody>
+          <a:bodyPr/>
+          <a:lstStyle/>
+          <a:p>
+            <a:r>
+              <a:rPr lang="en-US" dirty="0"/>
+              <a:t>Enhances Cohesive File &amp; Screen Sharing</a:t>
+            </a:r>
+          </a:p>
+        </p:txBody>
+      </p:sp>
+      <p:sp>
+        <p:nvSpPr>
+          <p:cNvPr id="10" name="TextBox 9">
+            <a:extLst>
+              <a:ext uri="{FF2B5EF4-FFF2-40B4-BE49-F238E27FC236}">
+                <a16:creationId xmlns:a16="http://schemas.microsoft.com/office/drawing/2014/main" id="{978843E6-49FE-CE26-265D-A2D19E4793C0}"/>
+              </a:ext>
+            </a:extLst>
+          </p:cNvPr>
+          <p:cNvSpPr txBox="1"/>
+          <p:nvPr/>
+        </p:nvSpPr>
+        <p:spPr>
+          <a:xfrm>
+            <a:off x="838200" y="1238081"/>
+            <a:ext cx="4915237" cy="3785652"/>
+          </a:xfrm>
+          <a:prstGeom prst="rect">
+            <a:avLst/>
+          </a:prstGeom>
+          <a:noFill/>
+        </p:spPr>
+        <p:txBody>
+          <a:bodyPr wrap="square" rtlCol="0">
+            <a:spAutoFit/>
+          </a:bodyPr>
+          <a:lstStyle/>
+          <a:p>
+            <a:pPr marL="285750" marR="0" lvl="0" indent="-285750" algn="l" defTabSz="914400" rtl="0" eaLnBrk="1" fontAlgn="auto" latinLnBrk="0" hangingPunct="1">
+              <a:lnSpc>
+                <a:spcPct val="100000"/>
+              </a:lnSpc>
+              <a:spcBef>
+                <a:spcPts val="0"/>
+              </a:spcBef>
+              <a:spcAft>
+                <a:spcPts val="0"/>
+              </a:spcAft>
+              <a:buClrTx/>
+              <a:buSzTx/>
+              <a:buFont typeface="Arial" panose="020B0604020202020204" pitchFamily="34" charset="0"/>
+              <a:buChar char="•"/>
+              <a:tabLst/>
+              <a:defRPr/>
+            </a:pPr>
+            <a:r>
+              <a:rPr kumimoji="0" lang="en-US" sz="2000" b="0" i="0" u="none" strike="noStrike" kern="1200" cap="none" spc="0" normalizeH="0" baseline="0" noProof="0" dirty="0">
+                <a:ln>
+                  <a:noFill/>
+                </a:ln>
+                <a:solidFill>
+                  <a:srgbClr val="007598"/>
+                </a:solidFill>
+                <a:effectLst/>
+                <a:uLnTx/>
+                <a:uFillTx/>
+                <a:latin typeface="Calibri" panose="020F0502020204030204"/>
+                <a:ea typeface="+mn-ea"/>
+                <a:cs typeface="+mn-cs"/>
+              </a:rPr>
+              <a:t>By utilizing the Slack Huddle feature our groups are able to have a live collaboration on demand.</a:t>
+            </a:r>
+          </a:p>
+          <a:p>
+            <a:pPr marL="285750" marR="0" lvl="0" indent="-285750" algn="l" defTabSz="914400" rtl="0" eaLnBrk="1" fontAlgn="auto" latinLnBrk="0" hangingPunct="1">
+              <a:lnSpc>
+                <a:spcPct val="100000"/>
+              </a:lnSpc>
+              <a:spcBef>
+                <a:spcPts val="0"/>
+              </a:spcBef>
+              <a:spcAft>
+                <a:spcPts val="0"/>
+              </a:spcAft>
+              <a:buClrTx/>
+              <a:buSzTx/>
+              <a:buFont typeface="Arial" panose="020B0604020202020204" pitchFamily="34" charset="0"/>
+              <a:buChar char="•"/>
+              <a:tabLst/>
+              <a:defRPr/>
+            </a:pPr>
+            <a:endParaRPr kumimoji="0" lang="en-US" sz="2000" b="0" i="0" u="none" strike="noStrike" kern="1200" cap="none" spc="0" normalizeH="0" baseline="0" noProof="0" dirty="0">
+              <a:ln>
+                <a:noFill/>
+              </a:ln>
+              <a:solidFill>
+                <a:srgbClr val="007598"/>
+              </a:solidFill>
+              <a:effectLst/>
+              <a:uLnTx/>
+              <a:uFillTx/>
+              <a:latin typeface="Calibri" panose="020F0502020204030204"/>
+              <a:ea typeface="+mn-ea"/>
+              <a:cs typeface="+mn-cs"/>
+            </a:endParaRPr>
+          </a:p>
+          <a:p>
+            <a:pPr marL="285750" marR="0" lvl="0" indent="-285750" algn="l" defTabSz="914400" rtl="0" eaLnBrk="1" fontAlgn="auto" latinLnBrk="0" hangingPunct="1">
+              <a:lnSpc>
+                <a:spcPct val="100000"/>
+              </a:lnSpc>
+              <a:spcBef>
+                <a:spcPts val="0"/>
+              </a:spcBef>
+              <a:spcAft>
+                <a:spcPts val="0"/>
+              </a:spcAft>
+              <a:buClrTx/>
+              <a:buSzTx/>
+              <a:buFont typeface="Arial" panose="020B0604020202020204" pitchFamily="34" charset="0"/>
+              <a:buChar char="•"/>
+              <a:tabLst/>
+              <a:defRPr/>
+            </a:pPr>
+            <a:r>
+              <a:rPr kumimoji="0" lang="en-US" sz="2000" b="0" i="0" u="none" strike="noStrike" kern="1200" cap="none" spc="0" normalizeH="0" baseline="0" noProof="0" dirty="0">
+                <a:ln>
+                  <a:noFill/>
+                </a:ln>
+                <a:solidFill>
+                  <a:srgbClr val="007598"/>
+                </a:solidFill>
+                <a:effectLst/>
+                <a:uLnTx/>
+                <a:uFillTx/>
+                <a:latin typeface="Calibri" panose="020F0502020204030204"/>
+                <a:ea typeface="+mn-ea"/>
+                <a:cs typeface="+mn-cs"/>
+              </a:rPr>
+              <a:t>If there is any confusion to the project at hand there can be clarification in the matter of seconds!</a:t>
+            </a:r>
+          </a:p>
+          <a:p>
+            <a:pPr marL="285750" marR="0" lvl="0" indent="-285750" algn="l" defTabSz="914400" rtl="0" eaLnBrk="1" fontAlgn="auto" latinLnBrk="0" hangingPunct="1">
+              <a:lnSpc>
+                <a:spcPct val="100000"/>
+              </a:lnSpc>
+              <a:spcBef>
+                <a:spcPts val="0"/>
+              </a:spcBef>
+              <a:spcAft>
+                <a:spcPts val="0"/>
+              </a:spcAft>
+              <a:buClrTx/>
+              <a:buSzTx/>
+              <a:buFont typeface="Arial" panose="020B0604020202020204" pitchFamily="34" charset="0"/>
+              <a:buChar char="•"/>
+              <a:tabLst/>
+              <a:defRPr/>
+            </a:pPr>
+            <a:endParaRPr kumimoji="0" lang="en-US" sz="2000" b="0" i="0" u="none" strike="noStrike" kern="1200" cap="none" spc="0" normalizeH="0" baseline="0" noProof="0" dirty="0">
+              <a:ln>
+                <a:noFill/>
+              </a:ln>
+              <a:solidFill>
+                <a:srgbClr val="007598"/>
+              </a:solidFill>
+              <a:effectLst/>
+              <a:uLnTx/>
+              <a:uFillTx/>
+              <a:latin typeface="Calibri" panose="020F0502020204030204"/>
+              <a:ea typeface="+mn-ea"/>
+              <a:cs typeface="+mn-cs"/>
+            </a:endParaRPr>
+          </a:p>
+          <a:p>
+            <a:pPr marL="285750" marR="0" lvl="0" indent="-285750" algn="l" defTabSz="914400" rtl="0" eaLnBrk="1" fontAlgn="auto" latinLnBrk="0" hangingPunct="1">
+              <a:lnSpc>
+                <a:spcPct val="100000"/>
+              </a:lnSpc>
+              <a:spcBef>
+                <a:spcPts val="0"/>
+              </a:spcBef>
+              <a:spcAft>
+                <a:spcPts val="0"/>
+              </a:spcAft>
+              <a:buClrTx/>
+              <a:buSzTx/>
+              <a:buFont typeface="Arial" panose="020B0604020202020204" pitchFamily="34" charset="0"/>
+              <a:buChar char="•"/>
+              <a:tabLst/>
+              <a:defRPr/>
+            </a:pPr>
+            <a:r>
+              <a:rPr kumimoji="0" lang="en-US" sz="2000" b="0" i="0" u="none" strike="noStrike" kern="1200" cap="none" spc="0" normalizeH="0" baseline="0" noProof="0" dirty="0">
+                <a:ln>
+                  <a:noFill/>
+                </a:ln>
+                <a:solidFill>
+                  <a:srgbClr val="007598"/>
+                </a:solidFill>
+                <a:effectLst/>
+                <a:uLnTx/>
+                <a:uFillTx/>
+                <a:latin typeface="Calibri" panose="020F0502020204030204"/>
+                <a:ea typeface="+mn-ea"/>
+                <a:cs typeface="+mn-cs"/>
+              </a:rPr>
+              <a:t>The cliché goes that a picture speaks a thousands words. So 30fps screen sharing should speak about 30,000 words per second. (pause for laughter)</a:t>
+            </a:r>
+          </a:p>
+        </p:txBody>
+      </p:sp>
+      <p:pic>
+        <p:nvPicPr>
+          <p:cNvPr id="6" name="Content Placeholder 5">
+            <a:extLst>
+              <a:ext uri="{FF2B5EF4-FFF2-40B4-BE49-F238E27FC236}">
+                <a16:creationId xmlns:a16="http://schemas.microsoft.com/office/drawing/2014/main" id="{DA4CFD66-3291-66F8-D4DA-888A03F5CE36}"/>
+              </a:ext>
+            </a:extLst>
+          </p:cNvPr>
+          <p:cNvPicPr>
+            <a:picLocks noGrp="1" noChangeAspect="1"/>
+          </p:cNvPicPr>
+          <p:nvPr>
+            <p:ph idx="1"/>
+          </p:nvPr>
+        </p:nvPicPr>
+        <p:blipFill>
+          <a:blip r:embed="rId3">
+            <a:extLst>
+              <a:ext uri="{28A0092B-C50C-407E-A947-70E740481C1C}">
+                <a14:useLocalDpi xmlns:a14="http://schemas.microsoft.com/office/drawing/2010/main" val="0"/>
+              </a:ext>
+            </a:extLst>
+          </a:blip>
+          <a:srcRect/>
+          <a:stretch/>
+        </p:blipFill>
+        <p:spPr>
+          <a:xfrm>
+            <a:off x="6096000" y="1866153"/>
+            <a:ext cx="5806880" cy="3269264"/>
+          </a:xfrm>
+          <a:effectLst>
+            <a:outerShdw blurRad="190500" dist="38100" dir="2700000" sx="102000" sy="102000" algn="tl" rotWithShape="0">
+              <a:prstClr val="black">
+                <a:alpha val="40000"/>
+              </a:prstClr>
+            </a:outerShdw>
+          </a:effectLst>
+        </p:spPr>
+      </p:pic>
+    </p:spTree>
+    <p:extLst>
+      <p:ext uri="{BB962C8B-B14F-4D97-AF65-F5344CB8AC3E}">
+        <p14:creationId xmlns:p14="http://schemas.microsoft.com/office/powerpoint/2010/main" val="2257766621"/>
+      </p:ext>
+    </p:extLst>
+  </p:cSld>
+  <p:clrMapOvr>
+    <a:masterClrMapping/>
+  </p:clrMapOvr>
+</p:sld>
+</file>
+
+<file path=ppt/slides/slide18.xml><?xml version="1.0" encoding="utf-8"?>
+<p:sld xmlns:a="http://schemas.openxmlformats.org/drawingml/2006/main" xmlns:r="http://schemas.openxmlformats.org/officeDocument/2006/relationships" xmlns:p="http://schemas.openxmlformats.org/presentationml/2006/main">
+  <p:cSld>
+    <p:spTree>
+      <p:nvGrpSpPr>
+        <p:cNvPr id="1" name=""/>
+        <p:cNvGrpSpPr/>
+        <p:nvPr/>
+      </p:nvGrpSpPr>
+      <p:grpSpPr>
+        <a:xfrm>
+          <a:off x="0" y="0"/>
+          <a:ext cx="0" cy="0"/>
+          <a:chOff x="0" y="0"/>
+          <a:chExt cx="0" cy="0"/>
+        </a:xfrm>
+      </p:grpSpPr>
+      <p:sp>
+        <p:nvSpPr>
+          <p:cNvPr id="2" name="Title 1">
+            <a:extLst>
+              <a:ext uri="{FF2B5EF4-FFF2-40B4-BE49-F238E27FC236}">
+                <a16:creationId xmlns:a16="http://schemas.microsoft.com/office/drawing/2014/main" id="{1193C801-427D-4761-B139-63C3D71F6842}"/>
+              </a:ext>
+            </a:extLst>
+          </p:cNvPr>
+          <p:cNvSpPr>
+            <a:spLocks noGrp="1"/>
+          </p:cNvSpPr>
+          <p:nvPr>
+            <p:ph type="title"/>
+          </p:nvPr>
+        </p:nvSpPr>
+        <p:spPr>
+          <a:xfrm>
+            <a:off x="838200" y="290652"/>
+            <a:ext cx="10515600" cy="780769"/>
+          </a:xfrm>
+        </p:spPr>
+        <p:txBody>
+          <a:bodyPr/>
+          <a:lstStyle/>
+          <a:p>
+            <a:r>
+              <a:rPr lang="en-US" dirty="0"/>
+              <a:t>Supports community and friendship</a:t>
+            </a:r>
+          </a:p>
+        </p:txBody>
+      </p:sp>
+      <p:sp>
+        <p:nvSpPr>
+          <p:cNvPr id="10" name="TextBox 9">
+            <a:extLst>
+              <a:ext uri="{FF2B5EF4-FFF2-40B4-BE49-F238E27FC236}">
+                <a16:creationId xmlns:a16="http://schemas.microsoft.com/office/drawing/2014/main" id="{978843E6-49FE-CE26-265D-A2D19E4793C0}"/>
+              </a:ext>
+            </a:extLst>
+          </p:cNvPr>
+          <p:cNvSpPr txBox="1"/>
+          <p:nvPr/>
+        </p:nvSpPr>
+        <p:spPr>
+          <a:xfrm>
+            <a:off x="838200" y="1238081"/>
+            <a:ext cx="4915237" cy="4401205"/>
+          </a:xfrm>
+          <a:prstGeom prst="rect">
+            <a:avLst/>
+          </a:prstGeom>
+          <a:noFill/>
+        </p:spPr>
+        <p:txBody>
+          <a:bodyPr wrap="square" rtlCol="0">
+            <a:spAutoFit/>
+          </a:bodyPr>
+          <a:lstStyle/>
+          <a:p>
+            <a:pPr marL="285750" marR="0" lvl="0" indent="-285750" algn="l" defTabSz="914400" rtl="0" eaLnBrk="1" fontAlgn="auto" latinLnBrk="0" hangingPunct="1">
+              <a:lnSpc>
+                <a:spcPct val="100000"/>
+              </a:lnSpc>
+              <a:spcBef>
+                <a:spcPts val="0"/>
+              </a:spcBef>
+              <a:spcAft>
+                <a:spcPts val="0"/>
+              </a:spcAft>
+              <a:buClrTx/>
+              <a:buSzTx/>
+              <a:buFont typeface="Arial" panose="020B0604020202020204" pitchFamily="34" charset="0"/>
+              <a:buChar char="•"/>
+              <a:tabLst/>
+              <a:defRPr/>
+            </a:pPr>
+            <a:r>
+              <a:rPr kumimoji="0" lang="en-US" sz="2000" b="0" i="0" u="none" strike="noStrike" kern="1200" cap="none" spc="0" normalizeH="0" baseline="0" noProof="0" dirty="0">
+                <a:ln>
+                  <a:noFill/>
+                </a:ln>
+                <a:solidFill>
+                  <a:srgbClr val="007598"/>
+                </a:solidFill>
+                <a:effectLst/>
+                <a:uLnTx/>
+                <a:uFillTx/>
+                <a:latin typeface="Calibri" panose="020F0502020204030204"/>
+                <a:ea typeface="+mn-ea"/>
+                <a:cs typeface="+mn-cs"/>
+              </a:rPr>
+              <a:t>Sometimes our computer notifications can cause a bit of a stressful spike in our bodies when we hear that jingle or notification noise. (pop </a:t>
+            </a:r>
+            <a:r>
+              <a:rPr kumimoji="0" lang="en-US" sz="2000" b="0" i="0" u="none" strike="noStrike" kern="1200" cap="none" spc="0" normalizeH="0" baseline="0" noProof="0" dirty="0" err="1">
+                <a:ln>
+                  <a:noFill/>
+                </a:ln>
+                <a:solidFill>
+                  <a:srgbClr val="007598"/>
+                </a:solidFill>
+                <a:effectLst/>
+                <a:uLnTx/>
+                <a:uFillTx/>
+                <a:latin typeface="Calibri" panose="020F0502020204030204"/>
+                <a:ea typeface="+mn-ea"/>
+                <a:cs typeface="+mn-cs"/>
+              </a:rPr>
+              <a:t>pop</a:t>
+            </a:r>
+            <a:r>
+              <a:rPr kumimoji="0" lang="en-US" sz="2000" b="0" i="0" u="none" strike="noStrike" kern="1200" cap="none" spc="0" normalizeH="0" baseline="0" noProof="0" dirty="0">
+                <a:ln>
+                  <a:noFill/>
+                </a:ln>
+                <a:solidFill>
+                  <a:srgbClr val="007598"/>
+                </a:solidFill>
+                <a:effectLst/>
+                <a:uLnTx/>
+                <a:uFillTx/>
+                <a:latin typeface="Calibri" panose="020F0502020204030204"/>
+                <a:ea typeface="+mn-ea"/>
+                <a:cs typeface="+mn-cs"/>
+              </a:rPr>
+              <a:t> </a:t>
+            </a:r>
+            <a:r>
+              <a:rPr kumimoji="0" lang="en-US" sz="2000" b="0" i="0" u="none" strike="noStrike" kern="1200" cap="none" spc="0" normalizeH="0" baseline="0" noProof="0" dirty="0" err="1">
+                <a:ln>
+                  <a:noFill/>
+                </a:ln>
+                <a:solidFill>
+                  <a:srgbClr val="007598"/>
+                </a:solidFill>
+                <a:effectLst/>
+                <a:uLnTx/>
+                <a:uFillTx/>
+                <a:latin typeface="Calibri" panose="020F0502020204030204"/>
+                <a:ea typeface="+mn-ea"/>
+                <a:cs typeface="+mn-cs"/>
+              </a:rPr>
+              <a:t>pop</a:t>
+            </a:r>
+            <a:r>
+              <a:rPr kumimoji="0" lang="en-US" sz="2000" b="0" i="0" u="none" strike="noStrike" kern="1200" cap="none" spc="0" normalizeH="0" baseline="0" noProof="0" dirty="0">
+                <a:ln>
+                  <a:noFill/>
+                </a:ln>
+                <a:solidFill>
+                  <a:srgbClr val="007598"/>
+                </a:solidFill>
+                <a:effectLst/>
+                <a:uLnTx/>
+                <a:uFillTx/>
+                <a:latin typeface="Calibri" panose="020F0502020204030204"/>
+                <a:ea typeface="+mn-ea"/>
+                <a:cs typeface="+mn-cs"/>
+              </a:rPr>
+              <a:t> brush </a:t>
+            </a:r>
+            <a:r>
+              <a:rPr kumimoji="0" lang="en-US" sz="2000" b="0" i="0" u="none" strike="noStrike" kern="1200" cap="none" spc="0" normalizeH="0" baseline="0" noProof="0" dirty="0" err="1">
+                <a:ln>
+                  <a:noFill/>
+                </a:ln>
+                <a:solidFill>
+                  <a:srgbClr val="007598"/>
+                </a:solidFill>
+                <a:effectLst/>
+                <a:uLnTx/>
+                <a:uFillTx/>
+                <a:latin typeface="Calibri" panose="020F0502020204030204"/>
+                <a:ea typeface="+mn-ea"/>
+                <a:cs typeface="+mn-cs"/>
+              </a:rPr>
+              <a:t>brush</a:t>
+            </a:r>
+            <a:r>
+              <a:rPr kumimoji="0" lang="en-US" sz="2000" b="0" i="0" u="none" strike="noStrike" kern="1200" cap="none" spc="0" normalizeH="0" baseline="0" noProof="0" dirty="0">
+                <a:ln>
+                  <a:noFill/>
+                </a:ln>
+                <a:solidFill>
+                  <a:srgbClr val="007598"/>
+                </a:solidFill>
+                <a:effectLst/>
+                <a:uLnTx/>
+                <a:uFillTx/>
+                <a:latin typeface="Calibri" panose="020F0502020204030204"/>
+                <a:ea typeface="+mn-ea"/>
+                <a:cs typeface="+mn-cs"/>
+              </a:rPr>
+              <a:t> brush)</a:t>
+            </a:r>
+          </a:p>
+          <a:p>
+            <a:pPr marL="285750" marR="0" lvl="0" indent="-285750" algn="l" defTabSz="914400" rtl="0" eaLnBrk="1" fontAlgn="auto" latinLnBrk="0" hangingPunct="1">
+              <a:lnSpc>
+                <a:spcPct val="100000"/>
+              </a:lnSpc>
+              <a:spcBef>
+                <a:spcPts val="0"/>
+              </a:spcBef>
+              <a:spcAft>
+                <a:spcPts val="0"/>
+              </a:spcAft>
+              <a:buClrTx/>
+              <a:buSzTx/>
+              <a:buFont typeface="Arial" panose="020B0604020202020204" pitchFamily="34" charset="0"/>
+              <a:buChar char="•"/>
+              <a:tabLst/>
+              <a:defRPr/>
+            </a:pPr>
+            <a:endParaRPr kumimoji="0" lang="en-US" sz="2000" b="0" i="0" u="none" strike="noStrike" kern="1200" cap="none" spc="0" normalizeH="0" baseline="0" noProof="0" dirty="0">
+              <a:ln>
+                <a:noFill/>
+              </a:ln>
+              <a:solidFill>
+                <a:srgbClr val="007598"/>
+              </a:solidFill>
+              <a:effectLst/>
+              <a:uLnTx/>
+              <a:uFillTx/>
+              <a:latin typeface="Calibri" panose="020F0502020204030204"/>
+              <a:ea typeface="+mn-ea"/>
+              <a:cs typeface="+mn-cs"/>
+            </a:endParaRPr>
+          </a:p>
+          <a:p>
+            <a:pPr marL="285750" marR="0" lvl="0" indent="-285750" algn="l" defTabSz="914400" rtl="0" eaLnBrk="1" fontAlgn="auto" latinLnBrk="0" hangingPunct="1">
+              <a:lnSpc>
+                <a:spcPct val="100000"/>
+              </a:lnSpc>
+              <a:spcBef>
+                <a:spcPts val="0"/>
+              </a:spcBef>
+              <a:spcAft>
+                <a:spcPts val="0"/>
+              </a:spcAft>
+              <a:buClrTx/>
+              <a:buSzTx/>
+              <a:buFont typeface="Arial" panose="020B0604020202020204" pitchFamily="34" charset="0"/>
+              <a:buChar char="•"/>
+              <a:tabLst/>
+              <a:defRPr/>
+            </a:pPr>
+            <a:r>
+              <a:rPr kumimoji="0" lang="en-US" sz="2000" b="0" i="0" u="none" strike="noStrike" kern="1200" cap="none" spc="0" normalizeH="0" baseline="0" noProof="0" dirty="0">
+                <a:ln>
+                  <a:noFill/>
+                </a:ln>
+                <a:solidFill>
+                  <a:srgbClr val="007598"/>
+                </a:solidFill>
+                <a:effectLst/>
+                <a:uLnTx/>
+                <a:uFillTx/>
+                <a:latin typeface="Calibri" panose="020F0502020204030204"/>
+                <a:ea typeface="+mn-ea"/>
+                <a:cs typeface="+mn-cs"/>
+              </a:rPr>
+              <a:t>In a healthy group setting, those notifications can perk you up and bring motivation to your work-flow!</a:t>
+            </a:r>
+          </a:p>
+          <a:p>
+            <a:pPr marL="285750" marR="0" lvl="0" indent="-285750" algn="l" defTabSz="914400" rtl="0" eaLnBrk="1" fontAlgn="auto" latinLnBrk="0" hangingPunct="1">
+              <a:lnSpc>
+                <a:spcPct val="100000"/>
+              </a:lnSpc>
+              <a:spcBef>
+                <a:spcPts val="0"/>
+              </a:spcBef>
+              <a:spcAft>
+                <a:spcPts val="0"/>
+              </a:spcAft>
+              <a:buClrTx/>
+              <a:buSzTx/>
+              <a:buFont typeface="Arial" panose="020B0604020202020204" pitchFamily="34" charset="0"/>
+              <a:buChar char="•"/>
+              <a:tabLst/>
+              <a:defRPr/>
+            </a:pPr>
+            <a:endParaRPr kumimoji="0" lang="en-US" sz="2000" b="0" i="0" u="none" strike="noStrike" kern="1200" cap="none" spc="0" normalizeH="0" baseline="0" noProof="0" dirty="0">
+              <a:ln>
+                <a:noFill/>
+              </a:ln>
+              <a:solidFill>
+                <a:srgbClr val="007598"/>
+              </a:solidFill>
+              <a:effectLst/>
+              <a:uLnTx/>
+              <a:uFillTx/>
+              <a:latin typeface="Calibri" panose="020F0502020204030204"/>
+              <a:ea typeface="+mn-ea"/>
+              <a:cs typeface="+mn-cs"/>
+            </a:endParaRPr>
+          </a:p>
+          <a:p>
+            <a:pPr marL="285750" marR="0" lvl="0" indent="-285750" algn="l" defTabSz="914400" rtl="0" eaLnBrk="1" fontAlgn="auto" latinLnBrk="0" hangingPunct="1">
+              <a:lnSpc>
+                <a:spcPct val="100000"/>
+              </a:lnSpc>
+              <a:spcBef>
+                <a:spcPts val="0"/>
+              </a:spcBef>
+              <a:spcAft>
+                <a:spcPts val="0"/>
+              </a:spcAft>
+              <a:buClrTx/>
+              <a:buSzTx/>
+              <a:buFont typeface="Arial" panose="020B0604020202020204" pitchFamily="34" charset="0"/>
+              <a:buChar char="•"/>
+              <a:tabLst/>
+              <a:defRPr/>
+            </a:pPr>
+            <a:r>
+              <a:rPr kumimoji="0" lang="en-US" sz="2000" b="0" i="0" u="none" strike="noStrike" kern="1200" cap="none" spc="0" normalizeH="0" baseline="0" noProof="0" dirty="0">
+                <a:ln>
+                  <a:noFill/>
+                </a:ln>
+                <a:solidFill>
+                  <a:srgbClr val="007598"/>
+                </a:solidFill>
+                <a:effectLst/>
+                <a:uLnTx/>
+                <a:uFillTx/>
+                <a:latin typeface="Calibri" panose="020F0502020204030204"/>
+                <a:ea typeface="+mn-ea"/>
+                <a:cs typeface="+mn-cs"/>
+              </a:rPr>
+              <a:t>Efficiency is always important, especially in the tech world. However, we find our group is most efficient when we are all laughing with each other.</a:t>
+            </a:r>
+          </a:p>
+        </p:txBody>
+      </p:sp>
+      <p:pic>
+        <p:nvPicPr>
+          <p:cNvPr id="6" name="Content Placeholder 5">
+            <a:extLst>
+              <a:ext uri="{FF2B5EF4-FFF2-40B4-BE49-F238E27FC236}">
+                <a16:creationId xmlns:a16="http://schemas.microsoft.com/office/drawing/2014/main" id="{B070374E-4E90-6E58-153B-FCEFE25430E4}"/>
+              </a:ext>
+            </a:extLst>
+          </p:cNvPr>
+          <p:cNvPicPr>
+            <a:picLocks noGrp="1" noChangeAspect="1"/>
+          </p:cNvPicPr>
+          <p:nvPr>
+            <p:ph idx="1"/>
+          </p:nvPr>
+        </p:nvPicPr>
+        <p:blipFill>
+          <a:blip r:embed="rId3">
+            <a:extLst>
+              <a:ext uri="{28A0092B-C50C-407E-A947-70E740481C1C}">
+                <a14:useLocalDpi xmlns:a14="http://schemas.microsoft.com/office/drawing/2010/main" val="0"/>
+              </a:ext>
+            </a:extLst>
+          </a:blip>
+          <a:srcRect/>
+          <a:stretch/>
+        </p:blipFill>
+        <p:spPr>
+          <a:xfrm>
+            <a:off x="5848712" y="1071421"/>
+            <a:ext cx="6137316" cy="4618179"/>
+          </a:xfrm>
+          <a:effectLst>
+            <a:outerShdw blurRad="190500" dist="38100" dir="2700000" sx="102000" sy="102000" algn="tl" rotWithShape="0">
+              <a:prstClr val="black">
+                <a:alpha val="40000"/>
+              </a:prstClr>
+            </a:outerShdw>
+          </a:effectLst>
+        </p:spPr>
+      </p:pic>
+    </p:spTree>
+    <p:extLst>
+      <p:ext uri="{BB962C8B-B14F-4D97-AF65-F5344CB8AC3E}">
+        <p14:creationId xmlns:p14="http://schemas.microsoft.com/office/powerpoint/2010/main" val="857814757"/>
+      </p:ext>
+    </p:extLst>
+  </p:cSld>
+  <p:clrMapOvr>
+    <a:masterClrMapping/>
+  </p:clrMapOvr>
+</p:sld>
+</file>
+
+<file path=ppt/slides/slide19.xml><?xml version="1.0" encoding="utf-8"?>
 <p:sld xmlns:a="http://schemas.openxmlformats.org/drawingml/2006/main" xmlns:r="http://schemas.openxmlformats.org/officeDocument/2006/relationships" xmlns:p="http://schemas.openxmlformats.org/presentationml/2006/main">
   <p:cSld>
     <p:spTree>

</xml_diff>

<commit_message>
Updated a few Steven slides for clarity
</commit_message>
<xml_diff>
--- a/LeveragingSlackForStudentCollaboration.pptx
+++ b/LeveragingSlackForStudentCollaboration.pptx
@@ -133,6 +133,65 @@
     </p:ext>
   </p:extLst>
 </p:presentation>
+</file>
+
+<file path=ppt/changesInfos/changesInfo1.xml><?xml version="1.0" encoding="utf-8"?>
+<pc:chgInfo xmlns:a="http://schemas.openxmlformats.org/drawingml/2006/main" xmlns:r="http://schemas.openxmlformats.org/officeDocument/2006/relationships" xmlns:ac="http://schemas.microsoft.com/office/drawing/2013/main/command" xmlns:pc="http://schemas.microsoft.com/office/powerpoint/2013/main/command">
+  <pc:docChgLst>
+    <pc:chgData name="Gsell, Steven D." userId="6e84bc59-7e38-490f-9209-f43946aa50d2" providerId="ADAL" clId="{D88466B7-03C0-4978-B1B6-A6C2E089C6A2}"/>
+    <pc:docChg chg="undo custSel modSld">
+      <pc:chgData name="Gsell, Steven D." userId="6e84bc59-7e38-490f-9209-f43946aa50d2" providerId="ADAL" clId="{D88466B7-03C0-4978-B1B6-A6C2E089C6A2}" dt="2024-07-27T21:37:25.202" v="81"/>
+      <pc:docMkLst>
+        <pc:docMk/>
+      </pc:docMkLst>
+      <pc:sldChg chg="modSp mod">
+        <pc:chgData name="Gsell, Steven D." userId="6e84bc59-7e38-490f-9209-f43946aa50d2" providerId="ADAL" clId="{D88466B7-03C0-4978-B1B6-A6C2E089C6A2}" dt="2024-07-27T21:37:25.202" v="81"/>
+        <pc:sldMkLst>
+          <pc:docMk/>
+          <pc:sldMk cId="3943678850" sldId="1387"/>
+        </pc:sldMkLst>
+        <pc:spChg chg="mod">
+          <ac:chgData name="Gsell, Steven D." userId="6e84bc59-7e38-490f-9209-f43946aa50d2" providerId="ADAL" clId="{D88466B7-03C0-4978-B1B6-A6C2E089C6A2}" dt="2024-07-27T21:37:25.202" v="81"/>
+          <ac:spMkLst>
+            <pc:docMk/>
+            <pc:sldMk cId="3943678850" sldId="1387"/>
+            <ac:spMk id="10" creationId="{978843E6-49FE-CE26-265D-A2D19E4793C0}"/>
+          </ac:spMkLst>
+        </pc:spChg>
+      </pc:sldChg>
+      <pc:sldChg chg="modSp mod">
+        <pc:chgData name="Gsell, Steven D." userId="6e84bc59-7e38-490f-9209-f43946aa50d2" providerId="ADAL" clId="{D88466B7-03C0-4978-B1B6-A6C2E089C6A2}" dt="2024-07-27T21:37:01.524" v="80" actId="20577"/>
+        <pc:sldMkLst>
+          <pc:docMk/>
+          <pc:sldMk cId="2257766621" sldId="1388"/>
+        </pc:sldMkLst>
+        <pc:spChg chg="mod">
+          <ac:chgData name="Gsell, Steven D." userId="6e84bc59-7e38-490f-9209-f43946aa50d2" providerId="ADAL" clId="{D88466B7-03C0-4978-B1B6-A6C2E089C6A2}" dt="2024-07-27T21:37:01.524" v="80" actId="20577"/>
+          <ac:spMkLst>
+            <pc:docMk/>
+            <pc:sldMk cId="2257766621" sldId="1388"/>
+            <ac:spMk id="10" creationId="{978843E6-49FE-CE26-265D-A2D19E4793C0}"/>
+          </ac:spMkLst>
+        </pc:spChg>
+      </pc:sldChg>
+      <pc:sldChg chg="modSp mod">
+        <pc:chgData name="Gsell, Steven D." userId="6e84bc59-7e38-490f-9209-f43946aa50d2" providerId="ADAL" clId="{D88466B7-03C0-4978-B1B6-A6C2E089C6A2}" dt="2024-07-27T21:36:53.429" v="68" actId="5793"/>
+        <pc:sldMkLst>
+          <pc:docMk/>
+          <pc:sldMk cId="857814757" sldId="1389"/>
+        </pc:sldMkLst>
+        <pc:spChg chg="mod">
+          <ac:chgData name="Gsell, Steven D." userId="6e84bc59-7e38-490f-9209-f43946aa50d2" providerId="ADAL" clId="{D88466B7-03C0-4978-B1B6-A6C2E089C6A2}" dt="2024-07-27T21:36:53.429" v="68" actId="5793"/>
+          <ac:spMkLst>
+            <pc:docMk/>
+            <pc:sldMk cId="857814757" sldId="1389"/>
+            <ac:spMk id="10" creationId="{978843E6-49FE-CE26-265D-A2D19E4793C0}"/>
+          </ac:spMkLst>
+        </pc:spChg>
+      </pc:sldChg>
+    </pc:docChg>
+  </pc:docChgLst>
+</pc:chgInfo>
 </file>
 
 <file path=ppt/charts/chart1.xml><?xml version="1.0" encoding="utf-8"?>
@@ -1734,7 +1793,7 @@
           <a:p>
             <a:fld id="{CA1F7DAD-AACB-410C-9AA4-BE5099812397}" type="datetimeFigureOut">
               <a:rPr lang="en-US" smtClean="0"/>
-              <a:t>7/17/2024</a:t>
+              <a:t>7/27/2024</a:t>
             </a:fld>
             <a:endParaRPr lang="en-US"/>
           </a:p>
@@ -3824,7 +3883,7 @@
           <a:p>
             <a:fld id="{8F7D2F49-1857-4E7D-8050-DC698401AAB7}" type="datetimeFigureOut">
               <a:rPr lang="en-US" smtClean="0"/>
-              <a:t>7/17/2024</a:t>
+              <a:t>7/27/2024</a:t>
             </a:fld>
             <a:endParaRPr lang="en-US"/>
           </a:p>
@@ -5171,7 +5230,7 @@
           <a:p>
             <a:fld id="{8F7D2F49-1857-4E7D-8050-DC698401AAB7}" type="datetimeFigureOut">
               <a:rPr lang="en-US" smtClean="0"/>
-              <a:t>7/17/2024</a:t>
+              <a:t>7/27/2024</a:t>
             </a:fld>
             <a:endParaRPr lang="en-US"/>
           </a:p>
@@ -8588,178 +8647,49 @@
           </a:bodyPr>
           <a:lstStyle/>
           <a:p>
-            <a:pPr marL="285750" marR="0" lvl="0" indent="-285750" algn="l" defTabSz="914400" rtl="0" eaLnBrk="1" fontAlgn="auto" latinLnBrk="0" hangingPunct="1">
-              <a:lnSpc>
-                <a:spcPct val="100000"/>
-              </a:lnSpc>
-              <a:spcBef>
-                <a:spcPts val="0"/>
-              </a:spcBef>
-              <a:spcAft>
-                <a:spcPts val="0"/>
-              </a:spcAft>
-              <a:buClrTx/>
-              <a:buSzTx/>
+            <a:pPr marL="285750" indent="-285750">
               <a:buFont typeface="Arial" panose="020B0604020202020204" pitchFamily="34" charset="0"/>
               <a:buChar char="•"/>
-              <a:tabLst/>
-              <a:defRPr/>
             </a:pPr>
             <a:r>
-              <a:rPr kumimoji="0" lang="en-US" sz="2000" b="0" i="0" u="none" strike="noStrike" kern="1200" cap="none" spc="0" normalizeH="0" baseline="0" noProof="0" dirty="0">
-                <a:ln>
-                  <a:noFill/>
-                </a:ln>
-                <a:solidFill>
-                  <a:srgbClr val="007598"/>
-                </a:solidFill>
-                <a:effectLst/>
-                <a:uLnTx/>
-                <a:uFillTx/>
-                <a:latin typeface="Calibri" panose="020F0502020204030204"/>
-                <a:ea typeface="+mn-ea"/>
-                <a:cs typeface="+mn-cs"/>
-              </a:rPr>
-              <a:t>How often have you gone to push your code only to see that you need to pull the new updated first?</a:t>
-            </a:r>
-          </a:p>
-          <a:p>
-            <a:pPr marL="285750" marR="0" lvl="0" indent="-285750" algn="l" defTabSz="914400" rtl="0" eaLnBrk="1" fontAlgn="auto" latinLnBrk="0" hangingPunct="1">
-              <a:lnSpc>
-                <a:spcPct val="100000"/>
-              </a:lnSpc>
-              <a:spcBef>
-                <a:spcPts val="0"/>
-              </a:spcBef>
-              <a:spcAft>
-                <a:spcPts val="0"/>
-              </a:spcAft>
-              <a:buClrTx/>
-              <a:buSzTx/>
+              <a:rPr lang="en-US" sz="2000" dirty="0"/>
+              <a:t>Some of our groups have utilized the GitHub plugin for Slack. This allows the group to be up to date with every update and change happening.</a:t>
+            </a:r>
+          </a:p>
+          <a:p>
+            <a:pPr marL="285750" indent="-285750">
               <a:buFont typeface="Arial" panose="020B0604020202020204" pitchFamily="34" charset="0"/>
               <a:buChar char="•"/>
-              <a:tabLst/>
-              <a:defRPr/>
             </a:pPr>
-            <a:endParaRPr kumimoji="0" lang="en-US" sz="2000" b="0" i="0" u="none" strike="noStrike" kern="1200" cap="none" spc="0" normalizeH="0" baseline="0" noProof="0" dirty="0">
-              <a:ln>
-                <a:noFill/>
-              </a:ln>
-              <a:solidFill>
-                <a:srgbClr val="007598"/>
-              </a:solidFill>
-              <a:effectLst/>
-              <a:uLnTx/>
-              <a:uFillTx/>
-              <a:latin typeface="Calibri" panose="020F0502020204030204"/>
-              <a:ea typeface="+mn-ea"/>
-              <a:cs typeface="+mn-cs"/>
-            </a:endParaRPr>
-          </a:p>
-          <a:p>
-            <a:pPr marL="285750" marR="0" lvl="0" indent="-285750" algn="l" defTabSz="914400" rtl="0" eaLnBrk="1" fontAlgn="auto" latinLnBrk="0" hangingPunct="1">
-              <a:lnSpc>
-                <a:spcPct val="100000"/>
-              </a:lnSpc>
-              <a:spcBef>
-                <a:spcPts val="0"/>
-              </a:spcBef>
-              <a:spcAft>
-                <a:spcPts val="0"/>
-              </a:spcAft>
-              <a:buClrTx/>
-              <a:buSzTx/>
+            <a:endParaRPr lang="en-US" sz="2000" dirty="0"/>
+          </a:p>
+          <a:p>
+            <a:pPr marL="285750" indent="-285750">
               <a:buFont typeface="Arial" panose="020B0604020202020204" pitchFamily="34" charset="0"/>
               <a:buChar char="•"/>
-              <a:tabLst/>
-              <a:defRPr/>
             </a:pPr>
             <a:r>
-              <a:rPr kumimoji="0" lang="en-US" sz="2000" b="0" i="0" u="none" strike="noStrike" kern="1200" cap="none" spc="0" normalizeH="0" baseline="0" noProof="0" dirty="0">
-                <a:ln>
-                  <a:noFill/>
-                </a:ln>
-                <a:solidFill>
-                  <a:srgbClr val="007598"/>
-                </a:solidFill>
-                <a:effectLst/>
-                <a:uLnTx/>
-                <a:uFillTx/>
-                <a:latin typeface="Calibri" panose="020F0502020204030204"/>
-                <a:ea typeface="+mn-ea"/>
-                <a:cs typeface="+mn-cs"/>
-              </a:rPr>
-              <a:t>Some of our groups have utilized the GitHub plugin for Slack. This allows the group to be up to date with every update and change happening.</a:t>
-            </a:r>
-          </a:p>
-          <a:p>
-            <a:pPr marL="285750" marR="0" lvl="0" indent="-285750" algn="l" defTabSz="914400" rtl="0" eaLnBrk="1" fontAlgn="auto" latinLnBrk="0" hangingPunct="1">
-              <a:lnSpc>
-                <a:spcPct val="100000"/>
-              </a:lnSpc>
-              <a:spcBef>
-                <a:spcPts val="0"/>
-              </a:spcBef>
-              <a:spcAft>
-                <a:spcPts val="0"/>
-              </a:spcAft>
-              <a:buClrTx/>
-              <a:buSzTx/>
+              <a:rPr lang="en-US" sz="2000" dirty="0"/>
+              <a:t>This allows cohesion of progress updates when the group reconvenes to discuss the next steps!</a:t>
+            </a:r>
+          </a:p>
+          <a:p>
+            <a:pPr marL="285750" indent="-285750">
               <a:buFont typeface="Arial" panose="020B0604020202020204" pitchFamily="34" charset="0"/>
               <a:buChar char="•"/>
-              <a:tabLst/>
-              <a:defRPr/>
             </a:pPr>
-            <a:endParaRPr kumimoji="0" lang="en-US" sz="2000" b="0" i="0" u="none" strike="noStrike" kern="1200" cap="none" spc="0" normalizeH="0" baseline="0" noProof="0" dirty="0">
-              <a:ln>
-                <a:noFill/>
-              </a:ln>
-              <a:solidFill>
-                <a:srgbClr val="007598"/>
-              </a:solidFill>
-              <a:effectLst/>
-              <a:uLnTx/>
-              <a:uFillTx/>
-              <a:latin typeface="Calibri" panose="020F0502020204030204"/>
-              <a:ea typeface="+mn-ea"/>
-              <a:cs typeface="+mn-cs"/>
-            </a:endParaRPr>
-          </a:p>
-          <a:p>
-            <a:pPr marL="285750" marR="0" lvl="0" indent="-285750" algn="l" defTabSz="914400" rtl="0" eaLnBrk="1" fontAlgn="auto" latinLnBrk="0" hangingPunct="1">
-              <a:lnSpc>
-                <a:spcPct val="100000"/>
-              </a:lnSpc>
-              <a:spcBef>
-                <a:spcPts val="0"/>
-              </a:spcBef>
-              <a:spcAft>
-                <a:spcPts val="0"/>
-              </a:spcAft>
-              <a:buClrTx/>
-              <a:buSzTx/>
+            <a:endParaRPr lang="en-US" sz="2000" dirty="0"/>
+          </a:p>
+          <a:p>
+            <a:pPr marL="285750" indent="-285750">
               <a:buFont typeface="Arial" panose="020B0604020202020204" pitchFamily="34" charset="0"/>
               <a:buChar char="•"/>
-              <a:tabLst/>
-              <a:defRPr/>
             </a:pPr>
             <a:r>
-              <a:rPr kumimoji="0" lang="en-US" sz="2000" b="0" i="0" u="none" strike="noStrike" kern="1200" cap="none" spc="0" normalizeH="0" baseline="0" noProof="0" dirty="0">
-                <a:ln>
-                  <a:noFill/>
-                </a:ln>
-                <a:solidFill>
-                  <a:srgbClr val="007598"/>
-                </a:solidFill>
-                <a:effectLst/>
-                <a:uLnTx/>
-                <a:uFillTx/>
-                <a:latin typeface="Calibri" panose="020F0502020204030204"/>
-                <a:ea typeface="+mn-ea"/>
-                <a:cs typeface="+mn-cs"/>
-              </a:rPr>
-              <a:t>This allows cohesion of progress updates when the group reconvenes to discuss the next steps!</a:t>
-            </a:r>
+              <a:rPr lang="en-US" sz="2000"/>
+              <a:t>No matter what you are teaching, there will almost certainly be an add-on that can help your group setting.</a:t>
+            </a:r>
+            <a:endParaRPr lang="en-US" sz="2000" dirty="0"/>
           </a:p>
         </p:txBody>
       </p:sp>
@@ -9065,7 +8995,7 @@
                 <a:ea typeface="+mn-ea"/>
                 <a:cs typeface="+mn-cs"/>
               </a:rPr>
-              <a:t>The cliché goes that a picture speaks a thousands words. So 30fps screen sharing should speak about 30,000 words per second. (pause for laughter)</a:t>
+              <a:t>The cliché goes that a picture speaks a thousands words. So 30fps screen sharing should speak about 30,000 words per second. (pause for cheesy joke laughter)</a:t>
             </a:r>
           </a:p>
         </p:txBody>
@@ -9288,7 +9218,7 @@
         <p:spPr>
           <a:xfrm>
             <a:off x="838200" y="1238081"/>
-            <a:ext cx="4915237" cy="4401205"/>
+            <a:ext cx="4915237" cy="4093428"/>
           </a:xfrm>
           <a:prstGeom prst="rect">
             <a:avLst/>
@@ -9333,113 +9263,11 @@
                 <a:ea typeface="+mn-ea"/>
                 <a:cs typeface="+mn-cs"/>
               </a:rPr>
-              <a:t>Sometimes our computer notifications can cause a bit of a stressful spike in our bodies when we hear that jingle or notification noise. (pop </a:t>
-            </a:r>
-            <a:r>
-              <a:rPr kumimoji="0" lang="en-US" sz="2000" b="0" i="0" u="none" strike="noStrike" kern="1200" cap="none" spc="0" normalizeH="0" baseline="0" noProof="0" dirty="0" err="1">
-                <a:ln>
-                  <a:noFill/>
-                </a:ln>
-                <a:solidFill>
-                  <a:srgbClr val="007598"/>
-                </a:solidFill>
-                <a:effectLst/>
-                <a:uLnTx/>
-                <a:uFillTx/>
-                <a:latin typeface="Calibri" panose="020F0502020204030204"/>
-                <a:ea typeface="+mn-ea"/>
-                <a:cs typeface="+mn-cs"/>
-              </a:rPr>
-              <a:t>pop</a:t>
-            </a:r>
-            <a:r>
-              <a:rPr kumimoji="0" lang="en-US" sz="2000" b="0" i="0" u="none" strike="noStrike" kern="1200" cap="none" spc="0" normalizeH="0" baseline="0" noProof="0" dirty="0">
-                <a:ln>
-                  <a:noFill/>
-                </a:ln>
-                <a:solidFill>
-                  <a:srgbClr val="007598"/>
-                </a:solidFill>
-                <a:effectLst/>
-                <a:uLnTx/>
-                <a:uFillTx/>
-                <a:latin typeface="Calibri" panose="020F0502020204030204"/>
-                <a:ea typeface="+mn-ea"/>
-                <a:cs typeface="+mn-cs"/>
-              </a:rPr>
-              <a:t> </a:t>
-            </a:r>
-            <a:r>
-              <a:rPr kumimoji="0" lang="en-US" sz="2000" b="0" i="0" u="none" strike="noStrike" kern="1200" cap="none" spc="0" normalizeH="0" baseline="0" noProof="0" dirty="0" err="1">
-                <a:ln>
-                  <a:noFill/>
-                </a:ln>
-                <a:solidFill>
-                  <a:srgbClr val="007598"/>
-                </a:solidFill>
-                <a:effectLst/>
-                <a:uLnTx/>
-                <a:uFillTx/>
-                <a:latin typeface="Calibri" panose="020F0502020204030204"/>
-                <a:ea typeface="+mn-ea"/>
-                <a:cs typeface="+mn-cs"/>
-              </a:rPr>
-              <a:t>pop</a:t>
-            </a:r>
-            <a:r>
-              <a:rPr kumimoji="0" lang="en-US" sz="2000" b="0" i="0" u="none" strike="noStrike" kern="1200" cap="none" spc="0" normalizeH="0" baseline="0" noProof="0" dirty="0">
-                <a:ln>
-                  <a:noFill/>
-                </a:ln>
-                <a:solidFill>
-                  <a:srgbClr val="007598"/>
-                </a:solidFill>
-                <a:effectLst/>
-                <a:uLnTx/>
-                <a:uFillTx/>
-                <a:latin typeface="Calibri" panose="020F0502020204030204"/>
-                <a:ea typeface="+mn-ea"/>
-                <a:cs typeface="+mn-cs"/>
-              </a:rPr>
-              <a:t> brush </a:t>
-            </a:r>
-            <a:r>
-              <a:rPr kumimoji="0" lang="en-US" sz="2000" b="0" i="0" u="none" strike="noStrike" kern="1200" cap="none" spc="0" normalizeH="0" baseline="0" noProof="0" dirty="0" err="1">
-                <a:ln>
-                  <a:noFill/>
-                </a:ln>
-                <a:solidFill>
-                  <a:srgbClr val="007598"/>
-                </a:solidFill>
-                <a:effectLst/>
-                <a:uLnTx/>
-                <a:uFillTx/>
-                <a:latin typeface="Calibri" panose="020F0502020204030204"/>
-                <a:ea typeface="+mn-ea"/>
-                <a:cs typeface="+mn-cs"/>
-              </a:rPr>
-              <a:t>brush</a:t>
-            </a:r>
-            <a:r>
-              <a:rPr kumimoji="0" lang="en-US" sz="2000" b="0" i="0" u="none" strike="noStrike" kern="1200" cap="none" spc="0" normalizeH="0" baseline="0" noProof="0" dirty="0">
-                <a:ln>
-                  <a:noFill/>
-                </a:ln>
-                <a:solidFill>
-                  <a:srgbClr val="007598"/>
-                </a:solidFill>
-                <a:effectLst/>
-                <a:uLnTx/>
-                <a:uFillTx/>
-                <a:latin typeface="Calibri" panose="020F0502020204030204"/>
-                <a:ea typeface="+mn-ea"/>
-                <a:cs typeface="+mn-cs"/>
-              </a:rPr>
-              <a:t> brush)</a:t>
-            </a:r>
-          </a:p>
-          <a:p>
-            <a:pPr marL="285750" marR="0" lvl="0" indent="-285750" algn="l" defTabSz="914400" rtl="0" eaLnBrk="1" fontAlgn="auto" latinLnBrk="0" hangingPunct="1">
+              <a:t>Sometimes our computer notifications can cause a bit of a stressful spike in our bodies when we hear that jingle or notification noise.</a:t>
+            </a:r>
+          </a:p>
+          <a:p>
+            <a:pPr marR="0" lvl="0" algn="l" defTabSz="914400" rtl="0" eaLnBrk="1" fontAlgn="auto" latinLnBrk="0" hangingPunct="1">
               <a:lnSpc>
                 <a:spcPct val="100000"/>
               </a:lnSpc>
@@ -9451,8 +9279,6 @@
               </a:spcAft>
               <a:buClrTx/>
               <a:buSzTx/>
-              <a:buFont typeface="Arial" panose="020B0604020202020204" pitchFamily="34" charset="0"/>
-              <a:buChar char="•"/>
               <a:tabLst/>
               <a:defRPr/>
             </a:pPr>

</xml_diff>